<commit_message>
pptx - cassandra ring
</commit_message>
<xml_diff>
--- a/Cassandra project.pptx
+++ b/Cassandra project.pptx
@@ -5,26 +5,30 @@
     <p:sldMasterId id="2147483648" r:id="rId1"/>
   </p:sldMasterIdLst>
   <p:notesMasterIdLst>
-    <p:notesMasterId r:id="rId19"/>
+    <p:notesMasterId r:id="rId23"/>
   </p:notesMasterIdLst>
   <p:sldIdLst>
     <p:sldId id="256" r:id="rId2"/>
     <p:sldId id="257" r:id="rId3"/>
     <p:sldId id="258" r:id="rId4"/>
     <p:sldId id="266" r:id="rId5"/>
-    <p:sldId id="259" r:id="rId6"/>
-    <p:sldId id="260" r:id="rId7"/>
-    <p:sldId id="261" r:id="rId8"/>
-    <p:sldId id="262" r:id="rId9"/>
-    <p:sldId id="268" r:id="rId10"/>
-    <p:sldId id="269" r:id="rId11"/>
-    <p:sldId id="265" r:id="rId12"/>
-    <p:sldId id="267" r:id="rId13"/>
-    <p:sldId id="270" r:id="rId14"/>
-    <p:sldId id="271" r:id="rId15"/>
-    <p:sldId id="272" r:id="rId16"/>
-    <p:sldId id="263" r:id="rId17"/>
-    <p:sldId id="264" r:id="rId18"/>
+    <p:sldId id="275" r:id="rId6"/>
+    <p:sldId id="259" r:id="rId7"/>
+    <p:sldId id="260" r:id="rId8"/>
+    <p:sldId id="261" r:id="rId9"/>
+    <p:sldId id="262" r:id="rId10"/>
+    <p:sldId id="268" r:id="rId11"/>
+    <p:sldId id="276" r:id="rId12"/>
+    <p:sldId id="273" r:id="rId13"/>
+    <p:sldId id="269" r:id="rId14"/>
+    <p:sldId id="265" r:id="rId15"/>
+    <p:sldId id="267" r:id="rId16"/>
+    <p:sldId id="270" r:id="rId17"/>
+    <p:sldId id="271" r:id="rId18"/>
+    <p:sldId id="274" r:id="rId19"/>
+    <p:sldId id="272" r:id="rId20"/>
+    <p:sldId id="263" r:id="rId21"/>
+    <p:sldId id="264" r:id="rId22"/>
   </p:sldIdLst>
   <p:sldSz cx="12192000" cy="6858000"/>
   <p:notesSz cx="6858000" cy="9144000"/>
@@ -681,7 +685,7 @@
           <a:p>
             <a:fld id="{C2600658-D8C1-4431-8AE6-1561B6C7C846}" type="slidenum">
               <a:rPr lang="it-IT" smtClean="0"/>
-              <a:t>7</a:t>
+              <a:t>8</a:t>
             </a:fld>
             <a:endParaRPr lang="it-IT"/>
           </a:p>
@@ -765,7 +769,7 @@
           <a:p>
             <a:fld id="{C2600658-D8C1-4431-8AE6-1561B6C7C846}" type="slidenum">
               <a:rPr lang="it-IT" smtClean="0"/>
-              <a:t>11</a:t>
+              <a:t>14</a:t>
             </a:fld>
             <a:endParaRPr lang="it-IT"/>
           </a:p>
@@ -4119,6 +4123,1239 @@
           <p:cNvPr id="2" name="Titolo 1">
             <a:extLst>
               <a:ext uri="{FF2B5EF4-FFF2-40B4-BE49-F238E27FC236}">
+                <a16:creationId xmlns:a16="http://schemas.microsoft.com/office/drawing/2014/main" id="{9719ACE6-A9F9-4E44-AF4B-4F84DD8DE34F}"/>
+              </a:ext>
+            </a:extLst>
+          </p:cNvPr>
+          <p:cNvSpPr>
+            <a:spLocks noGrp="1"/>
+          </p:cNvSpPr>
+          <p:nvPr>
+            <p:ph type="title"/>
+          </p:nvPr>
+        </p:nvSpPr>
+        <p:spPr/>
+        <p:txBody>
+          <a:bodyPr/>
+          <a:lstStyle/>
+          <a:p>
+            <a:r>
+              <a:rPr lang="it-IT" dirty="0"/>
+              <a:t>ring</a:t>
+            </a:r>
+          </a:p>
+        </p:txBody>
+      </p:sp>
+      <p:sp>
+        <p:nvSpPr>
+          <p:cNvPr id="3" name="Segnaposto contenuto 2">
+            <a:extLst>
+              <a:ext uri="{FF2B5EF4-FFF2-40B4-BE49-F238E27FC236}">
+                <a16:creationId xmlns:a16="http://schemas.microsoft.com/office/drawing/2014/main" id="{7AC476F3-1483-4E69-9F67-C8F4B3609278}"/>
+              </a:ext>
+            </a:extLst>
+          </p:cNvPr>
+          <p:cNvSpPr>
+            <a:spLocks noGrp="1"/>
+          </p:cNvSpPr>
+          <p:nvPr>
+            <p:ph idx="1"/>
+          </p:nvPr>
+        </p:nvSpPr>
+        <p:spPr>
+          <a:xfrm>
+            <a:off x="812800" y="1970843"/>
+            <a:ext cx="6901098" cy="5110677"/>
+          </a:xfrm>
+        </p:spPr>
+        <p:txBody>
+          <a:bodyPr>
+            <a:normAutofit/>
+          </a:bodyPr>
+          <a:lstStyle/>
+          <a:p>
+            <a:r>
+              <a:rPr lang="it-IT" dirty="0" err="1"/>
+              <a:t>Every</a:t>
+            </a:r>
+            <a:r>
+              <a:rPr lang="it-IT" dirty="0"/>
+              <a:t> </a:t>
+            </a:r>
+            <a:r>
+              <a:rPr lang="it-IT" dirty="0" err="1"/>
+              <a:t>node</a:t>
+            </a:r>
+            <a:r>
+              <a:rPr lang="it-IT" dirty="0"/>
+              <a:t> </a:t>
+            </a:r>
+            <a:r>
+              <a:rPr lang="it-IT" dirty="0" err="1"/>
+              <a:t>manages</a:t>
+            </a:r>
+            <a:r>
+              <a:rPr lang="it-IT" dirty="0"/>
+              <a:t> </a:t>
+            </a:r>
+            <a:r>
+              <a:rPr lang="it-IT" dirty="0" err="1"/>
+              <a:t>its</a:t>
+            </a:r>
+            <a:r>
+              <a:rPr lang="it-IT" dirty="0"/>
+              <a:t> </a:t>
+            </a:r>
+            <a:r>
+              <a:rPr lang="it-IT" dirty="0" err="1"/>
+              <a:t>own</a:t>
+            </a:r>
+            <a:r>
+              <a:rPr lang="it-IT" dirty="0"/>
+              <a:t> data: </a:t>
+            </a:r>
+            <a:r>
+              <a:rPr lang="it-IT" dirty="0" err="1"/>
+              <a:t>what</a:t>
+            </a:r>
+            <a:r>
+              <a:rPr lang="it-IT" dirty="0"/>
+              <a:t> </a:t>
+            </a:r>
+            <a:r>
+              <a:rPr lang="it-IT" dirty="0" err="1"/>
+              <a:t>happens</a:t>
+            </a:r>
+            <a:r>
+              <a:rPr lang="it-IT" dirty="0"/>
+              <a:t> </a:t>
+            </a:r>
+            <a:r>
+              <a:rPr lang="it-IT" dirty="0" err="1"/>
+              <a:t>when</a:t>
+            </a:r>
+            <a:r>
+              <a:rPr lang="it-IT" dirty="0"/>
+              <a:t> a new record </a:t>
+            </a:r>
+            <a:r>
+              <a:rPr lang="it-IT" dirty="0" err="1"/>
+              <a:t>comes</a:t>
+            </a:r>
+            <a:r>
+              <a:rPr lang="it-IT" dirty="0"/>
+              <a:t>?</a:t>
+            </a:r>
+          </a:p>
+          <a:p>
+            <a:pPr>
+              <a:buFont typeface="Tw Cen MT" panose="020B0602020104020603" pitchFamily="34" charset="0"/>
+              <a:buChar char="-"/>
+            </a:pPr>
+            <a:r>
+              <a:rPr lang="it-IT" dirty="0"/>
+              <a:t> New data </a:t>
+            </a:r>
+            <a:r>
+              <a:rPr lang="it-IT" dirty="0" err="1"/>
+              <a:t>comes</a:t>
+            </a:r>
+            <a:r>
+              <a:rPr lang="it-IT" dirty="0"/>
+              <a:t> to a </a:t>
+            </a:r>
+            <a:r>
+              <a:rPr lang="it-IT" dirty="0" err="1"/>
+              <a:t>node</a:t>
+            </a:r>
+            <a:r>
+              <a:rPr lang="it-IT" dirty="0"/>
+              <a:t>, </a:t>
+            </a:r>
+            <a:r>
+              <a:rPr lang="it-IT" dirty="0" err="1"/>
+              <a:t>that</a:t>
+            </a:r>
+            <a:r>
+              <a:rPr lang="it-IT" dirty="0"/>
+              <a:t> </a:t>
+            </a:r>
+            <a:r>
+              <a:rPr lang="it-IT" dirty="0" err="1"/>
+              <a:t>will</a:t>
+            </a:r>
+            <a:r>
+              <a:rPr lang="it-IT" dirty="0"/>
+              <a:t> </a:t>
+            </a:r>
+            <a:r>
+              <a:rPr lang="it-IT" dirty="0" err="1"/>
+              <a:t>become</a:t>
+            </a:r>
+            <a:r>
+              <a:rPr lang="it-IT" dirty="0"/>
+              <a:t> the coordinator </a:t>
+            </a:r>
+            <a:r>
+              <a:rPr lang="it-IT" dirty="0" err="1"/>
+              <a:t>that</a:t>
+            </a:r>
+            <a:r>
+              <a:rPr lang="it-IT" dirty="0"/>
+              <a:t> handles the </a:t>
+            </a:r>
+            <a:r>
+              <a:rPr lang="it-IT" dirty="0" err="1"/>
+              <a:t>request</a:t>
+            </a:r>
+            <a:endParaRPr lang="it-IT" dirty="0"/>
+          </a:p>
+          <a:p>
+            <a:pPr lvl="1">
+              <a:buFont typeface="Tw Cen MT" panose="020B0602020104020603" pitchFamily="34" charset="0"/>
+              <a:buChar char="-"/>
+            </a:pPr>
+            <a:r>
+              <a:rPr lang="it-IT" sz="2000" dirty="0" err="1"/>
+              <a:t>Every</a:t>
+            </a:r>
+            <a:r>
+              <a:rPr lang="it-IT" sz="2000" dirty="0"/>
+              <a:t> </a:t>
+            </a:r>
+            <a:r>
+              <a:rPr lang="it-IT" sz="2000" dirty="0" err="1"/>
+              <a:t>node</a:t>
+            </a:r>
+            <a:r>
+              <a:rPr lang="it-IT" sz="2000" dirty="0"/>
+              <a:t> can be a coordinator</a:t>
+            </a:r>
+          </a:p>
+          <a:p>
+            <a:pPr>
+              <a:buFont typeface="Tw Cen MT" panose="020B0602020104020603" pitchFamily="34" charset="0"/>
+              <a:buChar char="-"/>
+            </a:pPr>
+            <a:r>
+              <a:rPr lang="it-IT" dirty="0"/>
+              <a:t> The coordinator </a:t>
+            </a:r>
+            <a:r>
+              <a:rPr lang="it-IT" dirty="0" err="1"/>
+              <a:t>node</a:t>
+            </a:r>
+            <a:r>
+              <a:rPr lang="it-IT" dirty="0"/>
+              <a:t> </a:t>
+            </a:r>
+            <a:r>
+              <a:rPr lang="it-IT" dirty="0" err="1"/>
+              <a:t>sends</a:t>
+            </a:r>
+            <a:r>
+              <a:rPr lang="it-IT" dirty="0"/>
+              <a:t> the data to the </a:t>
+            </a:r>
+            <a:r>
+              <a:rPr lang="it-IT" dirty="0" err="1"/>
+              <a:t>correct</a:t>
+            </a:r>
+            <a:r>
+              <a:rPr lang="it-IT" dirty="0"/>
+              <a:t> </a:t>
+            </a:r>
+            <a:r>
+              <a:rPr lang="it-IT" dirty="0" err="1"/>
+              <a:t>node</a:t>
+            </a:r>
+            <a:r>
+              <a:rPr lang="it-IT" dirty="0"/>
+              <a:t> </a:t>
+            </a:r>
+            <a:r>
+              <a:rPr lang="it-IT" dirty="0" err="1"/>
+              <a:t>that</a:t>
+            </a:r>
+            <a:r>
+              <a:rPr lang="it-IT" dirty="0"/>
+              <a:t> stores the </a:t>
+            </a:r>
+            <a:r>
+              <a:rPr lang="it-IT" dirty="0" err="1"/>
+              <a:t>partition</a:t>
+            </a:r>
+            <a:endParaRPr lang="it-IT" dirty="0"/>
+          </a:p>
+          <a:p>
+            <a:pPr marL="0" indent="0" algn="ctr">
+              <a:buNone/>
+            </a:pPr>
+            <a:r>
+              <a:rPr lang="it-IT" sz="2400" dirty="0">
+                <a:solidFill>
+                  <a:schemeClr val="accent1">
+                    <a:lumMod val="50000"/>
+                  </a:schemeClr>
+                </a:solidFill>
+              </a:rPr>
+              <a:t>How </a:t>
+            </a:r>
+            <a:r>
+              <a:rPr lang="it-IT" sz="2400" dirty="0" err="1">
+                <a:solidFill>
+                  <a:schemeClr val="accent1">
+                    <a:lumMod val="50000"/>
+                  </a:schemeClr>
+                </a:solidFill>
+              </a:rPr>
+              <a:t>does</a:t>
+            </a:r>
+            <a:r>
+              <a:rPr lang="it-IT" sz="2400" dirty="0">
+                <a:solidFill>
+                  <a:schemeClr val="accent1">
+                    <a:lumMod val="50000"/>
+                  </a:schemeClr>
+                </a:solidFill>
+              </a:rPr>
+              <a:t> a </a:t>
+            </a:r>
+            <a:r>
+              <a:rPr lang="it-IT" sz="2400" dirty="0" err="1">
+                <a:solidFill>
+                  <a:schemeClr val="accent1">
+                    <a:lumMod val="50000"/>
+                  </a:schemeClr>
+                </a:solidFill>
+              </a:rPr>
+              <a:t>node</a:t>
+            </a:r>
+            <a:r>
+              <a:rPr lang="it-IT" sz="2400" dirty="0">
+                <a:solidFill>
+                  <a:schemeClr val="accent1">
+                    <a:lumMod val="50000"/>
+                  </a:schemeClr>
+                </a:solidFill>
+              </a:rPr>
+              <a:t> know </a:t>
+            </a:r>
+            <a:r>
+              <a:rPr lang="it-IT" sz="2400" dirty="0" err="1">
+                <a:solidFill>
+                  <a:schemeClr val="accent1">
+                    <a:lumMod val="50000"/>
+                  </a:schemeClr>
+                </a:solidFill>
+              </a:rPr>
+              <a:t>where</a:t>
+            </a:r>
+            <a:r>
+              <a:rPr lang="it-IT" sz="2400" dirty="0">
+                <a:solidFill>
+                  <a:schemeClr val="accent1">
+                    <a:lumMod val="50000"/>
+                  </a:schemeClr>
+                </a:solidFill>
+              </a:rPr>
+              <a:t> to </a:t>
+            </a:r>
+            <a:r>
+              <a:rPr lang="it-IT" sz="2400" dirty="0" err="1">
+                <a:solidFill>
+                  <a:schemeClr val="accent1">
+                    <a:lumMod val="50000"/>
+                  </a:schemeClr>
+                </a:solidFill>
+              </a:rPr>
+              <a:t>send</a:t>
+            </a:r>
+            <a:r>
+              <a:rPr lang="it-IT" sz="2400" dirty="0">
+                <a:solidFill>
+                  <a:schemeClr val="accent1">
+                    <a:lumMod val="50000"/>
+                  </a:schemeClr>
+                </a:solidFill>
+              </a:rPr>
+              <a:t> the data?</a:t>
+            </a:r>
+            <a:br>
+              <a:rPr lang="it-IT" sz="2400" dirty="0">
+                <a:solidFill>
+                  <a:schemeClr val="accent1">
+                    <a:lumMod val="50000"/>
+                  </a:schemeClr>
+                </a:solidFill>
+              </a:rPr>
+            </a:br>
+            <a:r>
+              <a:rPr lang="it-IT" sz="2400" dirty="0" err="1">
+                <a:solidFill>
+                  <a:schemeClr val="accent1">
+                    <a:lumMod val="50000"/>
+                  </a:schemeClr>
+                </a:solidFill>
+              </a:rPr>
+              <a:t>Each</a:t>
+            </a:r>
+            <a:r>
+              <a:rPr lang="it-IT" sz="2400" dirty="0">
+                <a:solidFill>
+                  <a:schemeClr val="accent1">
+                    <a:lumMod val="50000"/>
+                  </a:schemeClr>
+                </a:solidFill>
+              </a:rPr>
+              <a:t> </a:t>
+            </a:r>
+            <a:r>
+              <a:rPr lang="it-IT" sz="2400" dirty="0" err="1">
+                <a:solidFill>
+                  <a:schemeClr val="accent1">
+                    <a:lumMod val="50000"/>
+                  </a:schemeClr>
+                </a:solidFill>
+              </a:rPr>
+              <a:t>node</a:t>
+            </a:r>
+            <a:r>
+              <a:rPr lang="it-IT" sz="2400" dirty="0">
+                <a:solidFill>
+                  <a:schemeClr val="accent1">
+                    <a:lumMod val="50000"/>
+                  </a:schemeClr>
+                </a:solidFill>
+              </a:rPr>
+              <a:t> </a:t>
+            </a:r>
+            <a:r>
+              <a:rPr lang="it-IT" sz="2400" dirty="0" err="1">
+                <a:solidFill>
+                  <a:schemeClr val="accent1">
+                    <a:lumMod val="50000"/>
+                  </a:schemeClr>
+                </a:solidFill>
+              </a:rPr>
+              <a:t>is</a:t>
+            </a:r>
+            <a:r>
+              <a:rPr lang="it-IT" sz="2400" dirty="0">
+                <a:solidFill>
+                  <a:schemeClr val="accent1">
+                    <a:lumMod val="50000"/>
+                  </a:schemeClr>
+                </a:solidFill>
+              </a:rPr>
+              <a:t> </a:t>
+            </a:r>
+            <a:r>
+              <a:rPr lang="it-IT" sz="2400" dirty="0" err="1">
+                <a:solidFill>
+                  <a:schemeClr val="accent1">
+                    <a:lumMod val="50000"/>
+                  </a:schemeClr>
+                </a:solidFill>
+              </a:rPr>
+              <a:t>responsible</a:t>
+            </a:r>
+            <a:r>
+              <a:rPr lang="it-IT" sz="2400" dirty="0">
+                <a:solidFill>
+                  <a:schemeClr val="accent1">
+                    <a:lumMod val="50000"/>
+                  </a:schemeClr>
+                </a:solidFill>
+              </a:rPr>
+              <a:t> for a range of data: token range</a:t>
+            </a:r>
+          </a:p>
+          <a:p>
+            <a:pPr>
+              <a:buFont typeface="Tw Cen MT" panose="020B0602020104020603" pitchFamily="34" charset="0"/>
+              <a:buChar char="-"/>
+            </a:pPr>
+            <a:r>
+              <a:rPr lang="it-IT" dirty="0"/>
+              <a:t> </a:t>
+            </a:r>
+            <a:r>
+              <a:rPr lang="it-IT" dirty="0" err="1"/>
+              <a:t>Then</a:t>
+            </a:r>
+            <a:r>
+              <a:rPr lang="it-IT" dirty="0"/>
+              <a:t> </a:t>
+            </a:r>
+            <a:r>
+              <a:rPr lang="it-IT" dirty="0" err="1"/>
+              <a:t>when</a:t>
+            </a:r>
+            <a:r>
+              <a:rPr lang="it-IT" dirty="0"/>
+              <a:t> the data </a:t>
+            </a:r>
+            <a:r>
+              <a:rPr lang="it-IT" dirty="0" err="1"/>
+              <a:t>is</a:t>
+            </a:r>
+            <a:r>
+              <a:rPr lang="it-IT" dirty="0"/>
+              <a:t> </a:t>
+            </a:r>
+            <a:r>
+              <a:rPr lang="it-IT" dirty="0" err="1"/>
+              <a:t>sended</a:t>
+            </a:r>
+            <a:r>
+              <a:rPr lang="it-IT" dirty="0"/>
+              <a:t>, the coordinator </a:t>
+            </a:r>
+            <a:r>
+              <a:rPr lang="it-IT" dirty="0" err="1"/>
+              <a:t>sends</a:t>
+            </a:r>
+            <a:r>
+              <a:rPr lang="it-IT" dirty="0"/>
+              <a:t> an </a:t>
+            </a:r>
+            <a:r>
+              <a:rPr lang="it-IT" dirty="0" err="1"/>
+              <a:t>acknowledge</a:t>
+            </a:r>
+            <a:r>
+              <a:rPr lang="it-IT" dirty="0"/>
+              <a:t> to the client</a:t>
+            </a:r>
+            <a:endParaRPr lang="it-IT" dirty="0">
+              <a:solidFill>
+                <a:schemeClr val="accent1">
+                  <a:lumMod val="50000"/>
+                </a:schemeClr>
+              </a:solidFill>
+            </a:endParaRPr>
+          </a:p>
+          <a:p>
+            <a:endParaRPr lang="it-IT" dirty="0"/>
+          </a:p>
+        </p:txBody>
+      </p:sp>
+      <p:pic>
+        <p:nvPicPr>
+          <p:cNvPr id="5" name="Immagine 4">
+            <a:extLst>
+              <a:ext uri="{FF2B5EF4-FFF2-40B4-BE49-F238E27FC236}">
+                <a16:creationId xmlns:a16="http://schemas.microsoft.com/office/drawing/2014/main" id="{C1B8ADFB-EA9E-4D79-A443-F51FDF3FF78A}"/>
+              </a:ext>
+            </a:extLst>
+          </p:cNvPr>
+          <p:cNvPicPr>
+            <a:picLocks noChangeAspect="1"/>
+          </p:cNvPicPr>
+          <p:nvPr/>
+        </p:nvPicPr>
+        <p:blipFill>
+          <a:blip r:embed="rId2"/>
+          <a:stretch>
+            <a:fillRect/>
+          </a:stretch>
+        </p:blipFill>
+        <p:spPr>
+          <a:xfrm>
+            <a:off x="8178573" y="2102588"/>
+            <a:ext cx="3544726" cy="3619424"/>
+          </a:xfrm>
+          <a:prstGeom prst="rect">
+            <a:avLst/>
+          </a:prstGeom>
+        </p:spPr>
+      </p:pic>
+      <p:cxnSp>
+        <p:nvCxnSpPr>
+          <p:cNvPr id="9" name="Connettore 2 8">
+            <a:extLst>
+              <a:ext uri="{FF2B5EF4-FFF2-40B4-BE49-F238E27FC236}">
+                <a16:creationId xmlns:a16="http://schemas.microsoft.com/office/drawing/2014/main" id="{6702D93F-CC1E-4685-8C76-5FD69B489822}"/>
+              </a:ext>
+            </a:extLst>
+          </p:cNvPr>
+          <p:cNvCxnSpPr>
+            <a:cxnSpLocks/>
+          </p:cNvCxnSpPr>
+          <p:nvPr/>
+        </p:nvCxnSpPr>
+        <p:spPr>
+          <a:xfrm>
+            <a:off x="8707120" y="2056782"/>
+            <a:ext cx="327578" cy="930258"/>
+          </a:xfrm>
+          <a:prstGeom prst="straightConnector1">
+            <a:avLst/>
+          </a:prstGeom>
+          <a:ln w="57150">
+            <a:tailEnd type="triangle"/>
+          </a:ln>
+        </p:spPr>
+        <p:style>
+          <a:lnRef idx="1">
+            <a:schemeClr val="dk1"/>
+          </a:lnRef>
+          <a:fillRef idx="0">
+            <a:schemeClr val="dk1"/>
+          </a:fillRef>
+          <a:effectRef idx="0">
+            <a:schemeClr val="dk1"/>
+          </a:effectRef>
+          <a:fontRef idx="minor">
+            <a:schemeClr val="tx1"/>
+          </a:fontRef>
+        </p:style>
+      </p:cxnSp>
+      <p:pic>
+        <p:nvPicPr>
+          <p:cNvPr id="26" name="Immagine 25">
+            <a:extLst>
+              <a:ext uri="{FF2B5EF4-FFF2-40B4-BE49-F238E27FC236}">
+                <a16:creationId xmlns:a16="http://schemas.microsoft.com/office/drawing/2014/main" id="{F97178DB-BC50-48C8-B415-02D9EE9E0114}"/>
+              </a:ext>
+            </a:extLst>
+          </p:cNvPr>
+          <p:cNvPicPr>
+            <a:picLocks noChangeAspect="1"/>
+          </p:cNvPicPr>
+          <p:nvPr/>
+        </p:nvPicPr>
+        <p:blipFill>
+          <a:blip r:embed="rId3"/>
+          <a:stretch>
+            <a:fillRect/>
+          </a:stretch>
+        </p:blipFill>
+        <p:spPr>
+          <a:xfrm>
+            <a:off x="8230203" y="2199021"/>
+            <a:ext cx="3544726" cy="3496823"/>
+          </a:xfrm>
+          <a:prstGeom prst="rect">
+            <a:avLst/>
+          </a:prstGeom>
+        </p:spPr>
+      </p:pic>
+      <p:sp>
+        <p:nvSpPr>
+          <p:cNvPr id="6" name="Rettangolo 5">
+            <a:extLst>
+              <a:ext uri="{FF2B5EF4-FFF2-40B4-BE49-F238E27FC236}">
+                <a16:creationId xmlns:a16="http://schemas.microsoft.com/office/drawing/2014/main" id="{C7BBAEC8-0326-4AE1-A766-E7646A2DF745}"/>
+              </a:ext>
+            </a:extLst>
+          </p:cNvPr>
+          <p:cNvSpPr/>
+          <p:nvPr/>
+        </p:nvSpPr>
+        <p:spPr>
+          <a:xfrm>
+            <a:off x="7804508" y="1783120"/>
+            <a:ext cx="1575019" cy="454112"/>
+          </a:xfrm>
+          <a:prstGeom prst="rect">
+            <a:avLst/>
+          </a:prstGeom>
+          <a:solidFill>
+            <a:srgbClr val="7030A0"/>
+          </a:solidFill>
+          <a:ln>
+            <a:solidFill>
+              <a:srgbClr val="7030A0"/>
+            </a:solidFill>
+          </a:ln>
+        </p:spPr>
+        <p:style>
+          <a:lnRef idx="2">
+            <a:schemeClr val="accent2">
+              <a:shade val="50000"/>
+            </a:schemeClr>
+          </a:lnRef>
+          <a:fillRef idx="1">
+            <a:schemeClr val="accent2"/>
+          </a:fillRef>
+          <a:effectRef idx="0">
+            <a:schemeClr val="accent2"/>
+          </a:effectRef>
+          <a:fontRef idx="minor">
+            <a:schemeClr val="lt1"/>
+          </a:fontRef>
+        </p:style>
+        <p:txBody>
+          <a:bodyPr rtlCol="0" anchor="ctr"/>
+          <a:lstStyle/>
+          <a:p>
+            <a:pPr algn="ctr"/>
+            <a:r>
+              <a:rPr lang="it-IT" dirty="0"/>
+              <a:t>59 (data)</a:t>
+            </a:r>
+          </a:p>
+        </p:txBody>
+      </p:sp>
+      <p:cxnSp>
+        <p:nvCxnSpPr>
+          <p:cNvPr id="18" name="Connettore 2 17">
+            <a:extLst>
+              <a:ext uri="{FF2B5EF4-FFF2-40B4-BE49-F238E27FC236}">
+                <a16:creationId xmlns:a16="http://schemas.microsoft.com/office/drawing/2014/main" id="{FDDF2890-AB50-4C71-BF6A-A11B29CA2FD8}"/>
+              </a:ext>
+            </a:extLst>
+          </p:cNvPr>
+          <p:cNvCxnSpPr>
+            <a:cxnSpLocks/>
+          </p:cNvCxnSpPr>
+          <p:nvPr/>
+        </p:nvCxnSpPr>
+        <p:spPr>
+          <a:xfrm flipH="1">
+            <a:off x="9008578" y="3310572"/>
+            <a:ext cx="26120" cy="1372587"/>
+          </a:xfrm>
+          <a:prstGeom prst="straightConnector1">
+            <a:avLst/>
+          </a:prstGeom>
+          <a:ln w="57150">
+            <a:tailEnd type="triangle"/>
+          </a:ln>
+        </p:spPr>
+        <p:style>
+          <a:lnRef idx="1">
+            <a:schemeClr val="dk1"/>
+          </a:lnRef>
+          <a:fillRef idx="0">
+            <a:schemeClr val="dk1"/>
+          </a:fillRef>
+          <a:effectRef idx="0">
+            <a:schemeClr val="dk1"/>
+          </a:effectRef>
+          <a:fontRef idx="minor">
+            <a:schemeClr val="tx1"/>
+          </a:fontRef>
+        </p:style>
+      </p:cxnSp>
+    </p:spTree>
+    <p:extLst>
+      <p:ext uri="{BB962C8B-B14F-4D97-AF65-F5344CB8AC3E}">
+        <p14:creationId xmlns:p14="http://schemas.microsoft.com/office/powerpoint/2010/main" val="2926037492"/>
+      </p:ext>
+    </p:extLst>
+  </p:cSld>
+  <p:clrMapOvr>
+    <a:masterClrMapping/>
+  </p:clrMapOvr>
+  <p:timing>
+    <p:tnLst>
+      <p:par>
+        <p:cTn id="1" dur="indefinite" restart="never" nodeType="tmRoot">
+          <p:childTnLst>
+            <p:seq concurrent="1" nextAc="seek">
+              <p:cTn id="2" dur="indefinite" nodeType="mainSeq">
+                <p:childTnLst>
+                  <p:par>
+                    <p:cTn id="3" fill="hold">
+                      <p:stCondLst>
+                        <p:cond delay="indefinite"/>
+                      </p:stCondLst>
+                      <p:childTnLst>
+                        <p:par>
+                          <p:cTn id="4" fill="hold">
+                            <p:stCondLst>
+                              <p:cond delay="0"/>
+                            </p:stCondLst>
+                            <p:childTnLst>
+                              <p:par>
+                                <p:cTn id="5" presetID="42" presetClass="path" presetSubtype="0" accel="50000" decel="50000" fill="hold" grpId="2" nodeType="clickEffect">
+                                  <p:stCondLst>
+                                    <p:cond delay="0"/>
+                                  </p:stCondLst>
+                                  <p:childTnLst>
+                                    <p:animMotion origin="layout" path="M 2.70833E-6 1.48148E-6 L 0.03633 0.14097 " pathEditMode="fixed" rAng="0" ptsTypes="AA">
+                                      <p:cBhvr>
+                                        <p:cTn id="6" dur="2000" fill="hold"/>
+                                        <p:tgtEl>
+                                          <p:spTgt spid="6"/>
+                                        </p:tgtEl>
+                                        <p:attrNameLst>
+                                          <p:attrName>ppt_x</p:attrName>
+                                          <p:attrName>ppt_y</p:attrName>
+                                        </p:attrNameLst>
+                                      </p:cBhvr>
+                                      <p:rCtr x="2135" y="7338"/>
+                                    </p:animMotion>
+                                  </p:childTnLst>
+                                </p:cTn>
+                              </p:par>
+                              <p:par>
+                                <p:cTn id="7" presetID="10" presetClass="exit" presetSubtype="0" fill="hold" nodeType="withEffect">
+                                  <p:stCondLst>
+                                    <p:cond delay="500"/>
+                                  </p:stCondLst>
+                                  <p:childTnLst>
+                                    <p:animEffect transition="out" filter="fade">
+                                      <p:cBhvr>
+                                        <p:cTn id="8" dur="500"/>
+                                        <p:tgtEl>
+                                          <p:spTgt spid="9"/>
+                                        </p:tgtEl>
+                                      </p:cBhvr>
+                                    </p:animEffect>
+                                    <p:set>
+                                      <p:cBhvr>
+                                        <p:cTn id="9" dur="1" fill="hold">
+                                          <p:stCondLst>
+                                            <p:cond delay="499"/>
+                                          </p:stCondLst>
+                                        </p:cTn>
+                                        <p:tgtEl>
+                                          <p:spTgt spid="9"/>
+                                        </p:tgtEl>
+                                        <p:attrNameLst>
+                                          <p:attrName>style.visibility</p:attrName>
+                                        </p:attrNameLst>
+                                      </p:cBhvr>
+                                      <p:to>
+                                        <p:strVal val="hidden"/>
+                                      </p:to>
+                                    </p:set>
+                                  </p:childTnLst>
+                                </p:cTn>
+                              </p:par>
+                            </p:childTnLst>
+                          </p:cTn>
+                        </p:par>
+                      </p:childTnLst>
+                    </p:cTn>
+                  </p:par>
+                  <p:par>
+                    <p:cTn id="10" fill="hold">
+                      <p:stCondLst>
+                        <p:cond delay="indefinite"/>
+                      </p:stCondLst>
+                      <p:childTnLst>
+                        <p:par>
+                          <p:cTn id="11" fill="hold">
+                            <p:stCondLst>
+                              <p:cond delay="0"/>
+                            </p:stCondLst>
+                            <p:childTnLst>
+                              <p:par>
+                                <p:cTn id="12" presetID="10" presetClass="entr" presetSubtype="0" fill="hold" nodeType="clickEffect">
+                                  <p:stCondLst>
+                                    <p:cond delay="0"/>
+                                  </p:stCondLst>
+                                  <p:childTnLst>
+                                    <p:set>
+                                      <p:cBhvr>
+                                        <p:cTn id="13" dur="1" fill="hold">
+                                          <p:stCondLst>
+                                            <p:cond delay="0"/>
+                                          </p:stCondLst>
+                                        </p:cTn>
+                                        <p:tgtEl>
+                                          <p:spTgt spid="26"/>
+                                        </p:tgtEl>
+                                        <p:attrNameLst>
+                                          <p:attrName>style.visibility</p:attrName>
+                                        </p:attrNameLst>
+                                      </p:cBhvr>
+                                      <p:to>
+                                        <p:strVal val="visible"/>
+                                      </p:to>
+                                    </p:set>
+                                    <p:animEffect transition="in" filter="fade">
+                                      <p:cBhvr>
+                                        <p:cTn id="14" dur="500"/>
+                                        <p:tgtEl>
+                                          <p:spTgt spid="26"/>
+                                        </p:tgtEl>
+                                      </p:cBhvr>
+                                    </p:animEffect>
+                                  </p:childTnLst>
+                                </p:cTn>
+                              </p:par>
+                              <p:par>
+                                <p:cTn id="15" presetID="47" presetClass="entr" presetSubtype="0" fill="hold" nodeType="withEffect">
+                                  <p:stCondLst>
+                                    <p:cond delay="0"/>
+                                  </p:stCondLst>
+                                  <p:childTnLst>
+                                    <p:set>
+                                      <p:cBhvr>
+                                        <p:cTn id="16" dur="1" fill="hold">
+                                          <p:stCondLst>
+                                            <p:cond delay="0"/>
+                                          </p:stCondLst>
+                                        </p:cTn>
+                                        <p:tgtEl>
+                                          <p:spTgt spid="18"/>
+                                        </p:tgtEl>
+                                        <p:attrNameLst>
+                                          <p:attrName>style.visibility</p:attrName>
+                                        </p:attrNameLst>
+                                      </p:cBhvr>
+                                      <p:to>
+                                        <p:strVal val="visible"/>
+                                      </p:to>
+                                    </p:set>
+                                    <p:animEffect transition="in" filter="fade">
+                                      <p:cBhvr>
+                                        <p:cTn id="17" dur="1000"/>
+                                        <p:tgtEl>
+                                          <p:spTgt spid="18"/>
+                                        </p:tgtEl>
+                                      </p:cBhvr>
+                                    </p:animEffect>
+                                    <p:anim calcmode="lin" valueType="num">
+                                      <p:cBhvr>
+                                        <p:cTn id="18" dur="1000" fill="hold"/>
+                                        <p:tgtEl>
+                                          <p:spTgt spid="18"/>
+                                        </p:tgtEl>
+                                        <p:attrNameLst>
+                                          <p:attrName>ppt_x</p:attrName>
+                                        </p:attrNameLst>
+                                      </p:cBhvr>
+                                      <p:tavLst>
+                                        <p:tav tm="0">
+                                          <p:val>
+                                            <p:strVal val="#ppt_x"/>
+                                          </p:val>
+                                        </p:tav>
+                                        <p:tav tm="100000">
+                                          <p:val>
+                                            <p:strVal val="#ppt_x"/>
+                                          </p:val>
+                                        </p:tav>
+                                      </p:tavLst>
+                                    </p:anim>
+                                    <p:anim calcmode="lin" valueType="num">
+                                      <p:cBhvr>
+                                        <p:cTn id="19" dur="1000" fill="hold"/>
+                                        <p:tgtEl>
+                                          <p:spTgt spid="18"/>
+                                        </p:tgtEl>
+                                        <p:attrNameLst>
+                                          <p:attrName>ppt_y</p:attrName>
+                                        </p:attrNameLst>
+                                      </p:cBhvr>
+                                      <p:tavLst>
+                                        <p:tav tm="0">
+                                          <p:val>
+                                            <p:strVal val="#ppt_y-.1"/>
+                                          </p:val>
+                                        </p:tav>
+                                        <p:tav tm="100000">
+                                          <p:val>
+                                            <p:strVal val="#ppt_y"/>
+                                          </p:val>
+                                        </p:tav>
+                                      </p:tavLst>
+                                    </p:anim>
+                                  </p:childTnLst>
+                                </p:cTn>
+                              </p:par>
+                            </p:childTnLst>
+                          </p:cTn>
+                        </p:par>
+                      </p:childTnLst>
+                    </p:cTn>
+                  </p:par>
+                  <p:par>
+                    <p:cTn id="20" fill="hold">
+                      <p:stCondLst>
+                        <p:cond delay="indefinite"/>
+                      </p:stCondLst>
+                      <p:childTnLst>
+                        <p:par>
+                          <p:cTn id="21" fill="hold">
+                            <p:stCondLst>
+                              <p:cond delay="0"/>
+                            </p:stCondLst>
+                            <p:childTnLst>
+                              <p:par>
+                                <p:cTn id="22" presetID="42" presetClass="path" presetSubtype="0" accel="50000" decel="50000" fill="hold" grpId="3" nodeType="clickEffect">
+                                  <p:stCondLst>
+                                    <p:cond delay="400"/>
+                                  </p:stCondLst>
+                                  <p:childTnLst>
+                                    <p:animMotion origin="layout" path="M 0.02812 0.14166 L 0.02812 0.39166 " pathEditMode="relative" rAng="0" ptsTypes="AA">
+                                      <p:cBhvr>
+                                        <p:cTn id="23" dur="2000" fill="hold"/>
+                                        <p:tgtEl>
+                                          <p:spTgt spid="6"/>
+                                        </p:tgtEl>
+                                        <p:attrNameLst>
+                                          <p:attrName>ppt_x</p:attrName>
+                                          <p:attrName>ppt_y</p:attrName>
+                                        </p:attrNameLst>
+                                      </p:cBhvr>
+                                      <p:rCtr x="0" y="12500"/>
+                                    </p:animMotion>
+                                  </p:childTnLst>
+                                </p:cTn>
+                              </p:par>
+                              <p:par>
+                                <p:cTn id="24" presetID="10" presetClass="exit" presetSubtype="0" fill="hold" nodeType="withEffect">
+                                  <p:stCondLst>
+                                    <p:cond delay="400"/>
+                                  </p:stCondLst>
+                                  <p:childTnLst>
+                                    <p:animEffect transition="out" filter="fade">
+                                      <p:cBhvr>
+                                        <p:cTn id="25" dur="500"/>
+                                        <p:tgtEl>
+                                          <p:spTgt spid="18"/>
+                                        </p:tgtEl>
+                                      </p:cBhvr>
+                                    </p:animEffect>
+                                    <p:set>
+                                      <p:cBhvr>
+                                        <p:cTn id="26" dur="1" fill="hold">
+                                          <p:stCondLst>
+                                            <p:cond delay="499"/>
+                                          </p:stCondLst>
+                                        </p:cTn>
+                                        <p:tgtEl>
+                                          <p:spTgt spid="18"/>
+                                        </p:tgtEl>
+                                        <p:attrNameLst>
+                                          <p:attrName>style.visibility</p:attrName>
+                                        </p:attrNameLst>
+                                      </p:cBhvr>
+                                      <p:to>
+                                        <p:strVal val="hidden"/>
+                                      </p:to>
+                                    </p:set>
+                                  </p:childTnLst>
+                                </p:cTn>
+                              </p:par>
+                            </p:childTnLst>
+                          </p:cTn>
+                        </p:par>
+                      </p:childTnLst>
+                    </p:cTn>
+                  </p:par>
+                </p:childTnLst>
+              </p:cTn>
+              <p:prevCondLst>
+                <p:cond evt="onPrev" delay="0">
+                  <p:tgtEl>
+                    <p:sldTgt/>
+                  </p:tgtEl>
+                </p:cond>
+              </p:prevCondLst>
+              <p:nextCondLst>
+                <p:cond evt="onNext" delay="0">
+                  <p:tgtEl>
+                    <p:sldTgt/>
+                  </p:tgtEl>
+                </p:cond>
+              </p:nextCondLst>
+            </p:seq>
+          </p:childTnLst>
+        </p:cTn>
+      </p:par>
+    </p:tnLst>
+    <p:bldLst>
+      <p:bldP spid="6" grpId="2" animBg="1"/>
+      <p:bldP spid="6" grpId="3" animBg="1"/>
+    </p:bldLst>
+  </p:timing>
+</p:sld>
+</file>
+
+<file path=ppt/slides/slide11.xml><?xml version="1.0" encoding="utf-8"?>
+<p:sld xmlns:a="http://schemas.openxmlformats.org/drawingml/2006/main" xmlns:r="http://schemas.openxmlformats.org/officeDocument/2006/relationships" xmlns:p="http://schemas.openxmlformats.org/presentationml/2006/main">
+  <p:cSld>
+    <p:spTree>
+      <p:nvGrpSpPr>
+        <p:cNvPr id="1" name=""/>
+        <p:cNvGrpSpPr/>
+        <p:nvPr/>
+      </p:nvGrpSpPr>
+      <p:grpSpPr>
+        <a:xfrm>
+          <a:off x="0" y="0"/>
+          <a:ext cx="0" cy="0"/>
+          <a:chOff x="0" y="0"/>
+          <a:chExt cx="0" cy="0"/>
+        </a:xfrm>
+      </p:grpSpPr>
+      <p:sp>
+        <p:nvSpPr>
+          <p:cNvPr id="2" name="Titolo 1">
+            <a:extLst>
+              <a:ext uri="{FF2B5EF4-FFF2-40B4-BE49-F238E27FC236}">
+                <a16:creationId xmlns:a16="http://schemas.microsoft.com/office/drawing/2014/main" id="{7CBD922C-1CD5-432D-BDEB-260EE9A171F8}"/>
+              </a:ext>
+            </a:extLst>
+          </p:cNvPr>
+          <p:cNvSpPr>
+            <a:spLocks noGrp="1"/>
+          </p:cNvSpPr>
+          <p:nvPr>
+            <p:ph type="title"/>
+          </p:nvPr>
+        </p:nvSpPr>
+        <p:spPr/>
+        <p:txBody>
+          <a:bodyPr/>
+          <a:lstStyle/>
+          <a:p>
+            <a:endParaRPr lang="it-IT"/>
+          </a:p>
+        </p:txBody>
+      </p:sp>
+      <p:sp>
+        <p:nvSpPr>
+          <p:cNvPr id="3" name="Segnaposto contenuto 2">
+            <a:extLst>
+              <a:ext uri="{FF2B5EF4-FFF2-40B4-BE49-F238E27FC236}">
+                <a16:creationId xmlns:a16="http://schemas.microsoft.com/office/drawing/2014/main" id="{6956008E-FE44-4225-A225-BDC583AF1A7E}"/>
+              </a:ext>
+            </a:extLst>
+          </p:cNvPr>
+          <p:cNvSpPr>
+            <a:spLocks noGrp="1"/>
+          </p:cNvSpPr>
+          <p:nvPr>
+            <p:ph idx="1"/>
+          </p:nvPr>
+        </p:nvSpPr>
+        <p:spPr/>
+        <p:txBody>
+          <a:bodyPr/>
+          <a:lstStyle/>
+          <a:p>
+            <a:endParaRPr lang="it-IT"/>
+          </a:p>
+        </p:txBody>
+      </p:sp>
+    </p:spTree>
+    <p:extLst>
+      <p:ext uri="{BB962C8B-B14F-4D97-AF65-F5344CB8AC3E}">
+        <p14:creationId xmlns:p14="http://schemas.microsoft.com/office/powerpoint/2010/main" val="553954089"/>
+      </p:ext>
+    </p:extLst>
+  </p:cSld>
+  <p:clrMapOvr>
+    <a:masterClrMapping/>
+  </p:clrMapOvr>
+</p:sld>
+</file>
+
+<file path=ppt/slides/slide12.xml><?xml version="1.0" encoding="utf-8"?>
+<p:sld xmlns:a="http://schemas.openxmlformats.org/drawingml/2006/main" xmlns:r="http://schemas.openxmlformats.org/officeDocument/2006/relationships" xmlns:p="http://schemas.openxmlformats.org/presentationml/2006/main">
+  <p:cSld>
+    <p:spTree>
+      <p:nvGrpSpPr>
+        <p:cNvPr id="1" name=""/>
+        <p:cNvGrpSpPr/>
+        <p:nvPr/>
+      </p:nvGrpSpPr>
+      <p:grpSpPr>
+        <a:xfrm>
+          <a:off x="0" y="0"/>
+          <a:ext cx="0" cy="0"/>
+          <a:chOff x="0" y="0"/>
+          <a:chExt cx="0" cy="0"/>
+        </a:xfrm>
+      </p:grpSpPr>
+      <p:sp>
+        <p:nvSpPr>
+          <p:cNvPr id="2" name="Titolo 1">
+            <a:extLst>
+              <a:ext uri="{FF2B5EF4-FFF2-40B4-BE49-F238E27FC236}">
+                <a16:creationId xmlns:a16="http://schemas.microsoft.com/office/drawing/2014/main" id="{3469250C-3DD8-435A-B2B7-B06BE4469B7D}"/>
+              </a:ext>
+            </a:extLst>
+          </p:cNvPr>
+          <p:cNvSpPr>
+            <a:spLocks noGrp="1"/>
+          </p:cNvSpPr>
+          <p:nvPr>
+            <p:ph type="title"/>
+          </p:nvPr>
+        </p:nvSpPr>
+        <p:spPr/>
+        <p:txBody>
+          <a:bodyPr/>
+          <a:lstStyle/>
+          <a:p>
+            <a:r>
+              <a:rPr lang="it-IT" dirty="0"/>
+              <a:t>CQL?</a:t>
+            </a:r>
+          </a:p>
+        </p:txBody>
+      </p:sp>
+      <p:sp>
+        <p:nvSpPr>
+          <p:cNvPr id="3" name="Segnaposto contenuto 2">
+            <a:extLst>
+              <a:ext uri="{FF2B5EF4-FFF2-40B4-BE49-F238E27FC236}">
+                <a16:creationId xmlns:a16="http://schemas.microsoft.com/office/drawing/2014/main" id="{E452F0C2-AF2E-4301-A769-36C1C8771E61}"/>
+              </a:ext>
+            </a:extLst>
+          </p:cNvPr>
+          <p:cNvSpPr>
+            <a:spLocks noGrp="1"/>
+          </p:cNvSpPr>
+          <p:nvPr>
+            <p:ph idx="1"/>
+          </p:nvPr>
+        </p:nvSpPr>
+        <p:spPr/>
+        <p:txBody>
+          <a:bodyPr/>
+          <a:lstStyle/>
+          <a:p>
+            <a:endParaRPr lang="it-IT"/>
+          </a:p>
+        </p:txBody>
+      </p:sp>
+    </p:spTree>
+    <p:extLst>
+      <p:ext uri="{BB962C8B-B14F-4D97-AF65-F5344CB8AC3E}">
+        <p14:creationId xmlns:p14="http://schemas.microsoft.com/office/powerpoint/2010/main" val="582997599"/>
+      </p:ext>
+    </p:extLst>
+  </p:cSld>
+  <p:clrMapOvr>
+    <a:masterClrMapping/>
+  </p:clrMapOvr>
+</p:sld>
+</file>
+
+<file path=ppt/slides/slide13.xml><?xml version="1.0" encoding="utf-8"?>
+<p:sld xmlns:a="http://schemas.openxmlformats.org/drawingml/2006/main" xmlns:r="http://schemas.openxmlformats.org/officeDocument/2006/relationships" xmlns:p="http://schemas.openxmlformats.org/presentationml/2006/main">
+  <p:cSld>
+    <p:spTree>
+      <p:nvGrpSpPr>
+        <p:cNvPr id="1" name=""/>
+        <p:cNvGrpSpPr/>
+        <p:nvPr/>
+      </p:nvGrpSpPr>
+      <p:grpSpPr>
+        <a:xfrm>
+          <a:off x="0" y="0"/>
+          <a:ext cx="0" cy="0"/>
+          <a:chOff x="0" y="0"/>
+          <a:chExt cx="0" cy="0"/>
+        </a:xfrm>
+      </p:grpSpPr>
+      <p:sp>
+        <p:nvSpPr>
+          <p:cNvPr id="2" name="Titolo 1">
+            <a:extLst>
+              <a:ext uri="{FF2B5EF4-FFF2-40B4-BE49-F238E27FC236}">
                 <a16:creationId xmlns:a16="http://schemas.microsoft.com/office/drawing/2014/main" id="{97018901-6B11-41AD-B4E4-DF010F9868C3}"/>
               </a:ext>
             </a:extLst>
@@ -4690,7 +5927,7 @@
 </p:sld>
 </file>
 
-<file path=ppt/slides/slide11.xml><?xml version="1.0" encoding="utf-8"?>
+<file path=ppt/slides/slide14.xml><?xml version="1.0" encoding="utf-8"?>
 <p:sld xmlns:a="http://schemas.openxmlformats.org/drawingml/2006/main" xmlns:r="http://schemas.openxmlformats.org/officeDocument/2006/relationships" xmlns:p="http://schemas.openxmlformats.org/presentationml/2006/main">
   <p:cSld>
     <p:spTree>
@@ -5477,7 +6714,7 @@
 </p:sld>
 </file>
 
-<file path=ppt/slides/slide12.xml><?xml version="1.0" encoding="utf-8"?>
+<file path=ppt/slides/slide15.xml><?xml version="1.0" encoding="utf-8"?>
 <p:sld xmlns:a="http://schemas.openxmlformats.org/drawingml/2006/main" xmlns:r="http://schemas.openxmlformats.org/officeDocument/2006/relationships" xmlns:p="http://schemas.openxmlformats.org/presentationml/2006/main">
   <p:cSld>
     <p:bg>
@@ -6334,7 +7571,7 @@
 </p:sld>
 </file>
 
-<file path=ppt/slides/slide13.xml><?xml version="1.0" encoding="utf-8"?>
+<file path=ppt/slides/slide16.xml><?xml version="1.0" encoding="utf-8"?>
 <p:sld xmlns:a="http://schemas.openxmlformats.org/drawingml/2006/main" xmlns:r="http://schemas.openxmlformats.org/officeDocument/2006/relationships" xmlns:p="http://schemas.openxmlformats.org/presentationml/2006/main">
   <p:cSld>
     <p:spTree>
@@ -7012,7 +8249,7 @@
 </p:sld>
 </file>
 
-<file path=ppt/slides/slide14.xml><?xml version="1.0" encoding="utf-8"?>
+<file path=ppt/slides/slide17.xml><?xml version="1.0" encoding="utf-8"?>
 <p:sld xmlns:a="http://schemas.openxmlformats.org/drawingml/2006/main" xmlns:r="http://schemas.openxmlformats.org/officeDocument/2006/relationships" xmlns:p="http://schemas.openxmlformats.org/presentationml/2006/main">
   <p:cSld>
     <p:spTree>
@@ -7070,66 +8307,6 @@
           </a:p>
         </p:txBody>
       </p:sp>
-      <p:pic>
-        <p:nvPicPr>
-          <p:cNvPr id="7" name="Immagine 6">
-            <a:extLst>
-              <a:ext uri="{FF2B5EF4-FFF2-40B4-BE49-F238E27FC236}">
-                <a16:creationId xmlns:a16="http://schemas.microsoft.com/office/drawing/2014/main" id="{2FDD20CB-3B88-44B0-9C3B-AA1721935B27}"/>
-              </a:ext>
-            </a:extLst>
-          </p:cNvPr>
-          <p:cNvPicPr>
-            <a:picLocks noChangeAspect="1"/>
-          </p:cNvPicPr>
-          <p:nvPr/>
-        </p:nvPicPr>
-        <p:blipFill>
-          <a:blip r:embed="rId2"/>
-          <a:stretch>
-            <a:fillRect/>
-          </a:stretch>
-        </p:blipFill>
-        <p:spPr>
-          <a:xfrm>
-            <a:off x="6858196" y="2296201"/>
-            <a:ext cx="4608080" cy="2914512"/>
-          </a:xfrm>
-          <a:prstGeom prst="rect">
-            <a:avLst/>
-          </a:prstGeom>
-        </p:spPr>
-      </p:pic>
-      <p:pic>
-        <p:nvPicPr>
-          <p:cNvPr id="8" name="Immagine 7">
-            <a:extLst>
-              <a:ext uri="{FF2B5EF4-FFF2-40B4-BE49-F238E27FC236}">
-                <a16:creationId xmlns:a16="http://schemas.microsoft.com/office/drawing/2014/main" id="{2BA9DCF5-B953-43EE-B593-9D67FE113863}"/>
-              </a:ext>
-            </a:extLst>
-          </p:cNvPr>
-          <p:cNvPicPr>
-            <a:picLocks noChangeAspect="1"/>
-          </p:cNvPicPr>
-          <p:nvPr/>
-        </p:nvPicPr>
-        <p:blipFill>
-          <a:blip r:embed="rId3"/>
-          <a:stretch>
-            <a:fillRect/>
-          </a:stretch>
-        </p:blipFill>
-        <p:spPr>
-          <a:xfrm>
-            <a:off x="7617059" y="1946013"/>
-            <a:ext cx="3090354" cy="358981"/>
-          </a:xfrm>
-          <a:prstGeom prst="rect">
-            <a:avLst/>
-          </a:prstGeom>
-        </p:spPr>
-      </p:pic>
       <p:cxnSp>
         <p:nvCxnSpPr>
           <p:cNvPr id="9" name="Connettore diritto 8">
@@ -7146,8 +8323,8 @@
         </p:nvCxnSpPr>
         <p:spPr>
           <a:xfrm>
-            <a:off x="6096000" y="2263806"/>
-            <a:ext cx="0" cy="4239087"/>
+            <a:off x="6096000" y="1946013"/>
+            <a:ext cx="0" cy="4556880"/>
           </a:xfrm>
           <a:prstGeom prst="line">
             <a:avLst/>
@@ -7168,113 +8345,459 @@
           </a:fontRef>
         </p:style>
       </p:cxnSp>
-      <p:sp>
-        <p:nvSpPr>
-          <p:cNvPr id="10" name="CasellaDiTesto 9">
+      <p:grpSp>
+        <p:nvGrpSpPr>
+          <p:cNvPr id="17" name="Gruppo 16">
             <a:extLst>
               <a:ext uri="{FF2B5EF4-FFF2-40B4-BE49-F238E27FC236}">
-                <a16:creationId xmlns:a16="http://schemas.microsoft.com/office/drawing/2014/main" id="{D125BF54-3B23-402E-841E-C63BEB1582B0}"/>
+                <a16:creationId xmlns:a16="http://schemas.microsoft.com/office/drawing/2014/main" id="{171AC461-394C-4073-824C-72C6B0F22BA2}"/>
               </a:ext>
             </a:extLst>
           </p:cNvPr>
-          <p:cNvSpPr txBox="1"/>
+          <p:cNvGrpSpPr/>
           <p:nvPr/>
-        </p:nvSpPr>
-        <p:spPr>
+        </p:nvGrpSpPr>
+        <p:grpSpPr>
           <a:xfrm>
-            <a:off x="6542321" y="5342569"/>
-            <a:ext cx="5239830" cy="1107996"/>
+            <a:off x="594649" y="1848355"/>
+            <a:ext cx="5239830" cy="4504552"/>
+            <a:chOff x="6542321" y="1946013"/>
+            <a:chExt cx="5239830" cy="4504552"/>
           </a:xfrm>
-          <a:prstGeom prst="rect">
-            <a:avLst/>
-          </a:prstGeom>
-          <a:noFill/>
-        </p:spPr>
-        <p:txBody>
-          <a:bodyPr wrap="square" rtlCol="0">
-            <a:spAutoFit/>
-          </a:bodyPr>
-          <a:lstStyle/>
-          <a:p>
-            <a:r>
-              <a:rPr lang="it-IT" sz="2200" dirty="0"/>
-              <a:t>The </a:t>
-            </a:r>
-            <a:r>
-              <a:rPr lang="it-IT" sz="2200" i="1" dirty="0"/>
-              <a:t>State</a:t>
-            </a:r>
-            <a:r>
-              <a:rPr lang="it-IT" sz="2200" dirty="0"/>
-              <a:t> </a:t>
-            </a:r>
-            <a:r>
-              <a:rPr lang="it-IT" sz="2200" dirty="0" err="1"/>
-              <a:t>is</a:t>
-            </a:r>
-            <a:r>
-              <a:rPr lang="it-IT" sz="2200" dirty="0"/>
-              <a:t> the </a:t>
-            </a:r>
-            <a:r>
-              <a:rPr lang="it-IT" sz="2200" dirty="0" err="1"/>
-              <a:t>partition</a:t>
-            </a:r>
-            <a:r>
-              <a:rPr lang="it-IT" sz="2200" dirty="0"/>
-              <a:t> key, the </a:t>
-            </a:r>
-            <a:r>
-              <a:rPr lang="it-IT" sz="2200" i="1" dirty="0"/>
-              <a:t>City</a:t>
-            </a:r>
-            <a:r>
-              <a:rPr lang="it-IT" sz="2200" dirty="0"/>
-              <a:t> and the </a:t>
-            </a:r>
-            <a:r>
-              <a:rPr lang="it-IT" sz="2200" i="1" dirty="0"/>
-              <a:t>Name</a:t>
-            </a:r>
-            <a:r>
-              <a:rPr lang="it-IT" sz="2200" dirty="0"/>
-              <a:t> are the clustering </a:t>
-            </a:r>
-            <a:r>
-              <a:rPr lang="it-IT" sz="2200" dirty="0" err="1"/>
-              <a:t>columns</a:t>
-            </a:r>
-            <a:r>
-              <a:rPr lang="it-IT" sz="2200" dirty="0"/>
-              <a:t>. First </a:t>
-            </a:r>
-            <a:r>
-              <a:rPr lang="it-IT" sz="2200" dirty="0" err="1"/>
-              <a:t>order</a:t>
-            </a:r>
-            <a:r>
-              <a:rPr lang="it-IT" sz="2200" dirty="0"/>
-              <a:t> by the city and </a:t>
-            </a:r>
-            <a:r>
-              <a:rPr lang="it-IT" sz="2200" dirty="0" err="1"/>
-              <a:t>then</a:t>
-            </a:r>
-            <a:r>
-              <a:rPr lang="it-IT" sz="2200" dirty="0"/>
-              <a:t> </a:t>
-            </a:r>
-            <a:r>
-              <a:rPr lang="it-IT" sz="2200" dirty="0" err="1"/>
-              <a:t>order</a:t>
-            </a:r>
-            <a:r>
-              <a:rPr lang="it-IT" sz="2200" dirty="0"/>
-              <a:t> by the name</a:t>
-            </a:r>
-          </a:p>
-        </p:txBody>
-      </p:sp>
+        </p:grpSpPr>
+        <p:pic>
+          <p:nvPicPr>
+            <p:cNvPr id="7" name="Immagine 6">
+              <a:extLst>
+                <a:ext uri="{FF2B5EF4-FFF2-40B4-BE49-F238E27FC236}">
+                  <a16:creationId xmlns:a16="http://schemas.microsoft.com/office/drawing/2014/main" id="{2FDD20CB-3B88-44B0-9C3B-AA1721935B27}"/>
+                </a:ext>
+              </a:extLst>
+            </p:cNvPr>
+            <p:cNvPicPr>
+              <a:picLocks noChangeAspect="1"/>
+            </p:cNvPicPr>
+            <p:nvPr/>
+          </p:nvPicPr>
+          <p:blipFill>
+            <a:blip r:embed="rId2"/>
+            <a:stretch>
+              <a:fillRect/>
+            </a:stretch>
+          </p:blipFill>
+          <p:spPr>
+            <a:xfrm>
+              <a:off x="6858196" y="2296201"/>
+              <a:ext cx="4608080" cy="2914512"/>
+            </a:xfrm>
+            <a:prstGeom prst="rect">
+              <a:avLst/>
+            </a:prstGeom>
+          </p:spPr>
+        </p:pic>
+        <p:pic>
+          <p:nvPicPr>
+            <p:cNvPr id="8" name="Immagine 7">
+              <a:extLst>
+                <a:ext uri="{FF2B5EF4-FFF2-40B4-BE49-F238E27FC236}">
+                  <a16:creationId xmlns:a16="http://schemas.microsoft.com/office/drawing/2014/main" id="{2BA9DCF5-B953-43EE-B593-9D67FE113863}"/>
+                </a:ext>
+              </a:extLst>
+            </p:cNvPr>
+            <p:cNvPicPr>
+              <a:picLocks noChangeAspect="1"/>
+            </p:cNvPicPr>
+            <p:nvPr/>
+          </p:nvPicPr>
+          <p:blipFill>
+            <a:blip r:embed="rId3"/>
+            <a:stretch>
+              <a:fillRect/>
+            </a:stretch>
+          </p:blipFill>
+          <p:spPr>
+            <a:xfrm>
+              <a:off x="7617059" y="1946013"/>
+              <a:ext cx="3090354" cy="358981"/>
+            </a:xfrm>
+            <a:prstGeom prst="rect">
+              <a:avLst/>
+            </a:prstGeom>
+          </p:spPr>
+        </p:pic>
+        <p:sp>
+          <p:nvSpPr>
+            <p:cNvPr id="10" name="CasellaDiTesto 9">
+              <a:extLst>
+                <a:ext uri="{FF2B5EF4-FFF2-40B4-BE49-F238E27FC236}">
+                  <a16:creationId xmlns:a16="http://schemas.microsoft.com/office/drawing/2014/main" id="{D125BF54-3B23-402E-841E-C63BEB1582B0}"/>
+                </a:ext>
+              </a:extLst>
+            </p:cNvPr>
+            <p:cNvSpPr txBox="1"/>
+            <p:nvPr/>
+          </p:nvSpPr>
+          <p:spPr>
+            <a:xfrm>
+              <a:off x="6542321" y="5342569"/>
+              <a:ext cx="5239830" cy="1107996"/>
+            </a:xfrm>
+            <a:prstGeom prst="rect">
+              <a:avLst/>
+            </a:prstGeom>
+            <a:noFill/>
+          </p:spPr>
+          <p:txBody>
+            <a:bodyPr wrap="square" rtlCol="0">
+              <a:spAutoFit/>
+            </a:bodyPr>
+            <a:lstStyle/>
+            <a:p>
+              <a:r>
+                <a:rPr lang="it-IT" sz="2200" dirty="0"/>
+                <a:t>The </a:t>
+              </a:r>
+              <a:r>
+                <a:rPr lang="it-IT" sz="2200" i="1" dirty="0"/>
+                <a:t>State</a:t>
+              </a:r>
+              <a:r>
+                <a:rPr lang="it-IT" sz="2200" dirty="0"/>
+                <a:t> </a:t>
+              </a:r>
+              <a:r>
+                <a:rPr lang="it-IT" sz="2200" dirty="0" err="1"/>
+                <a:t>is</a:t>
+              </a:r>
+              <a:r>
+                <a:rPr lang="it-IT" sz="2200" dirty="0"/>
+                <a:t> the </a:t>
+              </a:r>
+              <a:r>
+                <a:rPr lang="it-IT" sz="2200" dirty="0" err="1"/>
+                <a:t>partition</a:t>
+              </a:r>
+              <a:r>
+                <a:rPr lang="it-IT" sz="2200" dirty="0"/>
+                <a:t> key, the </a:t>
+              </a:r>
+              <a:r>
+                <a:rPr lang="it-IT" sz="2200" i="1" dirty="0"/>
+                <a:t>City</a:t>
+              </a:r>
+              <a:r>
+                <a:rPr lang="it-IT" sz="2200" dirty="0"/>
+                <a:t> and the </a:t>
+              </a:r>
+              <a:r>
+                <a:rPr lang="it-IT" sz="2200" i="1" dirty="0"/>
+                <a:t>Name</a:t>
+              </a:r>
+              <a:r>
+                <a:rPr lang="it-IT" sz="2200" dirty="0"/>
+                <a:t> are the clustering </a:t>
+              </a:r>
+              <a:r>
+                <a:rPr lang="it-IT" sz="2200" dirty="0" err="1"/>
+                <a:t>columns</a:t>
+              </a:r>
+              <a:r>
+                <a:rPr lang="it-IT" sz="2200" dirty="0"/>
+                <a:t>. First </a:t>
+              </a:r>
+              <a:r>
+                <a:rPr lang="it-IT" sz="2200" dirty="0" err="1"/>
+                <a:t>order</a:t>
+              </a:r>
+              <a:r>
+                <a:rPr lang="it-IT" sz="2200" dirty="0"/>
+                <a:t> by the city and </a:t>
+              </a:r>
+              <a:r>
+                <a:rPr lang="it-IT" sz="2200" dirty="0" err="1"/>
+                <a:t>then</a:t>
+              </a:r>
+              <a:r>
+                <a:rPr lang="it-IT" sz="2200" dirty="0"/>
+                <a:t> </a:t>
+              </a:r>
+              <a:r>
+                <a:rPr lang="it-IT" sz="2200" dirty="0" err="1"/>
+                <a:t>order</a:t>
+              </a:r>
+              <a:r>
+                <a:rPr lang="it-IT" sz="2200" dirty="0"/>
+                <a:t> by the name</a:t>
+              </a:r>
+            </a:p>
+          </p:txBody>
+        </p:sp>
+      </p:grpSp>
+      <p:grpSp>
+        <p:nvGrpSpPr>
+          <p:cNvPr id="16" name="Gruppo 15">
+            <a:extLst>
+              <a:ext uri="{FF2B5EF4-FFF2-40B4-BE49-F238E27FC236}">
+                <a16:creationId xmlns:a16="http://schemas.microsoft.com/office/drawing/2014/main" id="{2BBF77AA-16DB-49C7-AEEA-710605D66174}"/>
+              </a:ext>
+            </a:extLst>
+          </p:cNvPr>
+          <p:cNvGrpSpPr/>
+          <p:nvPr/>
+        </p:nvGrpSpPr>
+        <p:grpSpPr>
+          <a:xfrm>
+            <a:off x="6453872" y="1828010"/>
+            <a:ext cx="5239830" cy="4730082"/>
+            <a:chOff x="569129" y="1934546"/>
+            <a:chExt cx="5239830" cy="4730082"/>
+          </a:xfrm>
+        </p:grpSpPr>
+        <p:pic>
+          <p:nvPicPr>
+            <p:cNvPr id="11" name="Immagine 10">
+              <a:extLst>
+                <a:ext uri="{FF2B5EF4-FFF2-40B4-BE49-F238E27FC236}">
+                  <a16:creationId xmlns:a16="http://schemas.microsoft.com/office/drawing/2014/main" id="{25FAE2D3-C5EC-49E9-9B40-811C4C3A1AC6}"/>
+                </a:ext>
+              </a:extLst>
+            </p:cNvPr>
+            <p:cNvPicPr>
+              <a:picLocks noChangeAspect="1"/>
+            </p:cNvPicPr>
+            <p:nvPr/>
+          </p:nvPicPr>
+          <p:blipFill>
+            <a:blip r:embed="rId4"/>
+            <a:stretch>
+              <a:fillRect/>
+            </a:stretch>
+          </p:blipFill>
+          <p:spPr>
+            <a:xfrm>
+              <a:off x="1042990" y="2345783"/>
+              <a:ext cx="4292109" cy="2864930"/>
+            </a:xfrm>
+            <a:prstGeom prst="rect">
+              <a:avLst/>
+            </a:prstGeom>
+          </p:spPr>
+        </p:pic>
+        <p:pic>
+          <p:nvPicPr>
+            <p:cNvPr id="13" name="Immagine 12">
+              <a:extLst>
+                <a:ext uri="{FF2B5EF4-FFF2-40B4-BE49-F238E27FC236}">
+                  <a16:creationId xmlns:a16="http://schemas.microsoft.com/office/drawing/2014/main" id="{AB7BEC04-01FD-4621-96D3-061E01781FF6}"/>
+                </a:ext>
+              </a:extLst>
+            </p:cNvPr>
+            <p:cNvPicPr>
+              <a:picLocks noChangeAspect="1"/>
+            </p:cNvPicPr>
+            <p:nvPr/>
+          </p:nvPicPr>
+          <p:blipFill>
+            <a:blip r:embed="rId5"/>
+            <a:stretch>
+              <a:fillRect/>
+            </a:stretch>
+          </p:blipFill>
+          <p:spPr>
+            <a:xfrm>
+              <a:off x="1341336" y="1934546"/>
+              <a:ext cx="3695417" cy="369541"/>
+            </a:xfrm>
+            <a:prstGeom prst="rect">
+              <a:avLst/>
+            </a:prstGeom>
+          </p:spPr>
+        </p:pic>
+        <p:sp>
+          <p:nvSpPr>
+            <p:cNvPr id="15" name="CasellaDiTesto 14">
+              <a:extLst>
+                <a:ext uri="{FF2B5EF4-FFF2-40B4-BE49-F238E27FC236}">
+                  <a16:creationId xmlns:a16="http://schemas.microsoft.com/office/drawing/2014/main" id="{9A1F77F1-8F58-4F1D-BEF0-F087D44AB816}"/>
+                </a:ext>
+              </a:extLst>
+            </p:cNvPr>
+            <p:cNvSpPr txBox="1"/>
+            <p:nvPr/>
+          </p:nvSpPr>
+          <p:spPr>
+            <a:xfrm>
+              <a:off x="569129" y="5341189"/>
+              <a:ext cx="5239830" cy="1323439"/>
+            </a:xfrm>
+            <a:prstGeom prst="rect">
+              <a:avLst/>
+            </a:prstGeom>
+            <a:noFill/>
+          </p:spPr>
+          <p:txBody>
+            <a:bodyPr wrap="square" rtlCol="0">
+              <a:spAutoFit/>
+            </a:bodyPr>
+            <a:lstStyle/>
+            <a:p>
+              <a:r>
+                <a:rPr lang="it-IT" sz="2200" dirty="0"/>
+                <a:t>To make a </a:t>
+              </a:r>
+              <a:r>
+                <a:rPr lang="it-IT" sz="2200" dirty="0" err="1"/>
+                <a:t>unique</a:t>
+              </a:r>
+              <a:r>
+                <a:rPr lang="it-IT" sz="2200" dirty="0"/>
+                <a:t> </a:t>
+              </a:r>
+              <a:r>
+                <a:rPr lang="it-IT" sz="2200" dirty="0" err="1"/>
+                <a:t>Primary</a:t>
+              </a:r>
+              <a:r>
+                <a:rPr lang="it-IT" sz="2200" dirty="0"/>
+                <a:t> key </a:t>
+              </a:r>
+              <a:r>
+                <a:rPr lang="it-IT" sz="2200" dirty="0" err="1"/>
+                <a:t>it</a:t>
+              </a:r>
+              <a:r>
+                <a:rPr lang="it-IT" sz="2200" dirty="0"/>
+                <a:t> </a:t>
+              </a:r>
+              <a:r>
+                <a:rPr lang="it-IT" sz="2200" dirty="0" err="1"/>
+                <a:t>is</a:t>
+              </a:r>
+              <a:r>
+                <a:rPr lang="it-IT" sz="2200" dirty="0"/>
+                <a:t> </a:t>
+              </a:r>
+              <a:r>
+                <a:rPr lang="it-IT" sz="2200" dirty="0" err="1"/>
+                <a:t>necessary</a:t>
+              </a:r>
+              <a:r>
+                <a:rPr lang="it-IT" sz="2200" dirty="0"/>
+                <a:t> to </a:t>
+              </a:r>
+              <a:r>
+                <a:rPr lang="it-IT" sz="2200" dirty="0" err="1"/>
+                <a:t>add</a:t>
+              </a:r>
+              <a:r>
+                <a:rPr lang="it-IT" sz="2200" dirty="0"/>
+                <a:t> a field, the </a:t>
+              </a:r>
+              <a:r>
+                <a:rPr lang="it-IT" sz="2200" i="1" dirty="0"/>
+                <a:t>id</a:t>
+              </a:r>
+              <a:r>
+                <a:rPr lang="it-IT" sz="2200" dirty="0"/>
+                <a:t>, </a:t>
+              </a:r>
+              <a:r>
+                <a:rPr lang="it-IT" sz="2200" dirty="0" err="1"/>
+                <a:t>which</a:t>
+              </a:r>
+              <a:r>
+                <a:rPr lang="it-IT" sz="2200" dirty="0"/>
+                <a:t> </a:t>
+              </a:r>
+              <a:r>
+                <a:rPr lang="it-IT" sz="2200" dirty="0" err="1"/>
+                <a:t>is</a:t>
+              </a:r>
+              <a:r>
+                <a:rPr lang="it-IT" sz="2200" dirty="0"/>
+                <a:t> in the clustering </a:t>
+              </a:r>
+              <a:r>
+                <a:rPr lang="it-IT" sz="2200" dirty="0" err="1"/>
+                <a:t>columns</a:t>
+              </a:r>
+              <a:r>
+                <a:rPr lang="it-IT" sz="2200" dirty="0"/>
+                <a:t> </a:t>
+              </a:r>
+              <a:r>
+                <a:rPr lang="it-IT" sz="1400" dirty="0"/>
+                <a:t>(Note: </a:t>
+              </a:r>
+              <a:r>
+                <a:rPr lang="it-IT" sz="1400" dirty="0" err="1"/>
+                <a:t>ids</a:t>
+              </a:r>
+              <a:r>
+                <a:rPr lang="it-IT" sz="1400" dirty="0"/>
+                <a:t> are </a:t>
+              </a:r>
+              <a:r>
+                <a:rPr lang="it-IT" sz="1400" dirty="0" err="1"/>
+                <a:t>not</a:t>
+              </a:r>
+              <a:r>
+                <a:rPr lang="it-IT" sz="1400" dirty="0"/>
+                <a:t> </a:t>
+              </a:r>
+              <a:r>
+                <a:rPr lang="it-IT" sz="1400" dirty="0" err="1"/>
+                <a:t>suitable</a:t>
+              </a:r>
+              <a:r>
+                <a:rPr lang="it-IT" sz="1400" dirty="0"/>
+                <a:t> for </a:t>
+              </a:r>
+              <a:r>
+                <a:rPr lang="it-IT" sz="1400" dirty="0" err="1"/>
+                <a:t>distribuited</a:t>
+              </a:r>
+              <a:r>
+                <a:rPr lang="it-IT" sz="1400" dirty="0"/>
+                <a:t> systems, </a:t>
+              </a:r>
+              <a:r>
+                <a:rPr lang="it-IT" sz="1400" dirty="0" err="1"/>
+                <a:t>it</a:t>
+              </a:r>
+              <a:r>
+                <a:rPr lang="it-IT" sz="1400" dirty="0"/>
+                <a:t> </a:t>
+              </a:r>
+              <a:r>
+                <a:rPr lang="it-IT" sz="1400" dirty="0" err="1"/>
+                <a:t>is</a:t>
+              </a:r>
+              <a:r>
+                <a:rPr lang="it-IT" sz="1400" dirty="0"/>
+                <a:t> </a:t>
+              </a:r>
+              <a:r>
+                <a:rPr lang="it-IT" sz="1400" dirty="0" err="1"/>
+                <a:t>better</a:t>
+              </a:r>
+              <a:r>
+                <a:rPr lang="it-IT" sz="1400" dirty="0"/>
+                <a:t> to use </a:t>
+              </a:r>
+              <a:r>
+                <a:rPr lang="it-IT" sz="1400" dirty="0" err="1"/>
+                <a:t>uuids</a:t>
+              </a:r>
+              <a:r>
+                <a:rPr lang="it-IT" sz="1400" dirty="0"/>
+                <a:t>)</a:t>
+              </a:r>
+              <a:endParaRPr lang="it-IT" sz="2200" dirty="0"/>
+            </a:p>
+          </p:txBody>
+        </p:sp>
+      </p:grpSp>
     </p:spTree>
     <p:extLst>
       <p:ext uri="{BB962C8B-B14F-4D97-AF65-F5344CB8AC3E}">
@@ -7288,7 +8811,217 @@
 </p:sld>
 </file>
 
-<file path=ppt/slides/slide15.xml><?xml version="1.0" encoding="utf-8"?>
+<file path=ppt/slides/slide18.xml><?xml version="1.0" encoding="utf-8"?>
+<p:sld xmlns:a="http://schemas.openxmlformats.org/drawingml/2006/main" xmlns:r="http://schemas.openxmlformats.org/officeDocument/2006/relationships" xmlns:p="http://schemas.openxmlformats.org/presentationml/2006/main">
+  <p:cSld>
+    <p:spTree>
+      <p:nvGrpSpPr>
+        <p:cNvPr id="1" name=""/>
+        <p:cNvGrpSpPr/>
+        <p:nvPr/>
+      </p:nvGrpSpPr>
+      <p:grpSpPr>
+        <a:xfrm>
+          <a:off x="0" y="0"/>
+          <a:ext cx="0" cy="0"/>
+          <a:chOff x="0" y="0"/>
+          <a:chExt cx="0" cy="0"/>
+        </a:xfrm>
+      </p:grpSpPr>
+      <p:sp>
+        <p:nvSpPr>
+          <p:cNvPr id="2" name="Titolo 1">
+            <a:extLst>
+              <a:ext uri="{FF2B5EF4-FFF2-40B4-BE49-F238E27FC236}">
+                <a16:creationId xmlns:a16="http://schemas.microsoft.com/office/drawing/2014/main" id="{A819C0DE-02ED-4B83-BE54-F0BAB6E230C3}"/>
+              </a:ext>
+            </a:extLst>
+          </p:cNvPr>
+          <p:cNvSpPr>
+            <a:spLocks noGrp="1"/>
+          </p:cNvSpPr>
+          <p:nvPr>
+            <p:ph type="title"/>
+          </p:nvPr>
+        </p:nvSpPr>
+        <p:spPr/>
+        <p:txBody>
+          <a:bodyPr/>
+          <a:lstStyle/>
+          <a:p>
+            <a:r>
+              <a:rPr lang="it-IT" dirty="0"/>
+              <a:t>Clustering </a:t>
+            </a:r>
+            <a:r>
+              <a:rPr lang="it-IT" dirty="0" err="1"/>
+              <a:t>columns</a:t>
+            </a:r>
+            <a:r>
+              <a:rPr lang="it-IT" dirty="0"/>
+              <a:t> </a:t>
+            </a:r>
+            <a:r>
+              <a:rPr lang="it-IT" dirty="0" err="1"/>
+              <a:t>order</a:t>
+            </a:r>
+            <a:endParaRPr lang="it-IT" dirty="0"/>
+          </a:p>
+        </p:txBody>
+      </p:sp>
+      <p:sp>
+        <p:nvSpPr>
+          <p:cNvPr id="3" name="Segnaposto contenuto 2">
+            <a:extLst>
+              <a:ext uri="{FF2B5EF4-FFF2-40B4-BE49-F238E27FC236}">
+                <a16:creationId xmlns:a16="http://schemas.microsoft.com/office/drawing/2014/main" id="{E02803CD-0DC7-4E54-88A4-EF7E147B09B4}"/>
+              </a:ext>
+            </a:extLst>
+          </p:cNvPr>
+          <p:cNvSpPr>
+            <a:spLocks noGrp="1"/>
+          </p:cNvSpPr>
+          <p:nvPr>
+            <p:ph idx="1"/>
+          </p:nvPr>
+        </p:nvSpPr>
+        <p:spPr/>
+        <p:txBody>
+          <a:bodyPr>
+            <a:normAutofit/>
+          </a:bodyPr>
+          <a:lstStyle/>
+          <a:p>
+            <a:r>
+              <a:rPr lang="it-IT" sz="2400" dirty="0"/>
+              <a:t>The default clustering </a:t>
+            </a:r>
+            <a:r>
+              <a:rPr lang="it-IT" sz="2400" dirty="0" err="1"/>
+              <a:t>column</a:t>
+            </a:r>
+            <a:r>
+              <a:rPr lang="it-IT" sz="2400" dirty="0"/>
+              <a:t> </a:t>
+            </a:r>
+            <a:r>
+              <a:rPr lang="it-IT" sz="2400" dirty="0" err="1"/>
+              <a:t>order</a:t>
+            </a:r>
+            <a:r>
+              <a:rPr lang="it-IT" sz="2400" dirty="0"/>
+              <a:t> </a:t>
+            </a:r>
+            <a:r>
+              <a:rPr lang="it-IT" sz="2400" dirty="0" err="1"/>
+              <a:t>is</a:t>
+            </a:r>
+            <a:r>
+              <a:rPr lang="it-IT" sz="2400" dirty="0"/>
+              <a:t> </a:t>
+            </a:r>
+            <a:r>
+              <a:rPr lang="it-IT" sz="2400" dirty="0" err="1"/>
+              <a:t>ascending</a:t>
+            </a:r>
+            <a:endParaRPr lang="it-IT" sz="2400" dirty="0"/>
+          </a:p>
+          <a:p>
+            <a:r>
+              <a:rPr lang="it-IT" sz="2400" dirty="0" err="1"/>
+              <a:t>It</a:t>
+            </a:r>
+            <a:r>
+              <a:rPr lang="it-IT" sz="2400" dirty="0"/>
+              <a:t> </a:t>
+            </a:r>
+            <a:r>
+              <a:rPr lang="it-IT" sz="2400" dirty="0" err="1"/>
+              <a:t>is</a:t>
+            </a:r>
+            <a:r>
+              <a:rPr lang="it-IT" sz="2400" dirty="0"/>
+              <a:t> </a:t>
+            </a:r>
+            <a:r>
+              <a:rPr lang="it-IT" sz="2400" dirty="0" err="1"/>
+              <a:t>possible</a:t>
+            </a:r>
+            <a:r>
+              <a:rPr lang="it-IT" sz="2400" dirty="0"/>
+              <a:t> to </a:t>
+            </a:r>
+            <a:r>
+              <a:rPr lang="it-IT" sz="2400" dirty="0" err="1"/>
+              <a:t>change</a:t>
+            </a:r>
+            <a:r>
+              <a:rPr lang="it-IT" sz="2400" dirty="0"/>
+              <a:t> the </a:t>
+            </a:r>
+            <a:r>
+              <a:rPr lang="it-IT" sz="2400" dirty="0" err="1"/>
+              <a:t>order</a:t>
+            </a:r>
+            <a:r>
+              <a:rPr lang="it-IT" sz="2400" dirty="0"/>
+              <a:t> </a:t>
+            </a:r>
+            <a:r>
+              <a:rPr lang="it-IT" sz="2400" dirty="0" err="1"/>
+              <a:t>using</a:t>
+            </a:r>
+            <a:r>
+              <a:rPr lang="it-IT" sz="2400" dirty="0"/>
+              <a:t> WITH CLUSTERING ORDER BY</a:t>
+            </a:r>
+          </a:p>
+        </p:txBody>
+      </p:sp>
+      <p:pic>
+        <p:nvPicPr>
+          <p:cNvPr id="5" name="Immagine 4">
+            <a:extLst>
+              <a:ext uri="{FF2B5EF4-FFF2-40B4-BE49-F238E27FC236}">
+                <a16:creationId xmlns:a16="http://schemas.microsoft.com/office/drawing/2014/main" id="{45882E98-52D0-4726-B895-F707EAB8666C}"/>
+              </a:ext>
+            </a:extLst>
+          </p:cNvPr>
+          <p:cNvPicPr>
+            <a:picLocks noChangeAspect="1"/>
+          </p:cNvPicPr>
+          <p:nvPr/>
+        </p:nvPicPr>
+        <p:blipFill>
+          <a:blip r:embed="rId2"/>
+          <a:stretch>
+            <a:fillRect/>
+          </a:stretch>
+        </p:blipFill>
+        <p:spPr>
+          <a:xfrm>
+            <a:off x="2359914" y="3796284"/>
+            <a:ext cx="7048500" cy="2476500"/>
+          </a:xfrm>
+          <a:prstGeom prst="rect">
+            <a:avLst/>
+          </a:prstGeom>
+        </p:spPr>
+      </p:pic>
+    </p:spTree>
+    <p:extLst>
+      <p:ext uri="{BB962C8B-B14F-4D97-AF65-F5344CB8AC3E}">
+        <p14:creationId xmlns:p14="http://schemas.microsoft.com/office/powerpoint/2010/main" val="3648349086"/>
+      </p:ext>
+    </p:extLst>
+  </p:cSld>
+  <p:clrMapOvr>
+    <a:masterClrMapping/>
+  </p:clrMapOvr>
+</p:sld>
+</file>
+
+<file path=ppt/slides/slide19.xml><?xml version="1.0" encoding="utf-8"?>
 <p:sld xmlns:a="http://schemas.openxmlformats.org/drawingml/2006/main" xmlns:r="http://schemas.openxmlformats.org/officeDocument/2006/relationships" xmlns:p="http://schemas.openxmlformats.org/presentationml/2006/main">
   <p:cSld>
     <p:spTree>
@@ -7326,7 +9059,11 @@
           <a:bodyPr/>
           <a:lstStyle/>
           <a:p>
-            <a:endParaRPr lang="it-IT"/>
+            <a:r>
+              <a:rPr lang="it-IT"/>
+              <a:t>Querying</a:t>
+            </a:r>
+            <a:endParaRPr lang="it-IT" dirty="0"/>
           </a:p>
         </p:txBody>
       </p:sp>
@@ -7346,225 +9083,495 @@
             <p:ph idx="1"/>
           </p:nvPr>
         </p:nvSpPr>
-        <p:spPr/>
+        <p:spPr>
+          <a:xfrm>
+            <a:off x="1024128" y="2286000"/>
+            <a:ext cx="10436944" cy="4023360"/>
+          </a:xfrm>
+        </p:spPr>
         <p:txBody>
           <a:bodyPr/>
           <a:lstStyle/>
           <a:p>
-            <a:endParaRPr lang="it-IT"/>
-          </a:p>
-        </p:txBody>
-      </p:sp>
-      <p:pic>
-        <p:nvPicPr>
-          <p:cNvPr id="5" name="Immagine 4">
-            <a:extLst>
-              <a:ext uri="{FF2B5EF4-FFF2-40B4-BE49-F238E27FC236}">
-                <a16:creationId xmlns:a16="http://schemas.microsoft.com/office/drawing/2014/main" id="{E43C7B7B-E4FC-43CB-B715-14FAAEF00A8D}"/>
-              </a:ext>
-            </a:extLst>
-          </p:cNvPr>
-          <p:cNvPicPr>
-            <a:picLocks noChangeAspect="1"/>
-          </p:cNvPicPr>
-          <p:nvPr/>
-        </p:nvPicPr>
-        <p:blipFill>
-          <a:blip r:embed="rId2"/>
-          <a:stretch>
-            <a:fillRect/>
-          </a:stretch>
-        </p:blipFill>
-        <p:spPr>
-          <a:xfrm>
-            <a:off x="2228850" y="2976669"/>
-            <a:ext cx="4544812" cy="3033606"/>
-          </a:xfrm>
-          <a:prstGeom prst="rect">
-            <a:avLst/>
-          </a:prstGeom>
-        </p:spPr>
-      </p:pic>
-    </p:spTree>
-    <p:extLst>
-      <p:ext uri="{BB962C8B-B14F-4D97-AF65-F5344CB8AC3E}">
-        <p14:creationId xmlns:p14="http://schemas.microsoft.com/office/powerpoint/2010/main" val="2317996259"/>
-      </p:ext>
-    </p:extLst>
-  </p:cSld>
-  <p:clrMapOvr>
-    <a:masterClrMapping/>
-  </p:clrMapOvr>
-</p:sld>
-</file>
-
-<file path=ppt/slides/slide16.xml><?xml version="1.0" encoding="utf-8"?>
-<p:sld xmlns:a="http://schemas.openxmlformats.org/drawingml/2006/main" xmlns:r="http://schemas.openxmlformats.org/officeDocument/2006/relationships" xmlns:p="http://schemas.openxmlformats.org/presentationml/2006/main">
-  <p:cSld>
-    <p:spTree>
-      <p:nvGrpSpPr>
-        <p:cNvPr id="1" name=""/>
-        <p:cNvGrpSpPr/>
-        <p:nvPr/>
-      </p:nvGrpSpPr>
-      <p:grpSpPr>
-        <a:xfrm>
-          <a:off x="0" y="0"/>
-          <a:ext cx="0" cy="0"/>
-          <a:chOff x="0" y="0"/>
-          <a:chExt cx="0" cy="0"/>
-        </a:xfrm>
-      </p:grpSpPr>
-      <p:sp>
-        <p:nvSpPr>
-          <p:cNvPr id="2" name="Titolo 1">
-            <a:extLst>
-              <a:ext uri="{FF2B5EF4-FFF2-40B4-BE49-F238E27FC236}">
-                <a16:creationId xmlns:a16="http://schemas.microsoft.com/office/drawing/2014/main" id="{2A8B19B7-58BC-457B-A5C2-89F2BE3A7EF1}"/>
-              </a:ext>
-            </a:extLst>
-          </p:cNvPr>
-          <p:cNvSpPr>
-            <a:spLocks noGrp="1"/>
-          </p:cNvSpPr>
-          <p:nvPr>
-            <p:ph type="title"/>
-          </p:nvPr>
-        </p:nvSpPr>
-        <p:spPr/>
-        <p:txBody>
-          <a:bodyPr/>
-          <a:lstStyle/>
-          <a:p>
+            <a:pPr>
+              <a:buFont typeface="Tw Cen MT" panose="020B0602020104020603" pitchFamily="34" charset="0"/>
+              <a:buChar char="-"/>
+            </a:pPr>
             <a:r>
               <a:rPr lang="it-IT" dirty="0"/>
-              <a:t>Write </a:t>
-            </a:r>
-            <a:r>
-              <a:rPr lang="it-IT" dirty="0" err="1"/>
-              <a:t>path</a:t>
-            </a:r>
-            <a:endParaRPr lang="it-IT" dirty="0"/>
-          </a:p>
-        </p:txBody>
-      </p:sp>
-      <p:sp>
-        <p:nvSpPr>
-          <p:cNvPr id="3" name="Segnaposto contenuto 2">
-            <a:extLst>
-              <a:ext uri="{FF2B5EF4-FFF2-40B4-BE49-F238E27FC236}">
-                <a16:creationId xmlns:a16="http://schemas.microsoft.com/office/drawing/2014/main" id="{2B104CE0-0380-4959-A5A5-832878D315EC}"/>
-              </a:ext>
-            </a:extLst>
-          </p:cNvPr>
-          <p:cNvSpPr>
-            <a:spLocks noGrp="1"/>
-          </p:cNvSpPr>
-          <p:nvPr>
-            <p:ph idx="1"/>
-          </p:nvPr>
-        </p:nvSpPr>
-        <p:spPr/>
-        <p:txBody>
-          <a:bodyPr/>
-          <a:lstStyle/>
-          <a:p>
-            <a:endParaRPr lang="it-IT"/>
+              <a:t> </a:t>
+            </a:r>
+            <a:r>
+              <a:rPr lang="it-IT" sz="2400" dirty="0" err="1"/>
+              <a:t>Every</a:t>
+            </a:r>
+            <a:r>
+              <a:rPr lang="it-IT" sz="2400" dirty="0"/>
+              <a:t> query </a:t>
+            </a:r>
+            <a:r>
+              <a:rPr lang="it-IT" sz="2400" dirty="0" err="1"/>
+              <a:t>should</a:t>
+            </a:r>
+            <a:r>
+              <a:rPr lang="it-IT" sz="2400" dirty="0"/>
+              <a:t> </a:t>
+            </a:r>
+            <a:r>
+              <a:rPr lang="it-IT" sz="2400" dirty="0" err="1"/>
+              <a:t>have</a:t>
+            </a:r>
+            <a:r>
+              <a:rPr lang="it-IT" sz="2400" dirty="0"/>
+              <a:t> a </a:t>
+            </a:r>
+            <a:r>
+              <a:rPr lang="it-IT" sz="2400" dirty="0" err="1"/>
+              <a:t>partition</a:t>
+            </a:r>
+            <a:r>
+              <a:rPr lang="it-IT" sz="2400" dirty="0"/>
+              <a:t> key: Cassandra </a:t>
+            </a:r>
+            <a:r>
+              <a:rPr lang="it-IT" sz="2400" dirty="0" err="1"/>
+              <a:t>needs</a:t>
+            </a:r>
+            <a:r>
+              <a:rPr lang="it-IT" sz="2400" dirty="0"/>
+              <a:t> to know </a:t>
+            </a:r>
+            <a:r>
+              <a:rPr lang="it-IT" sz="2400" dirty="0" err="1"/>
+              <a:t>where</a:t>
+            </a:r>
+            <a:r>
+              <a:rPr lang="it-IT" sz="2400" dirty="0"/>
+              <a:t> to look</a:t>
+            </a:r>
+          </a:p>
+          <a:p>
+            <a:pPr>
+              <a:buFont typeface="Tw Cen MT" panose="020B0602020104020603" pitchFamily="34" charset="0"/>
+              <a:buChar char="-"/>
+            </a:pPr>
+            <a:r>
+              <a:rPr lang="it-IT" sz="2400" dirty="0"/>
+              <a:t> Inside a </a:t>
+            </a:r>
+            <a:r>
+              <a:rPr lang="it-IT" sz="2400" dirty="0" err="1"/>
+              <a:t>partition</a:t>
+            </a:r>
+            <a:r>
+              <a:rPr lang="it-IT" sz="2400" dirty="0"/>
+              <a:t>, </a:t>
+            </a:r>
+            <a:r>
+              <a:rPr lang="it-IT" sz="2400" dirty="0" err="1"/>
+              <a:t>you</a:t>
+            </a:r>
+            <a:r>
+              <a:rPr lang="it-IT" sz="2400" dirty="0"/>
+              <a:t> can </a:t>
+            </a:r>
+            <a:r>
+              <a:rPr lang="it-IT" sz="2400" dirty="0" err="1"/>
+              <a:t>perform</a:t>
+            </a:r>
+            <a:r>
+              <a:rPr lang="it-IT" sz="2400" dirty="0"/>
+              <a:t> </a:t>
+            </a:r>
+            <a:r>
+              <a:rPr lang="it-IT" sz="2400" dirty="0" err="1"/>
+              <a:t>operations</a:t>
+            </a:r>
+            <a:r>
+              <a:rPr lang="it-IT" sz="2400" dirty="0"/>
+              <a:t> (&lt; &gt; =) on clustering </a:t>
+            </a:r>
+            <a:r>
+              <a:rPr lang="it-IT" sz="2400" dirty="0" err="1"/>
+              <a:t>columns</a:t>
+            </a:r>
+            <a:endParaRPr lang="it-IT" sz="2400" dirty="0"/>
+          </a:p>
+          <a:p>
+            <a:pPr lvl="1">
+              <a:buFont typeface="Tw Cen MT" panose="020B0602020104020603" pitchFamily="34" charset="0"/>
+              <a:buChar char="-"/>
+            </a:pPr>
+            <a:r>
+              <a:rPr lang="it-IT" sz="2200" dirty="0" err="1"/>
+              <a:t>When</a:t>
+            </a:r>
+            <a:r>
+              <a:rPr lang="it-IT" sz="2200" dirty="0"/>
+              <a:t> </a:t>
+            </a:r>
+            <a:r>
+              <a:rPr lang="it-IT" sz="2200" dirty="0" err="1"/>
+              <a:t>doing</a:t>
+            </a:r>
+            <a:r>
+              <a:rPr lang="it-IT" sz="2200" dirty="0"/>
+              <a:t> </a:t>
+            </a:r>
+            <a:r>
+              <a:rPr lang="it-IT" sz="2200" dirty="0" err="1"/>
+              <a:t>equals</a:t>
+            </a:r>
+            <a:r>
+              <a:rPr lang="it-IT" sz="2200" dirty="0"/>
+              <a:t>, </a:t>
+            </a:r>
+            <a:r>
+              <a:rPr lang="it-IT" sz="2200" dirty="0" err="1"/>
+              <a:t>it</a:t>
+            </a:r>
+            <a:r>
+              <a:rPr lang="it-IT" sz="2200" dirty="0"/>
+              <a:t> </a:t>
+            </a:r>
+            <a:r>
+              <a:rPr lang="it-IT" sz="2200" dirty="0" err="1"/>
+              <a:t>is</a:t>
+            </a:r>
+            <a:r>
+              <a:rPr lang="it-IT" sz="2200" dirty="0"/>
+              <a:t> </a:t>
+            </a:r>
+            <a:r>
+              <a:rPr lang="it-IT" sz="2200" dirty="0" err="1"/>
+              <a:t>important</a:t>
+            </a:r>
+            <a:r>
+              <a:rPr lang="it-IT" sz="2200" dirty="0"/>
+              <a:t> to do </a:t>
+            </a:r>
+            <a:r>
+              <a:rPr lang="it-IT" sz="2200" dirty="0" err="1"/>
+              <a:t>them</a:t>
+            </a:r>
+            <a:r>
+              <a:rPr lang="it-IT" sz="2200" dirty="0"/>
+              <a:t> in the </a:t>
+            </a:r>
+            <a:r>
+              <a:rPr lang="it-IT" sz="2200" dirty="0" err="1"/>
+              <a:t>same</a:t>
+            </a:r>
+            <a:r>
+              <a:rPr lang="it-IT" sz="2200" dirty="0"/>
+              <a:t> </a:t>
+            </a:r>
+            <a:r>
+              <a:rPr lang="it-IT" sz="2200" dirty="0" err="1"/>
+              <a:t>order</a:t>
+            </a:r>
+            <a:r>
+              <a:rPr lang="it-IT" sz="2200" dirty="0"/>
+              <a:t> </a:t>
+            </a:r>
+            <a:r>
+              <a:rPr lang="it-IT" sz="2200" dirty="0" err="1"/>
+              <a:t>that</a:t>
+            </a:r>
+            <a:r>
+              <a:rPr lang="it-IT" sz="2200" dirty="0"/>
+              <a:t> the clustering </a:t>
+            </a:r>
+            <a:r>
+              <a:rPr lang="it-IT" sz="2200" dirty="0" err="1"/>
+              <a:t>columns</a:t>
+            </a:r>
+            <a:r>
+              <a:rPr lang="it-IT" sz="2200" dirty="0"/>
+              <a:t> are </a:t>
+            </a:r>
+            <a:r>
+              <a:rPr lang="it-IT" sz="2200" dirty="0" err="1"/>
+              <a:t>presented</a:t>
+            </a:r>
+            <a:r>
+              <a:rPr lang="it-IT" sz="2200" dirty="0"/>
+              <a:t> in the </a:t>
+            </a:r>
+            <a:r>
+              <a:rPr lang="it-IT" sz="2200" dirty="0" err="1"/>
+              <a:t>Primary</a:t>
+            </a:r>
+            <a:r>
+              <a:rPr lang="it-IT" sz="2200" dirty="0"/>
+              <a:t> key </a:t>
+            </a:r>
+            <a:r>
+              <a:rPr lang="it-IT" sz="2200" dirty="0" err="1"/>
+              <a:t>definition</a:t>
+            </a:r>
+            <a:r>
+              <a:rPr lang="it-IT" sz="2200" dirty="0"/>
+              <a:t> </a:t>
+            </a:r>
+          </a:p>
+          <a:p>
+            <a:pPr lvl="1">
+              <a:buFont typeface="Tw Cen MT" panose="020B0602020104020603" pitchFamily="34" charset="0"/>
+              <a:buChar char="-"/>
+            </a:pPr>
+            <a:r>
+              <a:rPr lang="it-IT" sz="2200" dirty="0" err="1"/>
+              <a:t>That</a:t>
+            </a:r>
+            <a:r>
+              <a:rPr lang="it-IT" sz="2200" dirty="0"/>
+              <a:t> </a:t>
+            </a:r>
+            <a:r>
+              <a:rPr lang="it-IT" sz="2200" dirty="0" err="1"/>
+              <a:t>is</a:t>
+            </a:r>
+            <a:r>
+              <a:rPr lang="it-IT" sz="2200" dirty="0"/>
+              <a:t> </a:t>
+            </a:r>
+            <a:r>
+              <a:rPr lang="it-IT" sz="2200" dirty="0" err="1"/>
+              <a:t>because</a:t>
+            </a:r>
+            <a:r>
+              <a:rPr lang="it-IT" sz="2200" dirty="0"/>
+              <a:t> the data </a:t>
+            </a:r>
+            <a:r>
+              <a:rPr lang="it-IT" sz="2200" dirty="0" err="1"/>
+              <a:t>is</a:t>
+            </a:r>
+            <a:r>
+              <a:rPr lang="it-IT" sz="2200" dirty="0"/>
+              <a:t> </a:t>
+            </a:r>
+            <a:r>
+              <a:rPr lang="it-IT" sz="2200" dirty="0" err="1"/>
+              <a:t>ordered</a:t>
+            </a:r>
+            <a:r>
+              <a:rPr lang="it-IT" sz="2200" dirty="0"/>
+              <a:t> on disk: Cassandra </a:t>
+            </a:r>
+            <a:r>
+              <a:rPr lang="it-IT" sz="2200" dirty="0" err="1"/>
+              <a:t>performs</a:t>
+            </a:r>
+            <a:r>
+              <a:rPr lang="it-IT" sz="2200" dirty="0"/>
+              <a:t> a </a:t>
+            </a:r>
+            <a:r>
+              <a:rPr lang="it-IT" sz="2200" dirty="0" err="1"/>
+              <a:t>binary</a:t>
+            </a:r>
+            <a:r>
+              <a:rPr lang="it-IT" sz="2200" dirty="0"/>
+              <a:t> </a:t>
+            </a:r>
+            <a:r>
+              <a:rPr lang="it-IT" sz="2200" dirty="0" err="1"/>
+              <a:t>search</a:t>
+            </a:r>
+            <a:endParaRPr lang="it-IT" sz="2200" dirty="0"/>
+          </a:p>
+          <a:p>
+            <a:pPr lvl="1">
+              <a:buFont typeface="Tw Cen MT" panose="020B0602020104020603" pitchFamily="34" charset="0"/>
+              <a:buChar char="-"/>
+            </a:pPr>
+            <a:endParaRPr lang="it-IT" sz="2000" dirty="0"/>
+          </a:p>
+          <a:p>
+            <a:pPr>
+              <a:buFont typeface="Tw Cen MT" panose="020B0602020104020603" pitchFamily="34" charset="0"/>
+              <a:buChar char="-"/>
+            </a:pPr>
+            <a:r>
+              <a:rPr lang="it-IT" sz="2400" dirty="0"/>
+              <a:t> </a:t>
+            </a:r>
+            <a:r>
+              <a:rPr lang="it-IT" sz="2400" dirty="0" err="1"/>
+              <a:t>If</a:t>
+            </a:r>
+            <a:r>
+              <a:rPr lang="it-IT" sz="2400" dirty="0"/>
+              <a:t> </a:t>
+            </a:r>
+            <a:r>
+              <a:rPr lang="it-IT" sz="2400" dirty="0" err="1"/>
+              <a:t>you</a:t>
+            </a:r>
+            <a:r>
+              <a:rPr lang="it-IT" sz="2400" dirty="0"/>
+              <a:t> </a:t>
+            </a:r>
+            <a:r>
+              <a:rPr lang="it-IT" sz="2400" dirty="0" err="1"/>
+              <a:t>try</a:t>
+            </a:r>
+            <a:r>
+              <a:rPr lang="it-IT" sz="2400" dirty="0"/>
+              <a:t> to query data and filter </a:t>
+            </a:r>
+            <a:r>
+              <a:rPr lang="it-IT" sz="2400" dirty="0" err="1"/>
+              <a:t>it</a:t>
+            </a:r>
+            <a:r>
+              <a:rPr lang="it-IT" sz="2400" dirty="0"/>
+              <a:t> </a:t>
+            </a:r>
+            <a:r>
+              <a:rPr lang="it-IT" sz="2400" dirty="0" err="1"/>
+              <a:t>using</a:t>
+            </a:r>
+            <a:r>
+              <a:rPr lang="it-IT" sz="2400" dirty="0"/>
+              <a:t> a WHERE </a:t>
+            </a:r>
+            <a:r>
+              <a:rPr lang="it-IT" sz="2400" dirty="0" err="1"/>
+              <a:t>statement</a:t>
+            </a:r>
+            <a:r>
+              <a:rPr lang="it-IT" sz="2400" dirty="0"/>
+              <a:t> by NOT </a:t>
+            </a:r>
+            <a:r>
+              <a:rPr lang="it-IT" sz="2400" dirty="0" err="1"/>
+              <a:t>specifying</a:t>
+            </a:r>
+            <a:r>
+              <a:rPr lang="it-IT" sz="2400" dirty="0"/>
+              <a:t> a </a:t>
+            </a:r>
+            <a:r>
+              <a:rPr lang="it-IT" sz="2400" dirty="0" err="1"/>
+              <a:t>Partition</a:t>
+            </a:r>
+            <a:r>
+              <a:rPr lang="it-IT" sz="2400" dirty="0"/>
+              <a:t> key, Cassandra </a:t>
+            </a:r>
+            <a:r>
+              <a:rPr lang="it-IT" sz="2400" dirty="0" err="1"/>
+              <a:t>will</a:t>
+            </a:r>
+            <a:r>
+              <a:rPr lang="it-IT" sz="2400" dirty="0"/>
+              <a:t> </a:t>
+            </a:r>
+            <a:r>
+              <a:rPr lang="it-IT" sz="2400" dirty="0" err="1"/>
+              <a:t>refuse</a:t>
+            </a:r>
+            <a:r>
+              <a:rPr lang="it-IT" sz="2400" dirty="0"/>
+              <a:t> the query</a:t>
+            </a:r>
+          </a:p>
+          <a:p>
+            <a:pPr>
+              <a:buFont typeface="Tw Cen MT" panose="020B0602020104020603" pitchFamily="34" charset="0"/>
+              <a:buChar char="-"/>
+            </a:pPr>
+            <a:r>
+              <a:rPr lang="it-IT" sz="2400" dirty="0"/>
+              <a:t> </a:t>
+            </a:r>
+            <a:r>
+              <a:rPr lang="it-IT" sz="2400" dirty="0" err="1"/>
+              <a:t>If</a:t>
+            </a:r>
+            <a:r>
+              <a:rPr lang="it-IT" sz="2400" dirty="0"/>
+              <a:t> the </a:t>
+            </a:r>
+            <a:r>
+              <a:rPr lang="it-IT" sz="2400" dirty="0" err="1"/>
+              <a:t>Partition</a:t>
+            </a:r>
+            <a:r>
+              <a:rPr lang="it-IT" sz="2400" dirty="0"/>
+              <a:t> key </a:t>
+            </a:r>
+            <a:r>
+              <a:rPr lang="it-IT" sz="2400" dirty="0" err="1"/>
+              <a:t>is</a:t>
+            </a:r>
+            <a:r>
+              <a:rPr lang="it-IT" sz="2400" dirty="0"/>
+              <a:t> </a:t>
+            </a:r>
+            <a:r>
+              <a:rPr lang="it-IT" sz="2400" dirty="0" err="1"/>
+              <a:t>composed</a:t>
+            </a:r>
+            <a:r>
+              <a:rPr lang="it-IT" sz="2400" dirty="0"/>
+              <a:t>, </a:t>
+            </a:r>
+            <a:r>
+              <a:rPr lang="it-IT" sz="2400" dirty="0" err="1"/>
+              <a:t>it</a:t>
+            </a:r>
+            <a:r>
+              <a:rPr lang="it-IT" sz="2400" dirty="0"/>
+              <a:t> </a:t>
+            </a:r>
+            <a:r>
+              <a:rPr lang="it-IT" sz="2400" dirty="0" err="1"/>
+              <a:t>is</a:t>
+            </a:r>
+            <a:r>
+              <a:rPr lang="it-IT" sz="2400" dirty="0"/>
+              <a:t> </a:t>
+            </a:r>
+            <a:r>
+              <a:rPr lang="it-IT" sz="2400" dirty="0" err="1"/>
+              <a:t>necessary</a:t>
+            </a:r>
+            <a:r>
+              <a:rPr lang="it-IT" sz="2400" dirty="0"/>
+              <a:t> to </a:t>
+            </a:r>
+            <a:r>
+              <a:rPr lang="it-IT" sz="2400" dirty="0" err="1"/>
+              <a:t>provide</a:t>
+            </a:r>
+            <a:r>
+              <a:rPr lang="it-IT" sz="2400" dirty="0"/>
+              <a:t> </a:t>
+            </a:r>
+            <a:r>
+              <a:rPr lang="it-IT" sz="2400" dirty="0" err="1"/>
+              <a:t>both</a:t>
+            </a:r>
+            <a:r>
+              <a:rPr lang="it-IT" sz="2400" dirty="0"/>
+              <a:t> of </a:t>
+            </a:r>
+            <a:r>
+              <a:rPr lang="it-IT" sz="2400" dirty="0" err="1"/>
+              <a:t>them</a:t>
+            </a:r>
+            <a:endParaRPr lang="it-IT" sz="2400" dirty="0"/>
           </a:p>
         </p:txBody>
       </p:sp>
     </p:spTree>
     <p:extLst>
       <p:ext uri="{BB962C8B-B14F-4D97-AF65-F5344CB8AC3E}">
-        <p14:creationId xmlns:p14="http://schemas.microsoft.com/office/powerpoint/2010/main" val="966922383"/>
-      </p:ext>
-    </p:extLst>
-  </p:cSld>
-  <p:clrMapOvr>
-    <a:masterClrMapping/>
-  </p:clrMapOvr>
-</p:sld>
-</file>
-
-<file path=ppt/slides/slide17.xml><?xml version="1.0" encoding="utf-8"?>
-<p:sld xmlns:a="http://schemas.openxmlformats.org/drawingml/2006/main" xmlns:r="http://schemas.openxmlformats.org/officeDocument/2006/relationships" xmlns:p="http://schemas.openxmlformats.org/presentationml/2006/main">
-  <p:cSld>
-    <p:spTree>
-      <p:nvGrpSpPr>
-        <p:cNvPr id="1" name=""/>
-        <p:cNvGrpSpPr/>
-        <p:nvPr/>
-      </p:nvGrpSpPr>
-      <p:grpSpPr>
-        <a:xfrm>
-          <a:off x="0" y="0"/>
-          <a:ext cx="0" cy="0"/>
-          <a:chOff x="0" y="0"/>
-          <a:chExt cx="0" cy="0"/>
-        </a:xfrm>
-      </p:grpSpPr>
-      <p:sp>
-        <p:nvSpPr>
-          <p:cNvPr id="2" name="Titolo 1">
-            <a:extLst>
-              <a:ext uri="{FF2B5EF4-FFF2-40B4-BE49-F238E27FC236}">
-                <a16:creationId xmlns:a16="http://schemas.microsoft.com/office/drawing/2014/main" id="{37A7AE22-6D92-4C92-91CB-54BA4C29C161}"/>
-              </a:ext>
-            </a:extLst>
-          </p:cNvPr>
-          <p:cNvSpPr>
-            <a:spLocks noGrp="1"/>
-          </p:cNvSpPr>
-          <p:nvPr>
-            <p:ph type="title"/>
-          </p:nvPr>
-        </p:nvSpPr>
-        <p:spPr/>
-        <p:txBody>
-          <a:bodyPr/>
-          <a:lstStyle/>
-          <a:p>
-            <a:r>
-              <a:rPr lang="it-IT" dirty="0"/>
-              <a:t>Read </a:t>
-            </a:r>
-            <a:r>
-              <a:rPr lang="it-IT" dirty="0" err="1"/>
-              <a:t>path</a:t>
-            </a:r>
-            <a:endParaRPr lang="it-IT" dirty="0"/>
-          </a:p>
-        </p:txBody>
-      </p:sp>
-      <p:sp>
-        <p:nvSpPr>
-          <p:cNvPr id="3" name="Segnaposto contenuto 2">
-            <a:extLst>
-              <a:ext uri="{FF2B5EF4-FFF2-40B4-BE49-F238E27FC236}">
-                <a16:creationId xmlns:a16="http://schemas.microsoft.com/office/drawing/2014/main" id="{7C18D47F-DC28-4264-B558-3745EAC7EA92}"/>
-              </a:ext>
-            </a:extLst>
-          </p:cNvPr>
-          <p:cNvSpPr>
-            <a:spLocks noGrp="1"/>
-          </p:cNvSpPr>
-          <p:nvPr>
-            <p:ph idx="1"/>
-          </p:nvPr>
-        </p:nvSpPr>
-        <p:spPr/>
-        <p:txBody>
-          <a:bodyPr/>
-          <a:lstStyle/>
-          <a:p>
-            <a:endParaRPr lang="it-IT"/>
-          </a:p>
-        </p:txBody>
-      </p:sp>
-    </p:spTree>
-    <p:extLst>
-      <p:ext uri="{BB962C8B-B14F-4D97-AF65-F5344CB8AC3E}">
-        <p14:creationId xmlns:p14="http://schemas.microsoft.com/office/powerpoint/2010/main" val="3764391055"/>
+        <p14:creationId xmlns:p14="http://schemas.microsoft.com/office/powerpoint/2010/main" val="2317996259"/>
       </p:ext>
     </p:extLst>
   </p:cSld>
@@ -10416,6 +12423,182 @@
 </p:sld>
 </file>
 
+<file path=ppt/slides/slide20.xml><?xml version="1.0" encoding="utf-8"?>
+<p:sld xmlns:a="http://schemas.openxmlformats.org/drawingml/2006/main" xmlns:r="http://schemas.openxmlformats.org/officeDocument/2006/relationships" xmlns:p="http://schemas.openxmlformats.org/presentationml/2006/main">
+  <p:cSld>
+    <p:spTree>
+      <p:nvGrpSpPr>
+        <p:cNvPr id="1" name=""/>
+        <p:cNvGrpSpPr/>
+        <p:nvPr/>
+      </p:nvGrpSpPr>
+      <p:grpSpPr>
+        <a:xfrm>
+          <a:off x="0" y="0"/>
+          <a:ext cx="0" cy="0"/>
+          <a:chOff x="0" y="0"/>
+          <a:chExt cx="0" cy="0"/>
+        </a:xfrm>
+      </p:grpSpPr>
+      <p:sp>
+        <p:nvSpPr>
+          <p:cNvPr id="2" name="Titolo 1">
+            <a:extLst>
+              <a:ext uri="{FF2B5EF4-FFF2-40B4-BE49-F238E27FC236}">
+                <a16:creationId xmlns:a16="http://schemas.microsoft.com/office/drawing/2014/main" id="{2A8B19B7-58BC-457B-A5C2-89F2BE3A7EF1}"/>
+              </a:ext>
+            </a:extLst>
+          </p:cNvPr>
+          <p:cNvSpPr>
+            <a:spLocks noGrp="1"/>
+          </p:cNvSpPr>
+          <p:nvPr>
+            <p:ph type="title"/>
+          </p:nvPr>
+        </p:nvSpPr>
+        <p:spPr/>
+        <p:txBody>
+          <a:bodyPr/>
+          <a:lstStyle/>
+          <a:p>
+            <a:r>
+              <a:rPr lang="it-IT" dirty="0"/>
+              <a:t>Write </a:t>
+            </a:r>
+            <a:r>
+              <a:rPr lang="it-IT" dirty="0" err="1"/>
+              <a:t>path</a:t>
+            </a:r>
+            <a:endParaRPr lang="it-IT" dirty="0"/>
+          </a:p>
+        </p:txBody>
+      </p:sp>
+      <p:sp>
+        <p:nvSpPr>
+          <p:cNvPr id="3" name="Segnaposto contenuto 2">
+            <a:extLst>
+              <a:ext uri="{FF2B5EF4-FFF2-40B4-BE49-F238E27FC236}">
+                <a16:creationId xmlns:a16="http://schemas.microsoft.com/office/drawing/2014/main" id="{2B104CE0-0380-4959-A5A5-832878D315EC}"/>
+              </a:ext>
+            </a:extLst>
+          </p:cNvPr>
+          <p:cNvSpPr>
+            <a:spLocks noGrp="1"/>
+          </p:cNvSpPr>
+          <p:nvPr>
+            <p:ph idx="1"/>
+          </p:nvPr>
+        </p:nvSpPr>
+        <p:spPr/>
+        <p:txBody>
+          <a:bodyPr/>
+          <a:lstStyle/>
+          <a:p>
+            <a:endParaRPr lang="it-IT"/>
+          </a:p>
+        </p:txBody>
+      </p:sp>
+    </p:spTree>
+    <p:extLst>
+      <p:ext uri="{BB962C8B-B14F-4D97-AF65-F5344CB8AC3E}">
+        <p14:creationId xmlns:p14="http://schemas.microsoft.com/office/powerpoint/2010/main" val="966922383"/>
+      </p:ext>
+    </p:extLst>
+  </p:cSld>
+  <p:clrMapOvr>
+    <a:masterClrMapping/>
+  </p:clrMapOvr>
+</p:sld>
+</file>
+
+<file path=ppt/slides/slide21.xml><?xml version="1.0" encoding="utf-8"?>
+<p:sld xmlns:a="http://schemas.openxmlformats.org/drawingml/2006/main" xmlns:r="http://schemas.openxmlformats.org/officeDocument/2006/relationships" xmlns:p="http://schemas.openxmlformats.org/presentationml/2006/main">
+  <p:cSld>
+    <p:spTree>
+      <p:nvGrpSpPr>
+        <p:cNvPr id="1" name=""/>
+        <p:cNvGrpSpPr/>
+        <p:nvPr/>
+      </p:nvGrpSpPr>
+      <p:grpSpPr>
+        <a:xfrm>
+          <a:off x="0" y="0"/>
+          <a:ext cx="0" cy="0"/>
+          <a:chOff x="0" y="0"/>
+          <a:chExt cx="0" cy="0"/>
+        </a:xfrm>
+      </p:grpSpPr>
+      <p:sp>
+        <p:nvSpPr>
+          <p:cNvPr id="2" name="Titolo 1">
+            <a:extLst>
+              <a:ext uri="{FF2B5EF4-FFF2-40B4-BE49-F238E27FC236}">
+                <a16:creationId xmlns:a16="http://schemas.microsoft.com/office/drawing/2014/main" id="{37A7AE22-6D92-4C92-91CB-54BA4C29C161}"/>
+              </a:ext>
+            </a:extLst>
+          </p:cNvPr>
+          <p:cNvSpPr>
+            <a:spLocks noGrp="1"/>
+          </p:cNvSpPr>
+          <p:nvPr>
+            <p:ph type="title"/>
+          </p:nvPr>
+        </p:nvSpPr>
+        <p:spPr/>
+        <p:txBody>
+          <a:bodyPr/>
+          <a:lstStyle/>
+          <a:p>
+            <a:r>
+              <a:rPr lang="it-IT" dirty="0"/>
+              <a:t>Read </a:t>
+            </a:r>
+            <a:r>
+              <a:rPr lang="it-IT" dirty="0" err="1"/>
+              <a:t>path</a:t>
+            </a:r>
+            <a:endParaRPr lang="it-IT" dirty="0"/>
+          </a:p>
+        </p:txBody>
+      </p:sp>
+      <p:sp>
+        <p:nvSpPr>
+          <p:cNvPr id="3" name="Segnaposto contenuto 2">
+            <a:extLst>
+              <a:ext uri="{FF2B5EF4-FFF2-40B4-BE49-F238E27FC236}">
+                <a16:creationId xmlns:a16="http://schemas.microsoft.com/office/drawing/2014/main" id="{7C18D47F-DC28-4264-B558-3745EAC7EA92}"/>
+              </a:ext>
+            </a:extLst>
+          </p:cNvPr>
+          <p:cNvSpPr>
+            <a:spLocks noGrp="1"/>
+          </p:cNvSpPr>
+          <p:nvPr>
+            <p:ph idx="1"/>
+          </p:nvPr>
+        </p:nvSpPr>
+        <p:spPr/>
+        <p:txBody>
+          <a:bodyPr/>
+          <a:lstStyle/>
+          <a:p>
+            <a:endParaRPr lang="it-IT"/>
+          </a:p>
+        </p:txBody>
+      </p:sp>
+    </p:spTree>
+    <p:extLst>
+      <p:ext uri="{BB962C8B-B14F-4D97-AF65-F5344CB8AC3E}">
+        <p14:creationId xmlns:p14="http://schemas.microsoft.com/office/powerpoint/2010/main" val="3764391055"/>
+      </p:ext>
+    </p:extLst>
+  </p:cSld>
+  <p:clrMapOvr>
+    <a:masterClrMapping/>
+  </p:clrMapOvr>
+</p:sld>
+</file>
+
 <file path=ppt/slides/slide3.xml><?xml version="1.0" encoding="utf-8"?>
 <p:sld xmlns:a="http://schemas.openxmlformats.org/drawingml/2006/main" xmlns:r="http://schemas.openxmlformats.org/officeDocument/2006/relationships" xmlns:p="http://schemas.openxmlformats.org/presentationml/2006/main">
   <p:cSld>
@@ -11297,6 +13480,710 @@
       </p:grpSpPr>
       <p:sp>
         <p:nvSpPr>
+          <p:cNvPr id="2" name="Titolo 1">
+            <a:extLst>
+              <a:ext uri="{FF2B5EF4-FFF2-40B4-BE49-F238E27FC236}">
+                <a16:creationId xmlns:a16="http://schemas.microsoft.com/office/drawing/2014/main" id="{0A6C7D5C-1F95-4102-B5B2-CB1DCA7D7172}"/>
+              </a:ext>
+            </a:extLst>
+          </p:cNvPr>
+          <p:cNvSpPr>
+            <a:spLocks noGrp="1"/>
+          </p:cNvSpPr>
+          <p:nvPr>
+            <p:ph type="title"/>
+          </p:nvPr>
+        </p:nvSpPr>
+        <p:spPr>
+          <a:xfrm>
+            <a:off x="1024128" y="443172"/>
+            <a:ext cx="6066818" cy="1499616"/>
+          </a:xfrm>
+        </p:spPr>
+        <p:txBody>
+          <a:bodyPr>
+            <a:normAutofit/>
+          </a:bodyPr>
+          <a:lstStyle/>
+          <a:p>
+            <a:r>
+              <a:rPr lang="it-IT" dirty="0" err="1"/>
+              <a:t>Nodes</a:t>
+            </a:r>
+            <a:endParaRPr lang="it-IT" dirty="0"/>
+          </a:p>
+        </p:txBody>
+      </p:sp>
+      <p:sp>
+        <p:nvSpPr>
+          <p:cNvPr id="3" name="Segnaposto contenuto 2">
+            <a:extLst>
+              <a:ext uri="{FF2B5EF4-FFF2-40B4-BE49-F238E27FC236}">
+                <a16:creationId xmlns:a16="http://schemas.microsoft.com/office/drawing/2014/main" id="{5BA0ECA4-9BBE-4549-BB55-C636B96A5C9F}"/>
+              </a:ext>
+            </a:extLst>
+          </p:cNvPr>
+          <p:cNvSpPr>
+            <a:spLocks noGrp="1"/>
+          </p:cNvSpPr>
+          <p:nvPr>
+            <p:ph idx="1"/>
+          </p:nvPr>
+        </p:nvSpPr>
+        <p:spPr>
+          <a:xfrm>
+            <a:off x="763480" y="1794694"/>
+            <a:ext cx="6924582" cy="4533826"/>
+          </a:xfrm>
+        </p:spPr>
+        <p:txBody>
+          <a:bodyPr>
+            <a:normAutofit/>
+          </a:bodyPr>
+          <a:lstStyle/>
+          <a:p>
+            <a:r>
+              <a:rPr lang="it-IT" dirty="0"/>
+              <a:t>Cassandra </a:t>
+            </a:r>
+            <a:r>
+              <a:rPr lang="it-IT" dirty="0" err="1"/>
+              <a:t>is</a:t>
+            </a:r>
+            <a:r>
+              <a:rPr lang="it-IT" dirty="0"/>
+              <a:t> a </a:t>
+            </a:r>
+            <a:r>
+              <a:rPr lang="it-IT" dirty="0" err="1"/>
+              <a:t>distribuited</a:t>
+            </a:r>
+            <a:r>
+              <a:rPr lang="it-IT" dirty="0"/>
+              <a:t> system made up of </a:t>
+            </a:r>
+            <a:r>
+              <a:rPr lang="it-IT" dirty="0" err="1"/>
+              <a:t>nodes</a:t>
+            </a:r>
+            <a:r>
+              <a:rPr lang="it-IT" dirty="0"/>
+              <a:t>. Cassandra </a:t>
+            </a:r>
+            <a:r>
+              <a:rPr lang="it-IT" dirty="0" err="1"/>
+              <a:t>runs</a:t>
+            </a:r>
+            <a:r>
+              <a:rPr lang="it-IT" dirty="0"/>
+              <a:t> in </a:t>
+            </a:r>
+            <a:r>
+              <a:rPr lang="it-IT" dirty="0" err="1"/>
+              <a:t>every</a:t>
+            </a:r>
+            <a:r>
+              <a:rPr lang="it-IT" dirty="0"/>
+              <a:t> </a:t>
+            </a:r>
+            <a:r>
+              <a:rPr lang="it-IT" dirty="0" err="1"/>
+              <a:t>node</a:t>
+            </a:r>
+            <a:r>
+              <a:rPr lang="it-IT" dirty="0"/>
+              <a:t> in a JVM (Java Virtual Machine)</a:t>
+            </a:r>
+          </a:p>
+          <a:p>
+            <a:r>
+              <a:rPr lang="it-IT" dirty="0" err="1"/>
+              <a:t>Typically</a:t>
+            </a:r>
+            <a:r>
+              <a:rPr lang="it-IT" dirty="0"/>
+              <a:t>, a </a:t>
+            </a:r>
+            <a:r>
+              <a:rPr lang="it-IT" dirty="0" err="1"/>
+              <a:t>node</a:t>
+            </a:r>
+            <a:r>
+              <a:rPr lang="it-IT" dirty="0"/>
+              <a:t> </a:t>
+            </a:r>
+            <a:r>
+              <a:rPr lang="it-IT" dirty="0" err="1"/>
+              <a:t>runs</a:t>
+            </a:r>
+            <a:r>
+              <a:rPr lang="it-IT" dirty="0"/>
+              <a:t> on a single commodity machine or VM</a:t>
+            </a:r>
+          </a:p>
+          <a:p>
+            <a:r>
+              <a:rPr lang="it-IT" dirty="0"/>
+              <a:t>A </a:t>
+            </a:r>
+            <a:r>
+              <a:rPr lang="it-IT" dirty="0" err="1"/>
+              <a:t>node</a:t>
+            </a:r>
+            <a:r>
+              <a:rPr lang="it-IT" dirty="0"/>
+              <a:t> </a:t>
+            </a:r>
+            <a:r>
+              <a:rPr lang="it-IT" dirty="0" err="1"/>
+              <a:t>is</a:t>
+            </a:r>
+            <a:r>
+              <a:rPr lang="it-IT" dirty="0"/>
+              <a:t> </a:t>
+            </a:r>
+            <a:r>
+              <a:rPr lang="it-IT" dirty="0" err="1"/>
+              <a:t>responsible</a:t>
+            </a:r>
+            <a:r>
+              <a:rPr lang="it-IT" dirty="0"/>
+              <a:t> for the data </a:t>
+            </a:r>
+            <a:r>
+              <a:rPr lang="it-IT" dirty="0" err="1"/>
+              <a:t>that</a:t>
+            </a:r>
+            <a:r>
+              <a:rPr lang="it-IT" dirty="0"/>
+              <a:t> </a:t>
+            </a:r>
+            <a:r>
+              <a:rPr lang="it-IT" dirty="0" err="1"/>
+              <a:t>it</a:t>
+            </a:r>
+            <a:r>
+              <a:rPr lang="it-IT" dirty="0"/>
+              <a:t> stores</a:t>
+            </a:r>
+          </a:p>
+          <a:p>
+            <a:r>
+              <a:rPr lang="it-IT" dirty="0" err="1"/>
+              <a:t>All</a:t>
+            </a:r>
+            <a:r>
+              <a:rPr lang="it-IT" dirty="0"/>
+              <a:t> the data </a:t>
+            </a:r>
+            <a:r>
+              <a:rPr lang="it-IT" dirty="0" err="1"/>
+              <a:t>is</a:t>
+            </a:r>
+            <a:r>
+              <a:rPr lang="it-IT" dirty="0"/>
+              <a:t> </a:t>
+            </a:r>
+            <a:r>
+              <a:rPr lang="it-IT" dirty="0" err="1"/>
+              <a:t>stored</a:t>
+            </a:r>
+            <a:r>
+              <a:rPr lang="it-IT" dirty="0"/>
+              <a:t> in a </a:t>
+            </a:r>
+            <a:r>
+              <a:rPr lang="it-IT" dirty="0" err="1"/>
+              <a:t>distribuited</a:t>
+            </a:r>
+            <a:r>
+              <a:rPr lang="it-IT" dirty="0"/>
+              <a:t> hash </a:t>
+            </a:r>
+            <a:r>
+              <a:rPr lang="it-IT" dirty="0" err="1"/>
+              <a:t>table</a:t>
+            </a:r>
+            <a:r>
+              <a:rPr lang="it-IT" dirty="0"/>
+              <a:t>, and the data </a:t>
+            </a:r>
+            <a:r>
+              <a:rPr lang="it-IT" dirty="0" err="1"/>
+              <a:t>itself</a:t>
+            </a:r>
+            <a:r>
+              <a:rPr lang="it-IT" dirty="0"/>
+              <a:t> </a:t>
+            </a:r>
+            <a:r>
+              <a:rPr lang="it-IT" dirty="0" err="1"/>
+              <a:t>is</a:t>
+            </a:r>
+            <a:r>
+              <a:rPr lang="it-IT" dirty="0"/>
+              <a:t> </a:t>
+            </a:r>
+            <a:r>
+              <a:rPr lang="it-IT" dirty="0" err="1"/>
+              <a:t>hashed</a:t>
+            </a:r>
+            <a:endParaRPr lang="it-IT" dirty="0"/>
+          </a:p>
+        </p:txBody>
+      </p:sp>
+      <p:pic>
+        <p:nvPicPr>
+          <p:cNvPr id="5" name="Immagine 4">
+            <a:extLst>
+              <a:ext uri="{FF2B5EF4-FFF2-40B4-BE49-F238E27FC236}">
+                <a16:creationId xmlns:a16="http://schemas.microsoft.com/office/drawing/2014/main" id="{BDADD09C-F0BE-4EAE-B73E-5A771F58A170}"/>
+              </a:ext>
+            </a:extLst>
+          </p:cNvPr>
+          <p:cNvPicPr>
+            <a:picLocks noChangeAspect="1"/>
+          </p:cNvPicPr>
+          <p:nvPr/>
+        </p:nvPicPr>
+        <p:blipFill>
+          <a:blip r:embed="rId2"/>
+          <a:stretch>
+            <a:fillRect/>
+          </a:stretch>
+        </p:blipFill>
+        <p:spPr>
+          <a:xfrm>
+            <a:off x="1174694" y="4622245"/>
+            <a:ext cx="2327163" cy="1367208"/>
+          </a:xfrm>
+          <a:prstGeom prst="rect">
+            <a:avLst/>
+          </a:prstGeom>
+        </p:spPr>
+      </p:pic>
+      <p:sp>
+        <p:nvSpPr>
+          <p:cNvPr id="6" name="CasellaDiTesto 5">
+            <a:extLst>
+              <a:ext uri="{FF2B5EF4-FFF2-40B4-BE49-F238E27FC236}">
+                <a16:creationId xmlns:a16="http://schemas.microsoft.com/office/drawing/2014/main" id="{E54095DA-3547-4830-9C5A-299765D0A001}"/>
+              </a:ext>
+            </a:extLst>
+          </p:cNvPr>
+          <p:cNvSpPr txBox="1"/>
+          <p:nvPr/>
+        </p:nvSpPr>
+        <p:spPr>
+          <a:xfrm>
+            <a:off x="832521" y="5945135"/>
+            <a:ext cx="3011510" cy="595106"/>
+          </a:xfrm>
+          <a:prstGeom prst="rect">
+            <a:avLst/>
+          </a:prstGeom>
+          <a:solidFill>
+            <a:schemeClr val="accent1">
+              <a:alpha val="50000"/>
+            </a:schemeClr>
+          </a:solidFill>
+          <a:ln>
+            <a:noFill/>
+          </a:ln>
+        </p:spPr>
+        <p:txBody>
+          <a:bodyPr wrap="square" rtlCol="0">
+            <a:noAutofit/>
+          </a:bodyPr>
+          <a:lstStyle/>
+          <a:p>
+            <a:pPr algn="ctr">
+              <a:spcAft>
+                <a:spcPts val="600"/>
+              </a:spcAft>
+            </a:pPr>
+            <a:r>
+              <a:rPr lang="it-IT" dirty="0">
+                <a:solidFill>
+                  <a:srgbClr val="FFFFFF"/>
+                </a:solidFill>
+              </a:rPr>
+              <a:t>Write </a:t>
+            </a:r>
+            <a:r>
+              <a:rPr lang="it-IT" dirty="0" err="1">
+                <a:solidFill>
+                  <a:srgbClr val="FFFFFF"/>
+                </a:solidFill>
+              </a:rPr>
+              <a:t>operation</a:t>
+            </a:r>
+            <a:r>
+              <a:rPr lang="it-IT" dirty="0">
+                <a:solidFill>
+                  <a:srgbClr val="FFFFFF"/>
+                </a:solidFill>
+              </a:rPr>
+              <a:t>: the data key </a:t>
+            </a:r>
+            <a:r>
+              <a:rPr lang="it-IT" dirty="0" err="1">
+                <a:solidFill>
+                  <a:srgbClr val="FFFFFF"/>
+                </a:solidFill>
+              </a:rPr>
+              <a:t>is</a:t>
+            </a:r>
+            <a:r>
+              <a:rPr lang="it-IT" dirty="0">
+                <a:solidFill>
+                  <a:srgbClr val="FFFFFF"/>
+                </a:solidFill>
+              </a:rPr>
+              <a:t> 55</a:t>
+            </a:r>
+          </a:p>
+        </p:txBody>
+      </p:sp>
+      <p:pic>
+        <p:nvPicPr>
+          <p:cNvPr id="12" name="Immagine 11">
+            <a:extLst>
+              <a:ext uri="{FF2B5EF4-FFF2-40B4-BE49-F238E27FC236}">
+                <a16:creationId xmlns:a16="http://schemas.microsoft.com/office/drawing/2014/main" id="{7C1E6CB9-FA20-4CF1-87BC-65FE09DB4744}"/>
+              </a:ext>
+            </a:extLst>
+          </p:cNvPr>
+          <p:cNvPicPr>
+            <a:picLocks noChangeAspect="1"/>
+          </p:cNvPicPr>
+          <p:nvPr/>
+        </p:nvPicPr>
+        <p:blipFill>
+          <a:blip r:embed="rId3"/>
+          <a:stretch>
+            <a:fillRect/>
+          </a:stretch>
+        </p:blipFill>
+        <p:spPr>
+          <a:xfrm>
+            <a:off x="4418516" y="4622245"/>
+            <a:ext cx="2296563" cy="1285977"/>
+          </a:xfrm>
+          <a:prstGeom prst="rect">
+            <a:avLst/>
+          </a:prstGeom>
+        </p:spPr>
+      </p:pic>
+      <p:sp>
+        <p:nvSpPr>
+          <p:cNvPr id="13" name="CasellaDiTesto 12">
+            <a:extLst>
+              <a:ext uri="{FF2B5EF4-FFF2-40B4-BE49-F238E27FC236}">
+                <a16:creationId xmlns:a16="http://schemas.microsoft.com/office/drawing/2014/main" id="{B976609E-BDA7-443F-B48A-AB597BFF0719}"/>
+              </a:ext>
+            </a:extLst>
+          </p:cNvPr>
+          <p:cNvSpPr txBox="1"/>
+          <p:nvPr/>
+        </p:nvSpPr>
+        <p:spPr>
+          <a:xfrm>
+            <a:off x="4128117" y="5945134"/>
+            <a:ext cx="2877363" cy="595106"/>
+          </a:xfrm>
+          <a:prstGeom prst="rect">
+            <a:avLst/>
+          </a:prstGeom>
+          <a:solidFill>
+            <a:schemeClr val="accent1">
+              <a:alpha val="50000"/>
+            </a:schemeClr>
+          </a:solidFill>
+          <a:ln>
+            <a:noFill/>
+          </a:ln>
+        </p:spPr>
+        <p:txBody>
+          <a:bodyPr wrap="square" rtlCol="0">
+            <a:noAutofit/>
+          </a:bodyPr>
+          <a:lstStyle/>
+          <a:p>
+            <a:pPr algn="ctr">
+              <a:spcAft>
+                <a:spcPts val="600"/>
+              </a:spcAft>
+            </a:pPr>
+            <a:r>
+              <a:rPr lang="it-IT" dirty="0">
+                <a:solidFill>
+                  <a:srgbClr val="FFFFFF"/>
+                </a:solidFill>
+              </a:rPr>
+              <a:t>Read </a:t>
+            </a:r>
+            <a:r>
+              <a:rPr lang="it-IT" dirty="0" err="1">
+                <a:solidFill>
+                  <a:srgbClr val="FFFFFF"/>
+                </a:solidFill>
+              </a:rPr>
+              <a:t>operation</a:t>
+            </a:r>
+            <a:r>
+              <a:rPr lang="it-IT" dirty="0">
+                <a:solidFill>
+                  <a:srgbClr val="FFFFFF"/>
+                </a:solidFill>
+              </a:rPr>
+              <a:t>: the data key to </a:t>
+            </a:r>
+            <a:r>
+              <a:rPr lang="it-IT" dirty="0" err="1">
+                <a:solidFill>
+                  <a:srgbClr val="FFFFFF"/>
+                </a:solidFill>
+              </a:rPr>
+              <a:t>find</a:t>
+            </a:r>
+            <a:r>
+              <a:rPr lang="it-IT" dirty="0">
+                <a:solidFill>
+                  <a:srgbClr val="FFFFFF"/>
+                </a:solidFill>
+              </a:rPr>
+              <a:t> </a:t>
+            </a:r>
+            <a:r>
+              <a:rPr lang="it-IT" dirty="0" err="1">
+                <a:solidFill>
+                  <a:srgbClr val="FFFFFF"/>
+                </a:solidFill>
+              </a:rPr>
+              <a:t>is</a:t>
+            </a:r>
+            <a:r>
+              <a:rPr lang="it-IT" dirty="0">
+                <a:solidFill>
+                  <a:srgbClr val="FFFFFF"/>
+                </a:solidFill>
+              </a:rPr>
+              <a:t> 22</a:t>
+            </a:r>
+          </a:p>
+        </p:txBody>
+      </p:sp>
+      <p:pic>
+        <p:nvPicPr>
+          <p:cNvPr id="17" name="Immagine 16">
+            <a:extLst>
+              <a:ext uri="{FF2B5EF4-FFF2-40B4-BE49-F238E27FC236}">
+                <a16:creationId xmlns:a16="http://schemas.microsoft.com/office/drawing/2014/main" id="{8C667B68-F8AF-481B-8761-C28978FBDD38}"/>
+              </a:ext>
+            </a:extLst>
+          </p:cNvPr>
+          <p:cNvPicPr>
+            <a:picLocks noChangeAspect="1"/>
+          </p:cNvPicPr>
+          <p:nvPr/>
+        </p:nvPicPr>
+        <p:blipFill>
+          <a:blip r:embed="rId4"/>
+          <a:stretch>
+            <a:fillRect/>
+          </a:stretch>
+        </p:blipFill>
+        <p:spPr>
+          <a:xfrm>
+            <a:off x="9126945" y="759922"/>
+            <a:ext cx="2392690" cy="1972574"/>
+          </a:xfrm>
+          <a:prstGeom prst="rect">
+            <a:avLst/>
+          </a:prstGeom>
+        </p:spPr>
+      </p:pic>
+      <p:pic>
+        <p:nvPicPr>
+          <p:cNvPr id="19" name="Immagine 18">
+            <a:extLst>
+              <a:ext uri="{FF2B5EF4-FFF2-40B4-BE49-F238E27FC236}">
+                <a16:creationId xmlns:a16="http://schemas.microsoft.com/office/drawing/2014/main" id="{0CC9ED88-AD82-4578-B6AC-C909E70F0E5F}"/>
+              </a:ext>
+            </a:extLst>
+          </p:cNvPr>
+          <p:cNvPicPr>
+            <a:picLocks noChangeAspect="1"/>
+          </p:cNvPicPr>
+          <p:nvPr/>
+        </p:nvPicPr>
+        <p:blipFill>
+          <a:blip r:embed="rId5"/>
+          <a:stretch>
+            <a:fillRect/>
+          </a:stretch>
+        </p:blipFill>
+        <p:spPr>
+          <a:xfrm>
+            <a:off x="7930600" y="4159593"/>
+            <a:ext cx="2392690" cy="2429066"/>
+          </a:xfrm>
+          <a:prstGeom prst="rect">
+            <a:avLst/>
+          </a:prstGeom>
+        </p:spPr>
+      </p:pic>
+      <p:cxnSp>
+        <p:nvCxnSpPr>
+          <p:cNvPr id="21" name="Connettore 2 20">
+            <a:extLst>
+              <a:ext uri="{FF2B5EF4-FFF2-40B4-BE49-F238E27FC236}">
+                <a16:creationId xmlns:a16="http://schemas.microsoft.com/office/drawing/2014/main" id="{92F7770B-6739-4F73-8FA9-626DCFF9D009}"/>
+              </a:ext>
+            </a:extLst>
+          </p:cNvPr>
+          <p:cNvCxnSpPr>
+            <a:cxnSpLocks/>
+            <a:endCxn id="19" idx="0"/>
+          </p:cNvCxnSpPr>
+          <p:nvPr/>
+        </p:nvCxnSpPr>
+        <p:spPr>
+          <a:xfrm flipH="1">
+            <a:off x="9126945" y="2698407"/>
+            <a:ext cx="733908" cy="1461186"/>
+          </a:xfrm>
+          <a:prstGeom prst="straightConnector1">
+            <a:avLst/>
+          </a:prstGeom>
+          <a:ln w="76200">
+            <a:tailEnd type="triangle"/>
+          </a:ln>
+        </p:spPr>
+        <p:style>
+          <a:lnRef idx="1">
+            <a:schemeClr val="accent1"/>
+          </a:lnRef>
+          <a:fillRef idx="0">
+            <a:schemeClr val="accent1"/>
+          </a:fillRef>
+          <a:effectRef idx="0">
+            <a:schemeClr val="accent1"/>
+          </a:effectRef>
+          <a:fontRef idx="minor">
+            <a:schemeClr val="tx1"/>
+          </a:fontRef>
+        </p:style>
+      </p:cxnSp>
+      <p:sp>
+        <p:nvSpPr>
+          <p:cNvPr id="22" name="CasellaDiTesto 21">
+            <a:extLst>
+              <a:ext uri="{FF2B5EF4-FFF2-40B4-BE49-F238E27FC236}">
+                <a16:creationId xmlns:a16="http://schemas.microsoft.com/office/drawing/2014/main" id="{160B8D1F-3460-4822-AA41-3C26DD1CF103}"/>
+              </a:ext>
+            </a:extLst>
+          </p:cNvPr>
+          <p:cNvSpPr txBox="1"/>
+          <p:nvPr/>
+        </p:nvSpPr>
+        <p:spPr>
+          <a:xfrm>
+            <a:off x="9848395" y="2959264"/>
+            <a:ext cx="2219613" cy="1200329"/>
+          </a:xfrm>
+          <a:prstGeom prst="rect">
+            <a:avLst/>
+          </a:prstGeom>
+          <a:noFill/>
+        </p:spPr>
+        <p:txBody>
+          <a:bodyPr wrap="square" rtlCol="0">
+            <a:spAutoFit/>
+          </a:bodyPr>
+          <a:lstStyle/>
+          <a:p>
+            <a:r>
+              <a:rPr lang="it-IT" dirty="0" err="1"/>
+              <a:t>When</a:t>
+            </a:r>
+            <a:r>
+              <a:rPr lang="it-IT" dirty="0"/>
+              <a:t> the load </a:t>
+            </a:r>
+            <a:r>
+              <a:rPr lang="it-IT" dirty="0" err="1"/>
+              <a:t>becomes</a:t>
+            </a:r>
+            <a:r>
+              <a:rPr lang="it-IT" dirty="0"/>
+              <a:t> </a:t>
+            </a:r>
+            <a:r>
+              <a:rPr lang="it-IT" dirty="0" err="1"/>
+              <a:t>too</a:t>
+            </a:r>
+            <a:r>
+              <a:rPr lang="it-IT" dirty="0"/>
+              <a:t> heavy, we just </a:t>
+            </a:r>
+            <a:r>
+              <a:rPr lang="it-IT" dirty="0" err="1"/>
+              <a:t>add</a:t>
+            </a:r>
+            <a:r>
+              <a:rPr lang="it-IT" dirty="0"/>
+              <a:t> more </a:t>
+            </a:r>
+            <a:r>
+              <a:rPr lang="it-IT" dirty="0" err="1"/>
+              <a:t>nodes</a:t>
+            </a:r>
+            <a:endParaRPr lang="it-IT" dirty="0"/>
+          </a:p>
+        </p:txBody>
+      </p:sp>
+    </p:spTree>
+    <p:extLst>
+      <p:ext uri="{BB962C8B-B14F-4D97-AF65-F5344CB8AC3E}">
+        <p14:creationId xmlns:p14="http://schemas.microsoft.com/office/powerpoint/2010/main" val="4026792594"/>
+      </p:ext>
+    </p:extLst>
+  </p:cSld>
+  <p:clrMapOvr>
+    <a:masterClrMapping/>
+  </p:clrMapOvr>
+</p:sld>
+</file>
+
+<file path=ppt/slides/slide6.xml><?xml version="1.0" encoding="utf-8"?>
+<p:sld xmlns:a="http://schemas.openxmlformats.org/drawingml/2006/main" xmlns:r="http://schemas.openxmlformats.org/officeDocument/2006/relationships" xmlns:p="http://schemas.openxmlformats.org/presentationml/2006/main">
+  <p:cSld>
+    <p:bg>
+      <p:bgPr>
+        <a:solidFill>
+          <a:schemeClr val="bg1"/>
+        </a:solidFill>
+        <a:effectLst/>
+      </p:bgPr>
+    </p:bg>
+    <p:spTree>
+      <p:nvGrpSpPr>
+        <p:cNvPr id="1" name=""/>
+        <p:cNvGrpSpPr/>
+        <p:nvPr/>
+      </p:nvGrpSpPr>
+      <p:grpSpPr>
+        <a:xfrm>
+          <a:off x="0" y="0"/>
+          <a:ext cx="0" cy="0"/>
+          <a:chOff x="0" y="0"/>
+          <a:chExt cx="0" cy="0"/>
+        </a:xfrm>
+      </p:grpSpPr>
+      <p:sp>
+        <p:nvSpPr>
           <p:cNvPr id="12" name="Rectangle 11">
             <a:extLst>
               <a:ext uri="{FF2B5EF4-FFF2-40B4-BE49-F238E27FC236}">
@@ -11718,7 +14605,7 @@
 </p:sld>
 </file>
 
-<file path=ppt/slides/slide6.xml><?xml version="1.0" encoding="utf-8"?>
+<file path=ppt/slides/slide7.xml><?xml version="1.0" encoding="utf-8"?>
 <p:sld xmlns:a="http://schemas.openxmlformats.org/drawingml/2006/main" xmlns:r="http://schemas.openxmlformats.org/officeDocument/2006/relationships" xmlns:p="http://schemas.openxmlformats.org/presentationml/2006/main">
   <p:cSld>
     <p:spTree>
@@ -12491,7 +15378,7 @@
 </p:sld>
 </file>
 
-<file path=ppt/slides/slide7.xml><?xml version="1.0" encoding="utf-8"?>
+<file path=ppt/slides/slide8.xml><?xml version="1.0" encoding="utf-8"?>
 <p:sld xmlns:a="http://schemas.openxmlformats.org/drawingml/2006/main" xmlns:r="http://schemas.openxmlformats.org/officeDocument/2006/relationships" xmlns:p="http://schemas.openxmlformats.org/presentationml/2006/main">
   <p:cSld>
     <p:spTree>
@@ -13286,7 +16173,7 @@
 </p:sld>
 </file>
 
-<file path=ppt/slides/slide8.xml><?xml version="1.0" encoding="utf-8"?>
+<file path=ppt/slides/slide9.xml><?xml version="1.0" encoding="utf-8"?>
 <p:sld xmlns:a="http://schemas.openxmlformats.org/drawingml/2006/main" xmlns:r="http://schemas.openxmlformats.org/officeDocument/2006/relationships" xmlns:p="http://schemas.openxmlformats.org/presentationml/2006/main">
   <p:cSld>
     <p:spTree>
@@ -13372,134 +16259,6 @@
     <p:extLst>
       <p:ext uri="{BB962C8B-B14F-4D97-AF65-F5344CB8AC3E}">
         <p14:creationId xmlns:p14="http://schemas.microsoft.com/office/powerpoint/2010/main" val="2884383781"/>
-      </p:ext>
-    </p:extLst>
-  </p:cSld>
-  <p:clrMapOvr>
-    <a:masterClrMapping/>
-  </p:clrMapOvr>
-</p:sld>
-</file>
-
-<file path=ppt/slides/slide9.xml><?xml version="1.0" encoding="utf-8"?>
-<p:sld xmlns:a="http://schemas.openxmlformats.org/drawingml/2006/main" xmlns:r="http://schemas.openxmlformats.org/officeDocument/2006/relationships" xmlns:p="http://schemas.openxmlformats.org/presentationml/2006/main">
-  <p:cSld>
-    <p:spTree>
-      <p:nvGrpSpPr>
-        <p:cNvPr id="1" name=""/>
-        <p:cNvGrpSpPr/>
-        <p:nvPr/>
-      </p:nvGrpSpPr>
-      <p:grpSpPr>
-        <a:xfrm>
-          <a:off x="0" y="0"/>
-          <a:ext cx="0" cy="0"/>
-          <a:chOff x="0" y="0"/>
-          <a:chExt cx="0" cy="0"/>
-        </a:xfrm>
-      </p:grpSpPr>
-      <p:sp>
-        <p:nvSpPr>
-          <p:cNvPr id="2" name="Titolo 1">
-            <a:extLst>
-              <a:ext uri="{FF2B5EF4-FFF2-40B4-BE49-F238E27FC236}">
-                <a16:creationId xmlns:a16="http://schemas.microsoft.com/office/drawing/2014/main" id="{9719ACE6-A9F9-4E44-AF4B-4F84DD8DE34F}"/>
-              </a:ext>
-            </a:extLst>
-          </p:cNvPr>
-          <p:cNvSpPr>
-            <a:spLocks noGrp="1"/>
-          </p:cNvSpPr>
-          <p:nvPr>
-            <p:ph type="title"/>
-          </p:nvPr>
-        </p:nvSpPr>
-        <p:spPr/>
-        <p:txBody>
-          <a:bodyPr/>
-          <a:lstStyle/>
-          <a:p>
-            <a:r>
-              <a:rPr lang="it-IT" dirty="0"/>
-              <a:t>ring</a:t>
-            </a:r>
-          </a:p>
-        </p:txBody>
-      </p:sp>
-      <p:sp>
-        <p:nvSpPr>
-          <p:cNvPr id="3" name="Segnaposto contenuto 2">
-            <a:extLst>
-              <a:ext uri="{FF2B5EF4-FFF2-40B4-BE49-F238E27FC236}">
-                <a16:creationId xmlns:a16="http://schemas.microsoft.com/office/drawing/2014/main" id="{7AC476F3-1483-4E69-9F67-C8F4B3609278}"/>
-              </a:ext>
-            </a:extLst>
-          </p:cNvPr>
-          <p:cNvSpPr>
-            <a:spLocks noGrp="1"/>
-          </p:cNvSpPr>
-          <p:nvPr>
-            <p:ph idx="1"/>
-          </p:nvPr>
-        </p:nvSpPr>
-        <p:spPr/>
-        <p:txBody>
-          <a:bodyPr/>
-          <a:lstStyle/>
-          <a:p>
-            <a:r>
-              <a:rPr lang="it-IT" dirty="0"/>
-              <a:t>Come funziona </a:t>
-            </a:r>
-            <a:r>
-              <a:rPr lang="it-IT" dirty="0" err="1"/>
-              <a:t>etc</a:t>
-            </a:r>
-            <a:endParaRPr lang="it-IT" dirty="0"/>
-          </a:p>
-          <a:p>
-            <a:endParaRPr lang="it-IT" dirty="0"/>
-          </a:p>
-          <a:p>
-            <a:r>
-              <a:rPr lang="it-IT" dirty="0" err="1"/>
-              <a:t>But</a:t>
-            </a:r>
-            <a:r>
-              <a:rPr lang="it-IT" dirty="0"/>
-              <a:t> </a:t>
-            </a:r>
-            <a:r>
-              <a:rPr lang="it-IT" dirty="0" err="1"/>
-              <a:t>what</a:t>
-            </a:r>
-            <a:r>
-              <a:rPr lang="it-IT" dirty="0"/>
-              <a:t> </a:t>
-            </a:r>
-            <a:r>
-              <a:rPr lang="it-IT" dirty="0" err="1"/>
-              <a:t>is</a:t>
-            </a:r>
-            <a:r>
-              <a:rPr lang="it-IT" dirty="0"/>
-              <a:t> a </a:t>
-            </a:r>
-            <a:r>
-              <a:rPr lang="it-IT" dirty="0" err="1"/>
-              <a:t>partition</a:t>
-            </a:r>
-            <a:r>
-              <a:rPr lang="it-IT" dirty="0"/>
-              <a:t> key?</a:t>
-            </a:r>
-          </a:p>
-        </p:txBody>
-      </p:sp>
-    </p:spTree>
-    <p:extLst>
-      <p:ext uri="{BB962C8B-B14F-4D97-AF65-F5344CB8AC3E}">
-        <p14:creationId xmlns:p14="http://schemas.microsoft.com/office/powerpoint/2010/main" val="2926037492"/>
       </p:ext>
     </p:extLst>
   </p:cSld>

</xml_diff>

<commit_message>
pptx - cassandra vnodes
</commit_message>
<xml_diff>
--- a/Cassandra project.pptx
+++ b/Cassandra project.pptx
@@ -5,7 +5,7 @@
     <p:sldMasterId id="2147483648" r:id="rId1"/>
   </p:sldMasterIdLst>
   <p:notesMasterIdLst>
-    <p:notesMasterId r:id="rId23"/>
+    <p:notesMasterId r:id="rId25"/>
   </p:notesMasterIdLst>
   <p:sldIdLst>
     <p:sldId id="256" r:id="rId2"/>
@@ -19,16 +19,18 @@
     <p:sldId id="262" r:id="rId10"/>
     <p:sldId id="268" r:id="rId11"/>
     <p:sldId id="276" r:id="rId12"/>
-    <p:sldId id="273" r:id="rId13"/>
-    <p:sldId id="269" r:id="rId14"/>
-    <p:sldId id="265" r:id="rId15"/>
-    <p:sldId id="267" r:id="rId16"/>
-    <p:sldId id="270" r:id="rId17"/>
-    <p:sldId id="271" r:id="rId18"/>
-    <p:sldId id="274" r:id="rId19"/>
-    <p:sldId id="272" r:id="rId20"/>
-    <p:sldId id="263" r:id="rId21"/>
-    <p:sldId id="264" r:id="rId22"/>
+    <p:sldId id="277" r:id="rId13"/>
+    <p:sldId id="278" r:id="rId14"/>
+    <p:sldId id="273" r:id="rId15"/>
+    <p:sldId id="269" r:id="rId16"/>
+    <p:sldId id="265" r:id="rId17"/>
+    <p:sldId id="267" r:id="rId18"/>
+    <p:sldId id="270" r:id="rId19"/>
+    <p:sldId id="271" r:id="rId20"/>
+    <p:sldId id="274" r:id="rId21"/>
+    <p:sldId id="272" r:id="rId22"/>
+    <p:sldId id="263" r:id="rId23"/>
+    <p:sldId id="264" r:id="rId24"/>
   </p:sldIdLst>
   <p:sldSz cx="12192000" cy="6858000"/>
   <p:notesSz cx="6858000" cy="9144000"/>
@@ -769,7 +771,7 @@
           <a:p>
             <a:fld id="{C2600658-D8C1-4431-8AE6-1561B6C7C846}" type="slidenum">
               <a:rPr lang="it-IT" smtClean="0"/>
-              <a:t>14</a:t>
+              <a:t>16</a:t>
             </a:fld>
             <a:endParaRPr lang="it-IT"/>
           </a:p>
@@ -4164,7 +4166,7 @@
         </p:nvSpPr>
         <p:spPr>
           <a:xfrm>
-            <a:off x="812800" y="1970843"/>
+            <a:off x="812800" y="1873187"/>
             <a:ext cx="6901098" cy="5110677"/>
           </a:xfrm>
         </p:spPr>
@@ -4606,7 +4608,7 @@
             </a:r>
             <a:r>
               <a:rPr lang="it-IT" dirty="0" err="1"/>
-              <a:t>sended</a:t>
+              <a:t>sent</a:t>
             </a:r>
             <a:r>
               <a:rPr lang="it-IT" dirty="0"/>
@@ -5209,7 +5211,10 @@
           <a:bodyPr/>
           <a:lstStyle/>
           <a:p>
-            <a:endParaRPr lang="it-IT"/>
+            <a:r>
+              <a:rPr lang="it-IT" dirty="0"/>
+              <a:t>Ring</a:t>
+            </a:r>
           </a:p>
         </p:txBody>
       </p:sp>
@@ -5229,12 +5234,836 @@
             <p:ph idx="1"/>
           </p:nvPr>
         </p:nvSpPr>
-        <p:spPr/>
+        <p:spPr>
+          <a:xfrm>
+            <a:off x="719091" y="2249424"/>
+            <a:ext cx="6709197" cy="4023360"/>
+          </a:xfrm>
+        </p:spPr>
         <p:txBody>
-          <a:bodyPr/>
+          <a:bodyPr>
+            <a:normAutofit/>
+          </a:bodyPr>
           <a:lstStyle/>
           <a:p>
+            <a:r>
+              <a:rPr lang="it-IT" sz="2400" dirty="0"/>
+              <a:t>The </a:t>
+            </a:r>
+            <a:r>
+              <a:rPr lang="it-IT" sz="2400" dirty="0" err="1"/>
+              <a:t>real</a:t>
+            </a:r>
+            <a:r>
+              <a:rPr lang="it-IT" sz="2400" dirty="0"/>
+              <a:t> range </a:t>
+            </a:r>
+            <a:r>
+              <a:rPr lang="it-IT" sz="2400" dirty="0" err="1"/>
+              <a:t>goes</a:t>
+            </a:r>
+            <a:r>
+              <a:rPr lang="it-IT" sz="2400" dirty="0"/>
+              <a:t> from -2</a:t>
+            </a:r>
+            <a:r>
+              <a:rPr lang="it-IT" sz="2400" baseline="30000" dirty="0"/>
+              <a:t>63</a:t>
+            </a:r>
+            <a:r>
+              <a:rPr lang="it-IT" sz="2400" dirty="0"/>
+              <a:t> to 2</a:t>
+            </a:r>
+            <a:r>
+              <a:rPr lang="it-IT" sz="2400" baseline="30000" dirty="0"/>
+              <a:t>63</a:t>
+            </a:r>
+            <a:r>
+              <a:rPr lang="it-IT" sz="2400" dirty="0"/>
+              <a:t>-1</a:t>
+            </a:r>
+          </a:p>
+          <a:p>
+            <a:r>
+              <a:rPr lang="it-IT" sz="2400" dirty="0"/>
+              <a:t>How are the token </a:t>
+            </a:r>
+            <a:r>
+              <a:rPr lang="it-IT" sz="2400" dirty="0" err="1"/>
+              <a:t>distribuited</a:t>
+            </a:r>
+            <a:r>
+              <a:rPr lang="it-IT" sz="2400" dirty="0"/>
+              <a:t>?</a:t>
+            </a:r>
+          </a:p>
+          <a:p>
+            <a:r>
+              <a:rPr lang="it-IT" sz="2400" dirty="0"/>
+              <a:t>The </a:t>
+            </a:r>
+            <a:r>
+              <a:rPr lang="it-IT" sz="2400" b="1" dirty="0" err="1"/>
+              <a:t>partitioner</a:t>
+            </a:r>
+            <a:r>
+              <a:rPr lang="it-IT" sz="2400" dirty="0"/>
+              <a:t> </a:t>
+            </a:r>
+            <a:r>
+              <a:rPr lang="it-IT" sz="2400" dirty="0" err="1"/>
+              <a:t>determines</a:t>
+            </a:r>
+            <a:r>
+              <a:rPr lang="it-IT" sz="2400" dirty="0"/>
+              <a:t> </a:t>
+            </a:r>
+            <a:r>
+              <a:rPr lang="it-IT" sz="2400" dirty="0" err="1"/>
+              <a:t>how</a:t>
+            </a:r>
+            <a:r>
+              <a:rPr lang="it-IT" sz="2400" dirty="0"/>
+              <a:t> the data </a:t>
+            </a:r>
+            <a:r>
+              <a:rPr lang="it-IT" sz="2400" dirty="0" err="1"/>
+              <a:t>is</a:t>
+            </a:r>
+            <a:r>
+              <a:rPr lang="it-IT" sz="2400" dirty="0"/>
+              <a:t> </a:t>
+            </a:r>
+            <a:r>
+              <a:rPr lang="it-IT" sz="2400" dirty="0" err="1"/>
+              <a:t>distributed</a:t>
+            </a:r>
+            <a:r>
+              <a:rPr lang="it-IT" sz="2400" dirty="0"/>
+              <a:t> </a:t>
+            </a:r>
+            <a:r>
+              <a:rPr lang="it-IT" sz="2400" dirty="0" err="1"/>
+              <a:t>across</a:t>
+            </a:r>
+            <a:r>
+              <a:rPr lang="it-IT" sz="2400" dirty="0"/>
+              <a:t> the ring</a:t>
+            </a:r>
+          </a:p>
+          <a:p>
+            <a:pPr lvl="1"/>
+            <a:r>
+              <a:rPr lang="it-IT" sz="2400" dirty="0" err="1"/>
+              <a:t>If</a:t>
+            </a:r>
+            <a:r>
+              <a:rPr lang="it-IT" sz="2400" dirty="0"/>
+              <a:t> </a:t>
+            </a:r>
+            <a:r>
+              <a:rPr lang="it-IT" sz="2400" dirty="0" err="1"/>
+              <a:t>it</a:t>
+            </a:r>
+            <a:r>
+              <a:rPr lang="it-IT" sz="2400" dirty="0"/>
+              <a:t> </a:t>
+            </a:r>
+            <a:r>
+              <a:rPr lang="it-IT" sz="2400" dirty="0" err="1"/>
+              <a:t>gets</a:t>
+            </a:r>
+            <a:r>
+              <a:rPr lang="it-IT" sz="2400" dirty="0"/>
+              <a:t> </a:t>
+            </a:r>
+            <a:r>
+              <a:rPr lang="it-IT" sz="2400" dirty="0" err="1"/>
+              <a:t>mess</a:t>
+            </a:r>
+            <a:r>
+              <a:rPr lang="it-IT" sz="2400" dirty="0"/>
+              <a:t> up, data </a:t>
+            </a:r>
+            <a:r>
+              <a:rPr lang="it-IT" sz="2400" dirty="0" err="1"/>
+              <a:t>will</a:t>
+            </a:r>
+            <a:r>
+              <a:rPr lang="it-IT" sz="2400" dirty="0"/>
+              <a:t> </a:t>
+            </a:r>
+            <a:r>
+              <a:rPr lang="it-IT" sz="2400" dirty="0" err="1"/>
+              <a:t>land</a:t>
+            </a:r>
+            <a:r>
+              <a:rPr lang="it-IT" sz="2400" dirty="0"/>
+              <a:t> to hotspots in the ring: some </a:t>
+            </a:r>
+            <a:r>
+              <a:rPr lang="it-IT" sz="2400" dirty="0" err="1"/>
+              <a:t>nodes</a:t>
+            </a:r>
+            <a:r>
+              <a:rPr lang="it-IT" sz="2400" dirty="0"/>
+              <a:t> </a:t>
+            </a:r>
+            <a:r>
+              <a:rPr lang="it-IT" sz="2400" dirty="0" err="1"/>
+              <a:t>will</a:t>
+            </a:r>
+            <a:r>
+              <a:rPr lang="it-IT" sz="2400" dirty="0"/>
+              <a:t> be </a:t>
+            </a:r>
+            <a:r>
+              <a:rPr lang="it-IT" sz="2400" dirty="0" err="1"/>
+              <a:t>overloaded</a:t>
+            </a:r>
+            <a:r>
+              <a:rPr lang="it-IT" sz="2400" dirty="0"/>
+              <a:t> and some </a:t>
+            </a:r>
+            <a:r>
+              <a:rPr lang="it-IT" sz="2400" dirty="0" err="1"/>
+              <a:t>not</a:t>
+            </a:r>
+            <a:endParaRPr lang="it-IT" sz="2400" dirty="0"/>
+          </a:p>
+          <a:p>
+            <a:pPr lvl="1"/>
+            <a:r>
+              <a:rPr lang="it-IT" sz="2400" dirty="0"/>
+              <a:t>Using an appropriate hash </a:t>
+            </a:r>
+            <a:r>
+              <a:rPr lang="it-IT" sz="2400" dirty="0" err="1"/>
+              <a:t>function</a:t>
+            </a:r>
+            <a:r>
+              <a:rPr lang="it-IT" sz="2400" dirty="0"/>
+              <a:t> </a:t>
+            </a:r>
+            <a:r>
+              <a:rPr lang="it-IT" sz="2400" dirty="0" err="1"/>
+              <a:t>is</a:t>
+            </a:r>
+            <a:r>
+              <a:rPr lang="it-IT" sz="2400" dirty="0"/>
+              <a:t> </a:t>
+            </a:r>
+            <a:r>
+              <a:rPr lang="it-IT" sz="2400" dirty="0" err="1"/>
+              <a:t>important</a:t>
+            </a:r>
+            <a:r>
+              <a:rPr lang="it-IT" sz="2400" dirty="0"/>
+              <a:t> for </a:t>
+            </a:r>
+            <a:r>
+              <a:rPr lang="it-IT" sz="2400" dirty="0" err="1"/>
+              <a:t>distribution</a:t>
+            </a:r>
+            <a:r>
+              <a:rPr lang="it-IT" sz="2400" dirty="0"/>
+              <a:t>, like MD5</a:t>
+            </a:r>
+          </a:p>
+        </p:txBody>
+      </p:sp>
+      <p:pic>
+        <p:nvPicPr>
+          <p:cNvPr id="5" name="Immagine 4">
+            <a:extLst>
+              <a:ext uri="{FF2B5EF4-FFF2-40B4-BE49-F238E27FC236}">
+                <a16:creationId xmlns:a16="http://schemas.microsoft.com/office/drawing/2014/main" id="{C5A40417-F2B4-4DF0-8028-0FDCD2FD3D84}"/>
+              </a:ext>
+            </a:extLst>
+          </p:cNvPr>
+          <p:cNvPicPr>
+            <a:picLocks noChangeAspect="1"/>
+          </p:cNvPicPr>
+          <p:nvPr/>
+        </p:nvPicPr>
+        <p:blipFill>
+          <a:blip r:embed="rId2"/>
+          <a:stretch>
+            <a:fillRect/>
+          </a:stretch>
+        </p:blipFill>
+        <p:spPr>
+          <a:xfrm>
+            <a:off x="7305117" y="1216241"/>
+            <a:ext cx="4608716" cy="4714316"/>
+          </a:xfrm>
+          <a:prstGeom prst="rect">
+            <a:avLst/>
+          </a:prstGeom>
+        </p:spPr>
+      </p:pic>
+      <p:sp>
+        <p:nvSpPr>
+          <p:cNvPr id="6" name="Ovale 5">
+            <a:extLst>
+              <a:ext uri="{FF2B5EF4-FFF2-40B4-BE49-F238E27FC236}">
+                <a16:creationId xmlns:a16="http://schemas.microsoft.com/office/drawing/2014/main" id="{3D887584-3D8B-41E7-B3E2-2036171ECFBB}"/>
+              </a:ext>
+            </a:extLst>
+          </p:cNvPr>
+          <p:cNvSpPr/>
+          <p:nvPr/>
+        </p:nvSpPr>
+        <p:spPr>
+          <a:xfrm>
+            <a:off x="8454119" y="2539530"/>
+            <a:ext cx="199271" cy="197687"/>
+          </a:xfrm>
+          <a:prstGeom prst="ellipse">
+            <a:avLst/>
+          </a:prstGeom>
+          <a:solidFill>
+            <a:srgbClr val="FFC000"/>
+          </a:solidFill>
+          <a:ln>
+            <a:noFill/>
+          </a:ln>
+        </p:spPr>
+        <p:style>
+          <a:lnRef idx="2">
+            <a:schemeClr val="accent4">
+              <a:shade val="50000"/>
+            </a:schemeClr>
+          </a:lnRef>
+          <a:fillRef idx="1">
+            <a:schemeClr val="accent4"/>
+          </a:fillRef>
+          <a:effectRef idx="0">
+            <a:schemeClr val="accent4"/>
+          </a:effectRef>
+          <a:fontRef idx="minor">
+            <a:schemeClr val="lt1"/>
+          </a:fontRef>
+        </p:style>
+        <p:txBody>
+          <a:bodyPr rtlCol="0" anchor="ctr"/>
+          <a:lstStyle/>
+          <a:p>
+            <a:pPr algn="ctr"/>
             <a:endParaRPr lang="it-IT"/>
+          </a:p>
+        </p:txBody>
+      </p:sp>
+      <p:sp>
+        <p:nvSpPr>
+          <p:cNvPr id="7" name="Ovale 6">
+            <a:extLst>
+              <a:ext uri="{FF2B5EF4-FFF2-40B4-BE49-F238E27FC236}">
+                <a16:creationId xmlns:a16="http://schemas.microsoft.com/office/drawing/2014/main" id="{22B5374C-C531-4645-BB5C-FC9E401ACEB8}"/>
+              </a:ext>
+            </a:extLst>
+          </p:cNvPr>
+          <p:cNvSpPr/>
+          <p:nvPr/>
+        </p:nvSpPr>
+        <p:spPr>
+          <a:xfrm>
+            <a:off x="8346745" y="2721522"/>
+            <a:ext cx="199271" cy="197687"/>
+          </a:xfrm>
+          <a:prstGeom prst="ellipse">
+            <a:avLst/>
+          </a:prstGeom>
+          <a:solidFill>
+            <a:srgbClr val="FFC000"/>
+          </a:solidFill>
+          <a:ln>
+            <a:noFill/>
+          </a:ln>
+        </p:spPr>
+        <p:style>
+          <a:lnRef idx="2">
+            <a:schemeClr val="accent4">
+              <a:shade val="50000"/>
+            </a:schemeClr>
+          </a:lnRef>
+          <a:fillRef idx="1">
+            <a:schemeClr val="accent4"/>
+          </a:fillRef>
+          <a:effectRef idx="0">
+            <a:schemeClr val="accent4"/>
+          </a:effectRef>
+          <a:fontRef idx="minor">
+            <a:schemeClr val="lt1"/>
+          </a:fontRef>
+        </p:style>
+        <p:txBody>
+          <a:bodyPr rtlCol="0" anchor="ctr"/>
+          <a:lstStyle/>
+          <a:p>
+            <a:pPr algn="ctr"/>
+            <a:endParaRPr lang="it-IT"/>
+          </a:p>
+        </p:txBody>
+      </p:sp>
+      <p:sp>
+        <p:nvSpPr>
+          <p:cNvPr id="8" name="Ovale 7">
+            <a:extLst>
+              <a:ext uri="{FF2B5EF4-FFF2-40B4-BE49-F238E27FC236}">
+                <a16:creationId xmlns:a16="http://schemas.microsoft.com/office/drawing/2014/main" id="{DE1335FE-CD97-4EA1-BAFF-FDAF143D3134}"/>
+              </a:ext>
+            </a:extLst>
+          </p:cNvPr>
+          <p:cNvSpPr/>
+          <p:nvPr/>
+        </p:nvSpPr>
+        <p:spPr>
+          <a:xfrm>
+            <a:off x="8187091" y="2570602"/>
+            <a:ext cx="199271" cy="197687"/>
+          </a:xfrm>
+          <a:prstGeom prst="ellipse">
+            <a:avLst/>
+          </a:prstGeom>
+          <a:solidFill>
+            <a:srgbClr val="FFC000"/>
+          </a:solidFill>
+          <a:ln>
+            <a:noFill/>
+          </a:ln>
+        </p:spPr>
+        <p:style>
+          <a:lnRef idx="2">
+            <a:schemeClr val="accent4">
+              <a:shade val="50000"/>
+            </a:schemeClr>
+          </a:lnRef>
+          <a:fillRef idx="1">
+            <a:schemeClr val="accent4"/>
+          </a:fillRef>
+          <a:effectRef idx="0">
+            <a:schemeClr val="accent4"/>
+          </a:effectRef>
+          <a:fontRef idx="minor">
+            <a:schemeClr val="lt1"/>
+          </a:fontRef>
+        </p:style>
+        <p:txBody>
+          <a:bodyPr rtlCol="0" anchor="ctr"/>
+          <a:lstStyle/>
+          <a:p>
+            <a:pPr algn="ctr"/>
+            <a:endParaRPr lang="it-IT"/>
+          </a:p>
+        </p:txBody>
+      </p:sp>
+      <p:sp>
+        <p:nvSpPr>
+          <p:cNvPr id="9" name="Ovale 8">
+            <a:extLst>
+              <a:ext uri="{FF2B5EF4-FFF2-40B4-BE49-F238E27FC236}">
+                <a16:creationId xmlns:a16="http://schemas.microsoft.com/office/drawing/2014/main" id="{CB935288-3E24-43C0-B25A-1BE7FF7613A4}"/>
+              </a:ext>
+            </a:extLst>
+          </p:cNvPr>
+          <p:cNvSpPr/>
+          <p:nvPr/>
+        </p:nvSpPr>
+        <p:spPr>
+          <a:xfrm>
+            <a:off x="10318549" y="5067443"/>
+            <a:ext cx="199271" cy="197687"/>
+          </a:xfrm>
+          <a:prstGeom prst="ellipse">
+            <a:avLst/>
+          </a:prstGeom>
+          <a:solidFill>
+            <a:srgbClr val="FFC000"/>
+          </a:solidFill>
+          <a:ln>
+            <a:noFill/>
+          </a:ln>
+        </p:spPr>
+        <p:style>
+          <a:lnRef idx="2">
+            <a:schemeClr val="accent4">
+              <a:shade val="50000"/>
+            </a:schemeClr>
+          </a:lnRef>
+          <a:fillRef idx="1">
+            <a:schemeClr val="accent4"/>
+          </a:fillRef>
+          <a:effectRef idx="0">
+            <a:schemeClr val="accent4"/>
+          </a:effectRef>
+          <a:fontRef idx="minor">
+            <a:schemeClr val="lt1"/>
+          </a:fontRef>
+        </p:style>
+        <p:txBody>
+          <a:bodyPr rtlCol="0" anchor="ctr"/>
+          <a:lstStyle/>
+          <a:p>
+            <a:pPr algn="ctr"/>
+            <a:endParaRPr lang="it-IT"/>
+          </a:p>
+        </p:txBody>
+      </p:sp>
+      <p:sp>
+        <p:nvSpPr>
+          <p:cNvPr id="10" name="Ovale 9">
+            <a:extLst>
+              <a:ext uri="{FF2B5EF4-FFF2-40B4-BE49-F238E27FC236}">
+                <a16:creationId xmlns:a16="http://schemas.microsoft.com/office/drawing/2014/main" id="{601FA8B9-7E7A-40A7-B12A-4746A5A455AE}"/>
+              </a:ext>
+            </a:extLst>
+          </p:cNvPr>
+          <p:cNvSpPr/>
+          <p:nvPr/>
+        </p:nvSpPr>
+        <p:spPr>
+          <a:xfrm>
+            <a:off x="10394009" y="4871957"/>
+            <a:ext cx="199271" cy="197687"/>
+          </a:xfrm>
+          <a:prstGeom prst="ellipse">
+            <a:avLst/>
+          </a:prstGeom>
+          <a:solidFill>
+            <a:srgbClr val="FFC000"/>
+          </a:solidFill>
+          <a:ln>
+            <a:noFill/>
+          </a:ln>
+        </p:spPr>
+        <p:style>
+          <a:lnRef idx="2">
+            <a:schemeClr val="accent4">
+              <a:shade val="50000"/>
+            </a:schemeClr>
+          </a:lnRef>
+          <a:fillRef idx="1">
+            <a:schemeClr val="accent4"/>
+          </a:fillRef>
+          <a:effectRef idx="0">
+            <a:schemeClr val="accent4"/>
+          </a:effectRef>
+          <a:fontRef idx="minor">
+            <a:schemeClr val="lt1"/>
+          </a:fontRef>
+        </p:style>
+        <p:txBody>
+          <a:bodyPr rtlCol="0" anchor="ctr"/>
+          <a:lstStyle/>
+          <a:p>
+            <a:pPr algn="ctr"/>
+            <a:endParaRPr lang="it-IT"/>
+          </a:p>
+        </p:txBody>
+      </p:sp>
+      <p:sp>
+        <p:nvSpPr>
+          <p:cNvPr id="11" name="Ovale 10">
+            <a:extLst>
+              <a:ext uri="{FF2B5EF4-FFF2-40B4-BE49-F238E27FC236}">
+                <a16:creationId xmlns:a16="http://schemas.microsoft.com/office/drawing/2014/main" id="{5536BB26-33B8-41CC-9C15-6BB597550F3B}"/>
+              </a:ext>
+            </a:extLst>
+          </p:cNvPr>
+          <p:cNvSpPr/>
+          <p:nvPr/>
+        </p:nvSpPr>
+        <p:spPr>
+          <a:xfrm>
+            <a:off x="10126981" y="5022877"/>
+            <a:ext cx="199271" cy="197687"/>
+          </a:xfrm>
+          <a:prstGeom prst="ellipse">
+            <a:avLst/>
+          </a:prstGeom>
+          <a:solidFill>
+            <a:srgbClr val="FFC000"/>
+          </a:solidFill>
+          <a:ln>
+            <a:noFill/>
+          </a:ln>
+        </p:spPr>
+        <p:style>
+          <a:lnRef idx="2">
+            <a:schemeClr val="accent4">
+              <a:shade val="50000"/>
+            </a:schemeClr>
+          </a:lnRef>
+          <a:fillRef idx="1">
+            <a:schemeClr val="accent4"/>
+          </a:fillRef>
+          <a:effectRef idx="0">
+            <a:schemeClr val="accent4"/>
+          </a:effectRef>
+          <a:fontRef idx="minor">
+            <a:schemeClr val="lt1"/>
+          </a:fontRef>
+        </p:style>
+        <p:txBody>
+          <a:bodyPr rtlCol="0" anchor="ctr"/>
+          <a:lstStyle/>
+          <a:p>
+            <a:pPr algn="ctr"/>
+            <a:endParaRPr lang="it-IT"/>
+          </a:p>
+        </p:txBody>
+      </p:sp>
+      <p:sp>
+        <p:nvSpPr>
+          <p:cNvPr id="12" name="Ovale 11">
+            <a:extLst>
+              <a:ext uri="{FF2B5EF4-FFF2-40B4-BE49-F238E27FC236}">
+                <a16:creationId xmlns:a16="http://schemas.microsoft.com/office/drawing/2014/main" id="{81C7AEB7-9F11-430C-A681-7190018F45FA}"/>
+              </a:ext>
+            </a:extLst>
+          </p:cNvPr>
+          <p:cNvSpPr/>
+          <p:nvPr/>
+        </p:nvSpPr>
+        <p:spPr>
+          <a:xfrm>
+            <a:off x="8389974" y="4859383"/>
+            <a:ext cx="199271" cy="197687"/>
+          </a:xfrm>
+          <a:prstGeom prst="ellipse">
+            <a:avLst/>
+          </a:prstGeom>
+          <a:solidFill>
+            <a:srgbClr val="FFC000"/>
+          </a:solidFill>
+          <a:ln>
+            <a:noFill/>
+          </a:ln>
+        </p:spPr>
+        <p:style>
+          <a:lnRef idx="2">
+            <a:schemeClr val="accent4">
+              <a:shade val="50000"/>
+            </a:schemeClr>
+          </a:lnRef>
+          <a:fillRef idx="1">
+            <a:schemeClr val="accent4"/>
+          </a:fillRef>
+          <a:effectRef idx="0">
+            <a:schemeClr val="accent4"/>
+          </a:effectRef>
+          <a:fontRef idx="minor">
+            <a:schemeClr val="lt1"/>
+          </a:fontRef>
+        </p:style>
+        <p:txBody>
+          <a:bodyPr rtlCol="0" anchor="ctr"/>
+          <a:lstStyle/>
+          <a:p>
+            <a:pPr algn="ctr"/>
+            <a:endParaRPr lang="it-IT"/>
+          </a:p>
+        </p:txBody>
+      </p:sp>
+      <p:sp>
+        <p:nvSpPr>
+          <p:cNvPr id="13" name="Ovale 12">
+            <a:extLst>
+              <a:ext uri="{FF2B5EF4-FFF2-40B4-BE49-F238E27FC236}">
+                <a16:creationId xmlns:a16="http://schemas.microsoft.com/office/drawing/2014/main" id="{C76339CA-10AE-489C-BB88-ADA2EDBF398A}"/>
+              </a:ext>
+            </a:extLst>
+          </p:cNvPr>
+          <p:cNvSpPr/>
+          <p:nvPr/>
+        </p:nvSpPr>
+        <p:spPr>
+          <a:xfrm>
+            <a:off x="10544929" y="5052247"/>
+            <a:ext cx="199271" cy="197687"/>
+          </a:xfrm>
+          <a:prstGeom prst="ellipse">
+            <a:avLst/>
+          </a:prstGeom>
+          <a:solidFill>
+            <a:srgbClr val="FFC000"/>
+          </a:solidFill>
+          <a:ln>
+            <a:noFill/>
+          </a:ln>
+        </p:spPr>
+        <p:style>
+          <a:lnRef idx="2">
+            <a:schemeClr val="accent4">
+              <a:shade val="50000"/>
+            </a:schemeClr>
+          </a:lnRef>
+          <a:fillRef idx="1">
+            <a:schemeClr val="accent4"/>
+          </a:fillRef>
+          <a:effectRef idx="0">
+            <a:schemeClr val="accent4"/>
+          </a:effectRef>
+          <a:fontRef idx="minor">
+            <a:schemeClr val="lt1"/>
+          </a:fontRef>
+        </p:style>
+        <p:txBody>
+          <a:bodyPr rtlCol="0" anchor="ctr"/>
+          <a:lstStyle/>
+          <a:p>
+            <a:pPr algn="ctr"/>
+            <a:endParaRPr lang="it-IT"/>
+          </a:p>
+        </p:txBody>
+      </p:sp>
+      <p:sp>
+        <p:nvSpPr>
+          <p:cNvPr id="14" name="Ovale 13">
+            <a:extLst>
+              <a:ext uri="{FF2B5EF4-FFF2-40B4-BE49-F238E27FC236}">
+                <a16:creationId xmlns:a16="http://schemas.microsoft.com/office/drawing/2014/main" id="{F1797649-4D31-4C60-8E1C-E62B503B3E27}"/>
+              </a:ext>
+            </a:extLst>
+          </p:cNvPr>
+          <p:cNvSpPr/>
+          <p:nvPr/>
+        </p:nvSpPr>
+        <p:spPr>
+          <a:xfrm>
+            <a:off x="8529579" y="2380709"/>
+            <a:ext cx="199271" cy="197687"/>
+          </a:xfrm>
+          <a:prstGeom prst="ellipse">
+            <a:avLst/>
+          </a:prstGeom>
+          <a:solidFill>
+            <a:srgbClr val="FFC000"/>
+          </a:solidFill>
+          <a:ln>
+            <a:noFill/>
+          </a:ln>
+        </p:spPr>
+        <p:style>
+          <a:lnRef idx="2">
+            <a:schemeClr val="accent4">
+              <a:shade val="50000"/>
+            </a:schemeClr>
+          </a:lnRef>
+          <a:fillRef idx="1">
+            <a:schemeClr val="accent4"/>
+          </a:fillRef>
+          <a:effectRef idx="0">
+            <a:schemeClr val="accent4"/>
+          </a:effectRef>
+          <a:fontRef idx="minor">
+            <a:schemeClr val="lt1"/>
+          </a:fontRef>
+        </p:style>
+        <p:txBody>
+          <a:bodyPr rtlCol="0" anchor="ctr"/>
+          <a:lstStyle/>
+          <a:p>
+            <a:pPr algn="ctr"/>
+            <a:endParaRPr lang="it-IT"/>
+          </a:p>
+        </p:txBody>
+      </p:sp>
+      <p:sp>
+        <p:nvSpPr>
+          <p:cNvPr id="15" name="Ovale 14">
+            <a:extLst>
+              <a:ext uri="{FF2B5EF4-FFF2-40B4-BE49-F238E27FC236}">
+                <a16:creationId xmlns:a16="http://schemas.microsoft.com/office/drawing/2014/main" id="{01C5AAA7-C5F3-4EB7-9A89-01F80B463319}"/>
+              </a:ext>
+            </a:extLst>
+          </p:cNvPr>
+          <p:cNvSpPr/>
+          <p:nvPr/>
+        </p:nvSpPr>
+        <p:spPr>
+          <a:xfrm>
+            <a:off x="8602102" y="2646062"/>
+            <a:ext cx="199271" cy="197687"/>
+          </a:xfrm>
+          <a:prstGeom prst="ellipse">
+            <a:avLst/>
+          </a:prstGeom>
+          <a:solidFill>
+            <a:srgbClr val="FFC000"/>
+          </a:solidFill>
+          <a:ln>
+            <a:noFill/>
+          </a:ln>
+        </p:spPr>
+        <p:style>
+          <a:lnRef idx="2">
+            <a:schemeClr val="accent4">
+              <a:shade val="50000"/>
+            </a:schemeClr>
+          </a:lnRef>
+          <a:fillRef idx="1">
+            <a:schemeClr val="accent4"/>
+          </a:fillRef>
+          <a:effectRef idx="0">
+            <a:schemeClr val="accent4"/>
+          </a:effectRef>
+          <a:fontRef idx="minor">
+            <a:schemeClr val="lt1"/>
+          </a:fontRef>
+        </p:style>
+        <p:txBody>
+          <a:bodyPr rtlCol="0" anchor="ctr"/>
+          <a:lstStyle/>
+          <a:p>
+            <a:pPr algn="ctr"/>
+            <a:endParaRPr lang="it-IT"/>
+          </a:p>
+        </p:txBody>
+      </p:sp>
+      <p:sp>
+        <p:nvSpPr>
+          <p:cNvPr id="16" name="CasellaDiTesto 15">
+            <a:extLst>
+              <a:ext uri="{FF2B5EF4-FFF2-40B4-BE49-F238E27FC236}">
+                <a16:creationId xmlns:a16="http://schemas.microsoft.com/office/drawing/2014/main" id="{7BE91A07-FDF6-495A-AF75-943E6289DD1E}"/>
+              </a:ext>
+            </a:extLst>
+          </p:cNvPr>
+          <p:cNvSpPr txBox="1"/>
+          <p:nvPr/>
+        </p:nvSpPr>
+        <p:spPr>
+          <a:xfrm>
+            <a:off x="7452201" y="5982863"/>
+            <a:ext cx="4314548" cy="400110"/>
+          </a:xfrm>
+          <a:prstGeom prst="rect">
+            <a:avLst/>
+          </a:prstGeom>
+          <a:noFill/>
+        </p:spPr>
+        <p:txBody>
+          <a:bodyPr wrap="square" rtlCol="0">
+            <a:spAutoFit/>
+          </a:bodyPr>
+          <a:lstStyle/>
+          <a:p>
+            <a:pPr algn="ctr"/>
+            <a:r>
+              <a:rPr lang="it-IT" sz="2000" dirty="0" err="1"/>
+              <a:t>Example</a:t>
+            </a:r>
+            <a:r>
+              <a:rPr lang="it-IT" sz="2000" dirty="0"/>
+              <a:t> of </a:t>
+            </a:r>
+            <a:r>
+              <a:rPr lang="it-IT" sz="2000" dirty="0" err="1"/>
+              <a:t>overload</a:t>
+            </a:r>
+            <a:endParaRPr lang="it-IT" sz="2000" dirty="0"/>
           </a:p>
         </p:txBody>
       </p:sp>
@@ -5248,10 +6077,1774 @@
   <p:clrMapOvr>
     <a:masterClrMapping/>
   </p:clrMapOvr>
+  <p:timing>
+    <p:tnLst>
+      <p:par>
+        <p:cTn id="1" dur="indefinite" restart="never" nodeType="tmRoot">
+          <p:childTnLst>
+            <p:seq concurrent="1" nextAc="seek">
+              <p:cTn id="2" dur="indefinite" nodeType="mainSeq">
+                <p:childTnLst>
+                  <p:par>
+                    <p:cTn id="3" fill="hold">
+                      <p:stCondLst>
+                        <p:cond delay="indefinite"/>
+                        <p:cond evt="onBegin" delay="0">
+                          <p:tn val="2"/>
+                        </p:cond>
+                      </p:stCondLst>
+                      <p:childTnLst>
+                        <p:par>
+                          <p:cTn id="4" fill="hold">
+                            <p:stCondLst>
+                              <p:cond delay="0"/>
+                            </p:stCondLst>
+                            <p:childTnLst>
+                              <p:par>
+                                <p:cTn id="5" presetID="10" presetClass="entr" presetSubtype="0" fill="hold" grpId="0" nodeType="withEffect">
+                                  <p:stCondLst>
+                                    <p:cond delay="0"/>
+                                  </p:stCondLst>
+                                  <p:childTnLst>
+                                    <p:set>
+                                      <p:cBhvr>
+                                        <p:cTn id="6" dur="1" fill="hold">
+                                          <p:stCondLst>
+                                            <p:cond delay="0"/>
+                                          </p:stCondLst>
+                                        </p:cTn>
+                                        <p:tgtEl>
+                                          <p:spTgt spid="7"/>
+                                        </p:tgtEl>
+                                        <p:attrNameLst>
+                                          <p:attrName>style.visibility</p:attrName>
+                                        </p:attrNameLst>
+                                      </p:cBhvr>
+                                      <p:to>
+                                        <p:strVal val="visible"/>
+                                      </p:to>
+                                    </p:set>
+                                    <p:animEffect transition="in" filter="fade">
+                                      <p:cBhvr>
+                                        <p:cTn id="7" dur="500"/>
+                                        <p:tgtEl>
+                                          <p:spTgt spid="7"/>
+                                        </p:tgtEl>
+                                      </p:cBhvr>
+                                    </p:animEffect>
+                                  </p:childTnLst>
+                                </p:cTn>
+                              </p:par>
+                              <p:par>
+                                <p:cTn id="8" presetID="10" presetClass="entr" presetSubtype="0" fill="hold" grpId="0" nodeType="withEffect">
+                                  <p:stCondLst>
+                                    <p:cond delay="0"/>
+                                  </p:stCondLst>
+                                  <p:childTnLst>
+                                    <p:set>
+                                      <p:cBhvr>
+                                        <p:cTn id="9" dur="1" fill="hold">
+                                          <p:stCondLst>
+                                            <p:cond delay="0"/>
+                                          </p:stCondLst>
+                                        </p:cTn>
+                                        <p:tgtEl>
+                                          <p:spTgt spid="8"/>
+                                        </p:tgtEl>
+                                        <p:attrNameLst>
+                                          <p:attrName>style.visibility</p:attrName>
+                                        </p:attrNameLst>
+                                      </p:cBhvr>
+                                      <p:to>
+                                        <p:strVal val="visible"/>
+                                      </p:to>
+                                    </p:set>
+                                    <p:animEffect transition="in" filter="fade">
+                                      <p:cBhvr>
+                                        <p:cTn id="10" dur="500"/>
+                                        <p:tgtEl>
+                                          <p:spTgt spid="8"/>
+                                        </p:tgtEl>
+                                      </p:cBhvr>
+                                    </p:animEffect>
+                                  </p:childTnLst>
+                                </p:cTn>
+                              </p:par>
+                              <p:par>
+                                <p:cTn id="11" presetID="10" presetClass="entr" presetSubtype="0" fill="hold" grpId="0" nodeType="withEffect">
+                                  <p:stCondLst>
+                                    <p:cond delay="0"/>
+                                  </p:stCondLst>
+                                  <p:childTnLst>
+                                    <p:set>
+                                      <p:cBhvr>
+                                        <p:cTn id="12" dur="1" fill="hold">
+                                          <p:stCondLst>
+                                            <p:cond delay="0"/>
+                                          </p:stCondLst>
+                                        </p:cTn>
+                                        <p:tgtEl>
+                                          <p:spTgt spid="6"/>
+                                        </p:tgtEl>
+                                        <p:attrNameLst>
+                                          <p:attrName>style.visibility</p:attrName>
+                                        </p:attrNameLst>
+                                      </p:cBhvr>
+                                      <p:to>
+                                        <p:strVal val="visible"/>
+                                      </p:to>
+                                    </p:set>
+                                    <p:animEffect transition="in" filter="fade">
+                                      <p:cBhvr>
+                                        <p:cTn id="13" dur="500"/>
+                                        <p:tgtEl>
+                                          <p:spTgt spid="6"/>
+                                        </p:tgtEl>
+                                      </p:cBhvr>
+                                    </p:animEffect>
+                                  </p:childTnLst>
+                                </p:cTn>
+                              </p:par>
+                              <p:par>
+                                <p:cTn id="14" presetID="10" presetClass="entr" presetSubtype="0" fill="hold" grpId="0" nodeType="withEffect">
+                                  <p:stCondLst>
+                                    <p:cond delay="0"/>
+                                  </p:stCondLst>
+                                  <p:childTnLst>
+                                    <p:set>
+                                      <p:cBhvr>
+                                        <p:cTn id="15" dur="1" fill="hold">
+                                          <p:stCondLst>
+                                            <p:cond delay="0"/>
+                                          </p:stCondLst>
+                                        </p:cTn>
+                                        <p:tgtEl>
+                                          <p:spTgt spid="14"/>
+                                        </p:tgtEl>
+                                        <p:attrNameLst>
+                                          <p:attrName>style.visibility</p:attrName>
+                                        </p:attrNameLst>
+                                      </p:cBhvr>
+                                      <p:to>
+                                        <p:strVal val="visible"/>
+                                      </p:to>
+                                    </p:set>
+                                    <p:animEffect transition="in" filter="fade">
+                                      <p:cBhvr>
+                                        <p:cTn id="16" dur="500"/>
+                                        <p:tgtEl>
+                                          <p:spTgt spid="14"/>
+                                        </p:tgtEl>
+                                      </p:cBhvr>
+                                    </p:animEffect>
+                                  </p:childTnLst>
+                                </p:cTn>
+                              </p:par>
+                              <p:par>
+                                <p:cTn id="17" presetID="10" presetClass="entr" presetSubtype="0" fill="hold" grpId="0" nodeType="withEffect">
+                                  <p:stCondLst>
+                                    <p:cond delay="0"/>
+                                  </p:stCondLst>
+                                  <p:childTnLst>
+                                    <p:set>
+                                      <p:cBhvr>
+                                        <p:cTn id="18" dur="1" fill="hold">
+                                          <p:stCondLst>
+                                            <p:cond delay="0"/>
+                                          </p:stCondLst>
+                                        </p:cTn>
+                                        <p:tgtEl>
+                                          <p:spTgt spid="15"/>
+                                        </p:tgtEl>
+                                        <p:attrNameLst>
+                                          <p:attrName>style.visibility</p:attrName>
+                                        </p:attrNameLst>
+                                      </p:cBhvr>
+                                      <p:to>
+                                        <p:strVal val="visible"/>
+                                      </p:to>
+                                    </p:set>
+                                    <p:animEffect transition="in" filter="fade">
+                                      <p:cBhvr>
+                                        <p:cTn id="19" dur="500"/>
+                                        <p:tgtEl>
+                                          <p:spTgt spid="15"/>
+                                        </p:tgtEl>
+                                      </p:cBhvr>
+                                    </p:animEffect>
+                                  </p:childTnLst>
+                                </p:cTn>
+                              </p:par>
+                              <p:par>
+                                <p:cTn id="20" presetID="10" presetClass="entr" presetSubtype="0" fill="hold" grpId="0" nodeType="withEffect">
+                                  <p:stCondLst>
+                                    <p:cond delay="0"/>
+                                  </p:stCondLst>
+                                  <p:childTnLst>
+                                    <p:set>
+                                      <p:cBhvr>
+                                        <p:cTn id="21" dur="1" fill="hold">
+                                          <p:stCondLst>
+                                            <p:cond delay="0"/>
+                                          </p:stCondLst>
+                                        </p:cTn>
+                                        <p:tgtEl>
+                                          <p:spTgt spid="12"/>
+                                        </p:tgtEl>
+                                        <p:attrNameLst>
+                                          <p:attrName>style.visibility</p:attrName>
+                                        </p:attrNameLst>
+                                      </p:cBhvr>
+                                      <p:to>
+                                        <p:strVal val="visible"/>
+                                      </p:to>
+                                    </p:set>
+                                    <p:animEffect transition="in" filter="fade">
+                                      <p:cBhvr>
+                                        <p:cTn id="22" dur="500"/>
+                                        <p:tgtEl>
+                                          <p:spTgt spid="12"/>
+                                        </p:tgtEl>
+                                      </p:cBhvr>
+                                    </p:animEffect>
+                                  </p:childTnLst>
+                                </p:cTn>
+                              </p:par>
+                              <p:par>
+                                <p:cTn id="23" presetID="10" presetClass="entr" presetSubtype="0" fill="hold" grpId="0" nodeType="withEffect">
+                                  <p:stCondLst>
+                                    <p:cond delay="0"/>
+                                  </p:stCondLst>
+                                  <p:childTnLst>
+                                    <p:set>
+                                      <p:cBhvr>
+                                        <p:cTn id="24" dur="1" fill="hold">
+                                          <p:stCondLst>
+                                            <p:cond delay="0"/>
+                                          </p:stCondLst>
+                                        </p:cTn>
+                                        <p:tgtEl>
+                                          <p:spTgt spid="11"/>
+                                        </p:tgtEl>
+                                        <p:attrNameLst>
+                                          <p:attrName>style.visibility</p:attrName>
+                                        </p:attrNameLst>
+                                      </p:cBhvr>
+                                      <p:to>
+                                        <p:strVal val="visible"/>
+                                      </p:to>
+                                    </p:set>
+                                    <p:animEffect transition="in" filter="fade">
+                                      <p:cBhvr>
+                                        <p:cTn id="25" dur="500"/>
+                                        <p:tgtEl>
+                                          <p:spTgt spid="11"/>
+                                        </p:tgtEl>
+                                      </p:cBhvr>
+                                    </p:animEffect>
+                                  </p:childTnLst>
+                                </p:cTn>
+                              </p:par>
+                              <p:par>
+                                <p:cTn id="26" presetID="10" presetClass="entr" presetSubtype="0" fill="hold" grpId="0" nodeType="withEffect">
+                                  <p:stCondLst>
+                                    <p:cond delay="0"/>
+                                  </p:stCondLst>
+                                  <p:childTnLst>
+                                    <p:set>
+                                      <p:cBhvr>
+                                        <p:cTn id="27" dur="1" fill="hold">
+                                          <p:stCondLst>
+                                            <p:cond delay="0"/>
+                                          </p:stCondLst>
+                                        </p:cTn>
+                                        <p:tgtEl>
+                                          <p:spTgt spid="9"/>
+                                        </p:tgtEl>
+                                        <p:attrNameLst>
+                                          <p:attrName>style.visibility</p:attrName>
+                                        </p:attrNameLst>
+                                      </p:cBhvr>
+                                      <p:to>
+                                        <p:strVal val="visible"/>
+                                      </p:to>
+                                    </p:set>
+                                    <p:animEffect transition="in" filter="fade">
+                                      <p:cBhvr>
+                                        <p:cTn id="28" dur="500"/>
+                                        <p:tgtEl>
+                                          <p:spTgt spid="9"/>
+                                        </p:tgtEl>
+                                      </p:cBhvr>
+                                    </p:animEffect>
+                                  </p:childTnLst>
+                                </p:cTn>
+                              </p:par>
+                              <p:par>
+                                <p:cTn id="29" presetID="10" presetClass="entr" presetSubtype="0" fill="hold" grpId="0" nodeType="withEffect">
+                                  <p:stCondLst>
+                                    <p:cond delay="0"/>
+                                  </p:stCondLst>
+                                  <p:childTnLst>
+                                    <p:set>
+                                      <p:cBhvr>
+                                        <p:cTn id="30" dur="1" fill="hold">
+                                          <p:stCondLst>
+                                            <p:cond delay="0"/>
+                                          </p:stCondLst>
+                                        </p:cTn>
+                                        <p:tgtEl>
+                                          <p:spTgt spid="10"/>
+                                        </p:tgtEl>
+                                        <p:attrNameLst>
+                                          <p:attrName>style.visibility</p:attrName>
+                                        </p:attrNameLst>
+                                      </p:cBhvr>
+                                      <p:to>
+                                        <p:strVal val="visible"/>
+                                      </p:to>
+                                    </p:set>
+                                    <p:animEffect transition="in" filter="fade">
+                                      <p:cBhvr>
+                                        <p:cTn id="31" dur="500"/>
+                                        <p:tgtEl>
+                                          <p:spTgt spid="10"/>
+                                        </p:tgtEl>
+                                      </p:cBhvr>
+                                    </p:animEffect>
+                                  </p:childTnLst>
+                                </p:cTn>
+                              </p:par>
+                              <p:par>
+                                <p:cTn id="32" presetID="10" presetClass="entr" presetSubtype="0" fill="hold" grpId="0" nodeType="withEffect">
+                                  <p:stCondLst>
+                                    <p:cond delay="0"/>
+                                  </p:stCondLst>
+                                  <p:childTnLst>
+                                    <p:set>
+                                      <p:cBhvr>
+                                        <p:cTn id="33" dur="1" fill="hold">
+                                          <p:stCondLst>
+                                            <p:cond delay="0"/>
+                                          </p:stCondLst>
+                                        </p:cTn>
+                                        <p:tgtEl>
+                                          <p:spTgt spid="13"/>
+                                        </p:tgtEl>
+                                        <p:attrNameLst>
+                                          <p:attrName>style.visibility</p:attrName>
+                                        </p:attrNameLst>
+                                      </p:cBhvr>
+                                      <p:to>
+                                        <p:strVal val="visible"/>
+                                      </p:to>
+                                    </p:set>
+                                    <p:animEffect transition="in" filter="fade">
+                                      <p:cBhvr>
+                                        <p:cTn id="34" dur="500"/>
+                                        <p:tgtEl>
+                                          <p:spTgt spid="13"/>
+                                        </p:tgtEl>
+                                      </p:cBhvr>
+                                    </p:animEffect>
+                                  </p:childTnLst>
+                                </p:cTn>
+                              </p:par>
+                            </p:childTnLst>
+                          </p:cTn>
+                        </p:par>
+                      </p:childTnLst>
+                    </p:cTn>
+                  </p:par>
+                </p:childTnLst>
+              </p:cTn>
+              <p:prevCondLst>
+                <p:cond evt="onPrev" delay="0">
+                  <p:tgtEl>
+                    <p:sldTgt/>
+                  </p:tgtEl>
+                </p:cond>
+              </p:prevCondLst>
+              <p:nextCondLst>
+                <p:cond evt="onNext" delay="0">
+                  <p:tgtEl>
+                    <p:sldTgt/>
+                  </p:tgtEl>
+                </p:cond>
+              </p:nextCondLst>
+            </p:seq>
+          </p:childTnLst>
+        </p:cTn>
+      </p:par>
+    </p:tnLst>
+    <p:bldLst>
+      <p:bldP spid="6" grpId="0" animBg="1"/>
+      <p:bldP spid="7" grpId="0" animBg="1"/>
+      <p:bldP spid="8" grpId="0" animBg="1"/>
+      <p:bldP spid="9" grpId="0" animBg="1"/>
+      <p:bldP spid="10" grpId="0" animBg="1"/>
+      <p:bldP spid="11" grpId="0" animBg="1"/>
+      <p:bldP spid="12" grpId="0" animBg="1"/>
+      <p:bldP spid="13" grpId="0" animBg="1"/>
+      <p:bldP spid="14" grpId="0" animBg="1"/>
+      <p:bldP spid="15" grpId="0" animBg="1"/>
+    </p:bldLst>
+  </p:timing>
 </p:sld>
 </file>
 
 <file path=ppt/slides/slide12.xml><?xml version="1.0" encoding="utf-8"?>
+<p:sld xmlns:a="http://schemas.openxmlformats.org/drawingml/2006/main" xmlns:r="http://schemas.openxmlformats.org/officeDocument/2006/relationships" xmlns:p="http://schemas.openxmlformats.org/presentationml/2006/main">
+  <p:cSld>
+    <p:spTree>
+      <p:nvGrpSpPr>
+        <p:cNvPr id="1" name=""/>
+        <p:cNvGrpSpPr/>
+        <p:nvPr/>
+      </p:nvGrpSpPr>
+      <p:grpSpPr>
+        <a:xfrm>
+          <a:off x="0" y="0"/>
+          <a:ext cx="0" cy="0"/>
+          <a:chOff x="0" y="0"/>
+          <a:chExt cx="0" cy="0"/>
+        </a:xfrm>
+      </p:grpSpPr>
+      <p:sp>
+        <p:nvSpPr>
+          <p:cNvPr id="2" name="Titolo 1">
+            <a:extLst>
+              <a:ext uri="{FF2B5EF4-FFF2-40B4-BE49-F238E27FC236}">
+                <a16:creationId xmlns:a16="http://schemas.microsoft.com/office/drawing/2014/main" id="{DDB4E25B-6DE0-4584-998A-7388A1A4AF99}"/>
+              </a:ext>
+            </a:extLst>
+          </p:cNvPr>
+          <p:cNvSpPr>
+            <a:spLocks noGrp="1"/>
+          </p:cNvSpPr>
+          <p:nvPr>
+            <p:ph type="title"/>
+          </p:nvPr>
+        </p:nvSpPr>
+        <p:spPr/>
+        <p:txBody>
+          <a:bodyPr/>
+          <a:lstStyle/>
+          <a:p>
+            <a:r>
+              <a:rPr lang="it-IT" dirty="0" err="1"/>
+              <a:t>Joining</a:t>
+            </a:r>
+            <a:r>
+              <a:rPr lang="it-IT" dirty="0"/>
+              <a:t> the cluster</a:t>
+            </a:r>
+          </a:p>
+        </p:txBody>
+      </p:sp>
+      <p:sp>
+        <p:nvSpPr>
+          <p:cNvPr id="3" name="Segnaposto contenuto 2">
+            <a:extLst>
+              <a:ext uri="{FF2B5EF4-FFF2-40B4-BE49-F238E27FC236}">
+                <a16:creationId xmlns:a16="http://schemas.microsoft.com/office/drawing/2014/main" id="{C6370ED8-404B-4259-AE97-21B9EA2A8C48}"/>
+              </a:ext>
+            </a:extLst>
+          </p:cNvPr>
+          <p:cNvSpPr>
+            <a:spLocks noGrp="1"/>
+          </p:cNvSpPr>
+          <p:nvPr>
+            <p:ph idx="1"/>
+          </p:nvPr>
+        </p:nvSpPr>
+        <p:spPr>
+          <a:xfrm>
+            <a:off x="784313" y="1984162"/>
+            <a:ext cx="10623375" cy="4336742"/>
+          </a:xfrm>
+        </p:spPr>
+        <p:txBody>
+          <a:bodyPr>
+            <a:normAutofit/>
+          </a:bodyPr>
+          <a:lstStyle/>
+          <a:p>
+            <a:pPr>
+              <a:buFont typeface="Tw Cen MT" panose="020B0602020104020603" pitchFamily="34" charset="0"/>
+              <a:buChar char="-"/>
+            </a:pPr>
+            <a:r>
+              <a:rPr lang="it-IT" sz="2400" dirty="0"/>
+              <a:t> </a:t>
+            </a:r>
+            <a:r>
+              <a:rPr lang="it-IT" sz="2400" dirty="0" err="1"/>
+              <a:t>Nodes</a:t>
+            </a:r>
+            <a:r>
+              <a:rPr lang="it-IT" sz="2400" dirty="0"/>
+              <a:t> join the cluster by </a:t>
+            </a:r>
+            <a:r>
+              <a:rPr lang="it-IT" sz="2400" dirty="0" err="1"/>
+              <a:t>communicating</a:t>
+            </a:r>
+            <a:r>
+              <a:rPr lang="it-IT" sz="2400" dirty="0"/>
+              <a:t> with </a:t>
+            </a:r>
+            <a:r>
+              <a:rPr lang="it-IT" sz="2400" dirty="0" err="1"/>
+              <a:t>any</a:t>
+            </a:r>
+            <a:r>
+              <a:rPr lang="it-IT" sz="2400" dirty="0"/>
+              <a:t> </a:t>
+            </a:r>
+            <a:r>
+              <a:rPr lang="it-IT" sz="2400" dirty="0" err="1"/>
+              <a:t>node</a:t>
+            </a:r>
+            <a:endParaRPr lang="it-IT" sz="2400" dirty="0"/>
+          </a:p>
+          <a:p>
+            <a:pPr>
+              <a:buFont typeface="Tw Cen MT" panose="020B0602020104020603" pitchFamily="34" charset="0"/>
+              <a:buChar char="-"/>
+            </a:pPr>
+            <a:r>
+              <a:rPr lang="it-IT" sz="2400" dirty="0"/>
+              <a:t> </a:t>
+            </a:r>
+            <a:r>
+              <a:rPr lang="it-IT" sz="2400" dirty="0" err="1"/>
+              <a:t>Other</a:t>
+            </a:r>
+            <a:r>
+              <a:rPr lang="it-IT" sz="2400" dirty="0"/>
+              <a:t> </a:t>
+            </a:r>
+            <a:r>
+              <a:rPr lang="it-IT" sz="2400" dirty="0" err="1"/>
+              <a:t>nodes</a:t>
+            </a:r>
+            <a:r>
+              <a:rPr lang="it-IT" sz="2400" dirty="0"/>
+              <a:t> </a:t>
+            </a:r>
+            <a:r>
+              <a:rPr lang="it-IT" sz="2400" dirty="0" err="1"/>
+              <a:t>calculate</a:t>
+            </a:r>
+            <a:r>
+              <a:rPr lang="it-IT" sz="2400" dirty="0"/>
+              <a:t> </a:t>
+            </a:r>
+            <a:r>
+              <a:rPr lang="it-IT" sz="2400" dirty="0" err="1"/>
+              <a:t>where</a:t>
+            </a:r>
+            <a:r>
+              <a:rPr lang="it-IT" sz="2400" dirty="0"/>
+              <a:t> </a:t>
+            </a:r>
+            <a:r>
+              <a:rPr lang="it-IT" sz="2400" dirty="0" err="1"/>
+              <a:t>it</a:t>
+            </a:r>
+            <a:r>
+              <a:rPr lang="it-IT" sz="2400" dirty="0"/>
+              <a:t> </a:t>
+            </a:r>
+            <a:r>
+              <a:rPr lang="it-IT" sz="2400" dirty="0" err="1"/>
+              <a:t>fits</a:t>
+            </a:r>
+            <a:r>
+              <a:rPr lang="it-IT" sz="2400" dirty="0"/>
+              <a:t> in the ring and streams </a:t>
+            </a:r>
+            <a:r>
+              <a:rPr lang="it-IT" sz="2400" dirty="0" err="1"/>
+              <a:t>their</a:t>
+            </a:r>
+            <a:r>
+              <a:rPr lang="it-IT" sz="2400" dirty="0"/>
+              <a:t> data to the new </a:t>
+            </a:r>
+            <a:r>
+              <a:rPr lang="it-IT" sz="2400" dirty="0" err="1"/>
+              <a:t>node</a:t>
+            </a:r>
+            <a:endParaRPr lang="it-IT" sz="2400" dirty="0"/>
+          </a:p>
+          <a:p>
+            <a:pPr>
+              <a:buFont typeface="Tw Cen MT" panose="020B0602020104020603" pitchFamily="34" charset="0"/>
+              <a:buChar char="-"/>
+            </a:pPr>
+            <a:r>
+              <a:rPr lang="it-IT" sz="2400" dirty="0"/>
+              <a:t> </a:t>
+            </a:r>
+            <a:r>
+              <a:rPr lang="it-IT" sz="2400" dirty="0" err="1"/>
+              <a:t>There</a:t>
+            </a:r>
+            <a:r>
+              <a:rPr lang="it-IT" sz="2400" dirty="0"/>
+              <a:t> are 4 </a:t>
+            </a:r>
+            <a:r>
+              <a:rPr lang="it-IT" sz="2400" dirty="0" err="1"/>
+              <a:t>states</a:t>
+            </a:r>
+            <a:r>
+              <a:rPr lang="it-IT" sz="2400" dirty="0"/>
+              <a:t> to </a:t>
+            </a:r>
+            <a:r>
+              <a:rPr lang="it-IT" sz="2400" dirty="0" err="1"/>
+              <a:t>each</a:t>
+            </a:r>
+            <a:r>
+              <a:rPr lang="it-IT" sz="2400" dirty="0"/>
+              <a:t> </a:t>
+            </a:r>
+            <a:r>
+              <a:rPr lang="it-IT" sz="2400" dirty="0" err="1"/>
+              <a:t>node</a:t>
+            </a:r>
+            <a:r>
+              <a:rPr lang="it-IT" sz="2400" dirty="0"/>
+              <a:t>: </a:t>
+            </a:r>
+            <a:r>
+              <a:rPr lang="it-IT" sz="2400" i="1" dirty="0" err="1"/>
+              <a:t>joining</a:t>
+            </a:r>
+            <a:r>
+              <a:rPr lang="it-IT" sz="2400" dirty="0"/>
+              <a:t>, </a:t>
+            </a:r>
+            <a:r>
+              <a:rPr lang="it-IT" sz="2400" i="1" dirty="0" err="1"/>
+              <a:t>leaving</a:t>
+            </a:r>
+            <a:r>
+              <a:rPr lang="it-IT" sz="2400" dirty="0"/>
+              <a:t>, </a:t>
+            </a:r>
+            <a:r>
+              <a:rPr lang="it-IT" sz="2400" i="1" dirty="0"/>
+              <a:t>up</a:t>
+            </a:r>
+            <a:r>
+              <a:rPr lang="it-IT" sz="2400" dirty="0"/>
+              <a:t> and </a:t>
+            </a:r>
+            <a:r>
+              <a:rPr lang="it-IT" sz="2400" i="1" dirty="0"/>
+              <a:t>down</a:t>
+            </a:r>
+          </a:p>
+          <a:p>
+            <a:pPr>
+              <a:buFont typeface="Tw Cen MT" panose="020B0602020104020603" pitchFamily="34" charset="0"/>
+              <a:buChar char="-"/>
+            </a:pPr>
+            <a:r>
+              <a:rPr lang="it-IT" sz="2400" dirty="0"/>
+              <a:t> </a:t>
+            </a:r>
+            <a:r>
+              <a:rPr lang="it-IT" sz="2400" dirty="0" err="1"/>
+              <a:t>When</a:t>
+            </a:r>
+            <a:r>
+              <a:rPr lang="it-IT" sz="2400" dirty="0"/>
+              <a:t> the </a:t>
+            </a:r>
+            <a:r>
+              <a:rPr lang="it-IT" sz="2400" dirty="0" err="1"/>
+              <a:t>node</a:t>
+            </a:r>
+            <a:r>
+              <a:rPr lang="it-IT" sz="2400" dirty="0"/>
+              <a:t> </a:t>
+            </a:r>
+            <a:r>
+              <a:rPr lang="it-IT" sz="2400" dirty="0" err="1"/>
+              <a:t>is</a:t>
+            </a:r>
+            <a:r>
+              <a:rPr lang="it-IT" sz="2400" dirty="0"/>
+              <a:t> in </a:t>
+            </a:r>
+            <a:r>
+              <a:rPr lang="it-IT" sz="2400" i="1" dirty="0" err="1"/>
+              <a:t>joining</a:t>
+            </a:r>
+            <a:r>
+              <a:rPr lang="it-IT" sz="2400" i="1" dirty="0"/>
+              <a:t> mode </a:t>
+            </a:r>
+            <a:r>
+              <a:rPr lang="it-IT" sz="2400" dirty="0" err="1"/>
+              <a:t>it</a:t>
+            </a:r>
+            <a:r>
+              <a:rPr lang="it-IT" sz="2400" dirty="0"/>
+              <a:t> </a:t>
+            </a:r>
+            <a:r>
+              <a:rPr lang="it-IT" sz="2400" dirty="0" err="1"/>
+              <a:t>is</a:t>
+            </a:r>
+            <a:r>
+              <a:rPr lang="it-IT" sz="2400" dirty="0"/>
+              <a:t> </a:t>
+            </a:r>
+            <a:r>
+              <a:rPr lang="it-IT" sz="2400" dirty="0" err="1"/>
+              <a:t>still</a:t>
+            </a:r>
+            <a:r>
+              <a:rPr lang="it-IT" sz="2400" dirty="0"/>
+              <a:t> </a:t>
+            </a:r>
+            <a:r>
+              <a:rPr lang="it-IT" sz="2400" dirty="0" err="1"/>
+              <a:t>receiving</a:t>
+            </a:r>
+            <a:r>
+              <a:rPr lang="it-IT" sz="2400" dirty="0"/>
+              <a:t> data, </a:t>
+            </a:r>
+            <a:r>
+              <a:rPr lang="it-IT" sz="2400" dirty="0" err="1"/>
+              <a:t>but</a:t>
+            </a:r>
+            <a:r>
+              <a:rPr lang="it-IT" sz="2400" dirty="0"/>
+              <a:t> </a:t>
+            </a:r>
+            <a:r>
+              <a:rPr lang="it-IT" sz="2400" dirty="0" err="1"/>
+              <a:t>it</a:t>
+            </a:r>
+            <a:r>
+              <a:rPr lang="it-IT" sz="2400" dirty="0"/>
+              <a:t> </a:t>
+            </a:r>
+            <a:r>
+              <a:rPr lang="it-IT" sz="2400" dirty="0" err="1"/>
+              <a:t>is</a:t>
+            </a:r>
+            <a:r>
+              <a:rPr lang="it-IT" sz="2400" dirty="0"/>
+              <a:t> </a:t>
+            </a:r>
+            <a:r>
+              <a:rPr lang="it-IT" sz="2400" dirty="0" err="1"/>
+              <a:t>not</a:t>
+            </a:r>
+            <a:r>
+              <a:rPr lang="it-IT" sz="2400" dirty="0"/>
+              <a:t> </a:t>
+            </a:r>
+            <a:r>
+              <a:rPr lang="it-IT" sz="2400" dirty="0" err="1"/>
+              <a:t>fully</a:t>
+            </a:r>
+            <a:r>
+              <a:rPr lang="it-IT" sz="2400" dirty="0"/>
+              <a:t> </a:t>
+            </a:r>
+            <a:r>
+              <a:rPr lang="it-IT" sz="2400" dirty="0" err="1"/>
+              <a:t>joined</a:t>
+            </a:r>
+            <a:r>
+              <a:rPr lang="it-IT" sz="2400" dirty="0"/>
+              <a:t>, so </a:t>
+            </a:r>
+            <a:r>
+              <a:rPr lang="it-IT" sz="2400" dirty="0" err="1"/>
+              <a:t>not</a:t>
+            </a:r>
+            <a:r>
+              <a:rPr lang="it-IT" sz="2400" dirty="0"/>
+              <a:t> ready for </a:t>
+            </a:r>
+            <a:r>
+              <a:rPr lang="it-IT" sz="2400" dirty="0" err="1"/>
+              <a:t>reads</a:t>
+            </a:r>
+            <a:endParaRPr lang="it-IT" sz="2400" dirty="0"/>
+          </a:p>
+          <a:p>
+            <a:pPr lvl="1">
+              <a:buFont typeface="Tw Cen MT" panose="020B0602020104020603" pitchFamily="34" charset="0"/>
+              <a:buChar char="-"/>
+            </a:pPr>
+            <a:r>
+              <a:rPr lang="it-IT" sz="2200" dirty="0"/>
+              <a:t>The </a:t>
+            </a:r>
+            <a:r>
+              <a:rPr lang="it-IT" sz="2200" dirty="0" err="1"/>
+              <a:t>node</a:t>
+            </a:r>
+            <a:r>
+              <a:rPr lang="it-IT" sz="2200" dirty="0"/>
+              <a:t> </a:t>
+            </a:r>
+            <a:r>
+              <a:rPr lang="it-IT" sz="2200" dirty="0" err="1"/>
+              <a:t>is</a:t>
+            </a:r>
+            <a:r>
+              <a:rPr lang="it-IT" sz="2200" dirty="0"/>
+              <a:t> online! No </a:t>
+            </a:r>
+            <a:r>
+              <a:rPr lang="it-IT" sz="2200" dirty="0" err="1"/>
+              <a:t>downtime</a:t>
+            </a:r>
+            <a:endParaRPr lang="it-IT" sz="2200" dirty="0"/>
+          </a:p>
+          <a:p>
+            <a:pPr>
+              <a:buFont typeface="Tw Cen MT" panose="020B0602020104020603" pitchFamily="34" charset="0"/>
+              <a:buChar char="-"/>
+            </a:pPr>
+            <a:r>
+              <a:rPr lang="it-IT" sz="2400" dirty="0"/>
+              <a:t> </a:t>
+            </a:r>
+            <a:r>
+              <a:rPr lang="it-IT" sz="2400" dirty="0" err="1"/>
+              <a:t>Finally</a:t>
+            </a:r>
+            <a:r>
+              <a:rPr lang="it-IT" sz="2400" dirty="0"/>
+              <a:t>, </a:t>
+            </a:r>
+            <a:r>
+              <a:rPr lang="it-IT" sz="2400" dirty="0" err="1"/>
+              <a:t>when</a:t>
+            </a:r>
+            <a:r>
+              <a:rPr lang="it-IT" sz="2400" dirty="0"/>
+              <a:t> the </a:t>
+            </a:r>
+            <a:r>
+              <a:rPr lang="it-IT" sz="2400" dirty="0" err="1"/>
+              <a:t>node</a:t>
+            </a:r>
+            <a:r>
+              <a:rPr lang="it-IT" sz="2400" dirty="0"/>
+              <a:t> </a:t>
+            </a:r>
+            <a:r>
+              <a:rPr lang="it-IT" sz="2400" dirty="0" err="1"/>
+              <a:t>is</a:t>
+            </a:r>
+            <a:r>
+              <a:rPr lang="it-IT" sz="2400" dirty="0"/>
+              <a:t> </a:t>
+            </a:r>
+            <a:r>
+              <a:rPr lang="it-IT" sz="2400" i="1" dirty="0"/>
+              <a:t>up</a:t>
+            </a:r>
+            <a:r>
+              <a:rPr lang="it-IT" sz="2400" dirty="0"/>
+              <a:t>, </a:t>
+            </a:r>
+            <a:r>
+              <a:rPr lang="it-IT" sz="2400" dirty="0" err="1"/>
+              <a:t>it</a:t>
+            </a:r>
+            <a:r>
+              <a:rPr lang="it-IT" sz="2400" dirty="0"/>
+              <a:t> </a:t>
+            </a:r>
+            <a:r>
+              <a:rPr lang="it-IT" sz="2400" dirty="0" err="1"/>
+              <a:t>is</a:t>
+            </a:r>
+            <a:r>
+              <a:rPr lang="it-IT" sz="2400" dirty="0"/>
+              <a:t> ready</a:t>
+            </a:r>
+          </a:p>
+          <a:p>
+            <a:pPr marL="0" indent="0">
+              <a:buNone/>
+            </a:pPr>
+            <a:endParaRPr lang="it-IT" sz="500" dirty="0"/>
+          </a:p>
+          <a:p>
+            <a:pPr marL="0" indent="0" algn="ctr">
+              <a:spcBef>
+                <a:spcPts val="0"/>
+              </a:spcBef>
+              <a:buNone/>
+            </a:pPr>
+            <a:r>
+              <a:rPr lang="it-IT" sz="2400" dirty="0" err="1"/>
+              <a:t>Remember</a:t>
+            </a:r>
+            <a:r>
+              <a:rPr lang="it-IT" sz="2400" dirty="0"/>
+              <a:t>: </a:t>
+            </a:r>
+            <a:r>
+              <a:rPr lang="it-IT" sz="2400" dirty="0" err="1">
+                <a:solidFill>
+                  <a:schemeClr val="accent1">
+                    <a:lumMod val="50000"/>
+                  </a:schemeClr>
+                </a:solidFill>
+              </a:rPr>
+              <a:t>horizontal</a:t>
+            </a:r>
+            <a:r>
+              <a:rPr lang="it-IT" sz="2400" dirty="0">
+                <a:solidFill>
+                  <a:schemeClr val="accent1">
+                    <a:lumMod val="50000"/>
+                  </a:schemeClr>
+                </a:solidFill>
+              </a:rPr>
+              <a:t> scaling </a:t>
+            </a:r>
+            <a:r>
+              <a:rPr lang="it-IT" sz="2400" dirty="0" err="1">
+                <a:solidFill>
+                  <a:schemeClr val="accent1">
+                    <a:lumMod val="50000"/>
+                  </a:schemeClr>
+                </a:solidFill>
+              </a:rPr>
+              <a:t>is</a:t>
+            </a:r>
+            <a:r>
+              <a:rPr lang="it-IT" sz="2400" dirty="0">
+                <a:solidFill>
+                  <a:schemeClr val="accent1">
+                    <a:lumMod val="50000"/>
+                  </a:schemeClr>
+                </a:solidFill>
+              </a:rPr>
+              <a:t> </a:t>
+            </a:r>
+            <a:r>
+              <a:rPr lang="it-IT" sz="2400" dirty="0" err="1">
+                <a:solidFill>
+                  <a:schemeClr val="accent1">
+                    <a:lumMod val="50000"/>
+                  </a:schemeClr>
+                </a:solidFill>
+              </a:rPr>
+              <a:t>preferable</a:t>
+            </a:r>
+            <a:r>
+              <a:rPr lang="it-IT" sz="2400" dirty="0"/>
+              <a:t>, so </a:t>
+            </a:r>
+            <a:r>
+              <a:rPr lang="it-IT" sz="2400" dirty="0" err="1"/>
+              <a:t>adding</a:t>
+            </a:r>
+            <a:r>
+              <a:rPr lang="it-IT" sz="2400" dirty="0"/>
+              <a:t> </a:t>
+            </a:r>
+            <a:r>
+              <a:rPr lang="it-IT" sz="2400" dirty="0" err="1"/>
+              <a:t>nodes</a:t>
+            </a:r>
+            <a:r>
+              <a:rPr lang="it-IT" sz="2400" dirty="0"/>
+              <a:t> </a:t>
+            </a:r>
+            <a:r>
+              <a:rPr lang="it-IT" sz="2400" dirty="0" err="1"/>
+              <a:t>is</a:t>
+            </a:r>
+            <a:r>
+              <a:rPr lang="it-IT" sz="2400" dirty="0"/>
+              <a:t> good </a:t>
+            </a:r>
+            <a:r>
+              <a:rPr lang="it-IT" sz="2400" dirty="0" err="1"/>
+              <a:t>practice</a:t>
+            </a:r>
+            <a:r>
+              <a:rPr lang="it-IT" sz="2400" dirty="0"/>
+              <a:t> </a:t>
+            </a:r>
+            <a:r>
+              <a:rPr lang="it-IT" sz="2400" dirty="0" err="1"/>
+              <a:t>rather</a:t>
+            </a:r>
+            <a:r>
+              <a:rPr lang="it-IT" sz="2400" dirty="0"/>
+              <a:t> </a:t>
+            </a:r>
+            <a:r>
+              <a:rPr lang="it-IT" sz="2400" dirty="0" err="1"/>
+              <a:t>than</a:t>
+            </a:r>
+            <a:r>
+              <a:rPr lang="it-IT" sz="2400" dirty="0"/>
+              <a:t> </a:t>
+            </a:r>
+            <a:r>
+              <a:rPr lang="it-IT" sz="2400" dirty="0" err="1"/>
+              <a:t>improve</a:t>
+            </a:r>
+            <a:r>
+              <a:rPr lang="it-IT" sz="2400" dirty="0"/>
+              <a:t> a single machine</a:t>
+            </a:r>
+          </a:p>
+        </p:txBody>
+      </p:sp>
+    </p:spTree>
+    <p:extLst>
+      <p:ext uri="{BB962C8B-B14F-4D97-AF65-F5344CB8AC3E}">
+        <p14:creationId xmlns:p14="http://schemas.microsoft.com/office/powerpoint/2010/main" val="4269159554"/>
+      </p:ext>
+    </p:extLst>
+  </p:cSld>
+  <p:clrMapOvr>
+    <a:masterClrMapping/>
+  </p:clrMapOvr>
+</p:sld>
+</file>
+
+<file path=ppt/slides/slide13.xml><?xml version="1.0" encoding="utf-8"?>
+<p:sld xmlns:a="http://schemas.openxmlformats.org/drawingml/2006/main" xmlns:r="http://schemas.openxmlformats.org/officeDocument/2006/relationships" xmlns:p="http://schemas.openxmlformats.org/presentationml/2006/main">
+  <p:cSld>
+    <p:spTree>
+      <p:nvGrpSpPr>
+        <p:cNvPr id="1" name=""/>
+        <p:cNvGrpSpPr/>
+        <p:nvPr/>
+      </p:nvGrpSpPr>
+      <p:grpSpPr>
+        <a:xfrm>
+          <a:off x="0" y="0"/>
+          <a:ext cx="0" cy="0"/>
+          <a:chOff x="0" y="0"/>
+          <a:chExt cx="0" cy="0"/>
+        </a:xfrm>
+      </p:grpSpPr>
+      <p:sp>
+        <p:nvSpPr>
+          <p:cNvPr id="2" name="Titolo 1">
+            <a:extLst>
+              <a:ext uri="{FF2B5EF4-FFF2-40B4-BE49-F238E27FC236}">
+                <a16:creationId xmlns:a16="http://schemas.microsoft.com/office/drawing/2014/main" id="{8EF47274-4266-43AE-94F7-2A965E1F8494}"/>
+              </a:ext>
+            </a:extLst>
+          </p:cNvPr>
+          <p:cNvSpPr>
+            <a:spLocks noGrp="1"/>
+          </p:cNvSpPr>
+          <p:nvPr>
+            <p:ph type="title"/>
+          </p:nvPr>
+        </p:nvSpPr>
+        <p:spPr/>
+        <p:txBody>
+          <a:bodyPr/>
+          <a:lstStyle/>
+          <a:p>
+            <a:r>
+              <a:rPr lang="it-IT" dirty="0" err="1"/>
+              <a:t>Vnodes</a:t>
+            </a:r>
+            <a:endParaRPr lang="it-IT" dirty="0"/>
+          </a:p>
+        </p:txBody>
+      </p:sp>
+      <p:sp>
+        <p:nvSpPr>
+          <p:cNvPr id="3" name="Segnaposto contenuto 2">
+            <a:extLst>
+              <a:ext uri="{FF2B5EF4-FFF2-40B4-BE49-F238E27FC236}">
+                <a16:creationId xmlns:a16="http://schemas.microsoft.com/office/drawing/2014/main" id="{F2C060D7-4E0D-4ED4-B406-37A3CE824BB1}"/>
+              </a:ext>
+            </a:extLst>
+          </p:cNvPr>
+          <p:cNvSpPr>
+            <a:spLocks noGrp="1"/>
+          </p:cNvSpPr>
+          <p:nvPr>
+            <p:ph idx="1"/>
+          </p:nvPr>
+        </p:nvSpPr>
+        <p:spPr>
+          <a:xfrm>
+            <a:off x="802185" y="1864311"/>
+            <a:ext cx="7587212" cy="4445049"/>
+          </a:xfrm>
+        </p:spPr>
+        <p:txBody>
+          <a:bodyPr>
+            <a:normAutofit/>
+          </a:bodyPr>
+          <a:lstStyle/>
+          <a:p>
+            <a:pPr>
+              <a:buFont typeface="Tw Cen MT" panose="020B0602020104020603" pitchFamily="34" charset="0"/>
+              <a:buChar char="-"/>
+            </a:pPr>
+            <a:r>
+              <a:rPr lang="it-IT" sz="2400" dirty="0"/>
+              <a:t> </a:t>
+            </a:r>
+            <a:r>
+              <a:rPr lang="it-IT" sz="2400" dirty="0" err="1"/>
+              <a:t>Adding</a:t>
+            </a:r>
+            <a:r>
+              <a:rPr lang="it-IT" sz="2400" dirty="0"/>
+              <a:t> or </a:t>
+            </a:r>
+            <a:r>
+              <a:rPr lang="it-IT" sz="2400" dirty="0" err="1"/>
+              <a:t>removing</a:t>
+            </a:r>
+            <a:r>
+              <a:rPr lang="it-IT" sz="2400" dirty="0"/>
+              <a:t> </a:t>
+            </a:r>
+            <a:r>
+              <a:rPr lang="it-IT" sz="2400" dirty="0" err="1"/>
+              <a:t>nodes</a:t>
+            </a:r>
+            <a:r>
+              <a:rPr lang="it-IT" sz="2400" dirty="0"/>
+              <a:t> in the cluster takes time to stream the data and </a:t>
+            </a:r>
+            <a:r>
+              <a:rPr lang="it-IT" sz="2400" dirty="0" err="1"/>
+              <a:t>calculate</a:t>
+            </a:r>
+            <a:r>
+              <a:rPr lang="it-IT" sz="2400" dirty="0"/>
+              <a:t> the new ring range</a:t>
+            </a:r>
+          </a:p>
+          <a:p>
+            <a:pPr>
+              <a:buFont typeface="Tw Cen MT" panose="020B0602020104020603" pitchFamily="34" charset="0"/>
+              <a:buChar char="-"/>
+            </a:pPr>
+            <a:r>
+              <a:rPr lang="it-IT" sz="2400" dirty="0"/>
+              <a:t> Using </a:t>
+            </a:r>
+            <a:r>
+              <a:rPr lang="it-IT" sz="2400" dirty="0" err="1"/>
+              <a:t>Vnodes</a:t>
+            </a:r>
+            <a:r>
+              <a:rPr lang="it-IT" sz="2400" dirty="0"/>
+              <a:t>, </a:t>
+            </a:r>
+            <a:r>
+              <a:rPr lang="it-IT" sz="2400" dirty="0" err="1"/>
+              <a:t>each</a:t>
+            </a:r>
+            <a:r>
+              <a:rPr lang="it-IT" sz="2400" dirty="0"/>
+              <a:t> </a:t>
+            </a:r>
+            <a:r>
+              <a:rPr lang="it-IT" sz="2400" dirty="0" err="1"/>
+              <a:t>physical</a:t>
+            </a:r>
+            <a:r>
+              <a:rPr lang="it-IT" sz="2400" dirty="0"/>
+              <a:t> </a:t>
+            </a:r>
+            <a:r>
+              <a:rPr lang="it-IT" sz="2400" dirty="0" err="1"/>
+              <a:t>node</a:t>
+            </a:r>
+            <a:r>
+              <a:rPr lang="it-IT" sz="2400" dirty="0"/>
+              <a:t> act like </a:t>
+            </a:r>
+            <a:r>
+              <a:rPr lang="it-IT" sz="2400" dirty="0" err="1"/>
+              <a:t>several</a:t>
+            </a:r>
+            <a:r>
+              <a:rPr lang="it-IT" sz="2400" dirty="0"/>
+              <a:t> </a:t>
+            </a:r>
+            <a:r>
+              <a:rPr lang="it-IT" sz="2400" dirty="0" err="1"/>
+              <a:t>smaller</a:t>
+            </a:r>
+            <a:r>
+              <a:rPr lang="it-IT" sz="2400" dirty="0"/>
+              <a:t> </a:t>
+            </a:r>
+            <a:r>
+              <a:rPr lang="it-IT" sz="2400" dirty="0" err="1"/>
+              <a:t>virtual</a:t>
+            </a:r>
+            <a:r>
+              <a:rPr lang="it-IT" sz="2400" dirty="0"/>
+              <a:t> </a:t>
+            </a:r>
+            <a:r>
+              <a:rPr lang="it-IT" sz="2400" dirty="0" err="1"/>
+              <a:t>nodes</a:t>
+            </a:r>
+            <a:endParaRPr lang="it-IT" sz="2400" dirty="0"/>
+          </a:p>
+          <a:p>
+            <a:pPr lvl="1">
+              <a:buFont typeface="Tw Cen MT" panose="020B0602020104020603" pitchFamily="34" charset="0"/>
+              <a:buChar char="-"/>
+            </a:pPr>
+            <a:r>
+              <a:rPr lang="it-IT" sz="2200" dirty="0"/>
+              <a:t>A </a:t>
+            </a:r>
+            <a:r>
+              <a:rPr lang="it-IT" sz="2200" dirty="0" err="1"/>
+              <a:t>node</a:t>
+            </a:r>
+            <a:r>
+              <a:rPr lang="it-IT" sz="2200" dirty="0"/>
+              <a:t> </a:t>
+            </a:r>
+            <a:r>
+              <a:rPr lang="it-IT" sz="2200" dirty="0" err="1"/>
+              <a:t>is</a:t>
+            </a:r>
+            <a:r>
+              <a:rPr lang="it-IT" sz="2200" dirty="0"/>
+              <a:t> </a:t>
+            </a:r>
+            <a:r>
+              <a:rPr lang="it-IT" sz="2200" dirty="0" err="1"/>
+              <a:t>responsible</a:t>
+            </a:r>
+            <a:r>
+              <a:rPr lang="it-IT" sz="2200" dirty="0"/>
+              <a:t> for </a:t>
+            </a:r>
+            <a:r>
+              <a:rPr lang="it-IT" sz="2200" dirty="0" err="1"/>
+              <a:t>several</a:t>
+            </a:r>
+            <a:r>
+              <a:rPr lang="it-IT" sz="2200" dirty="0"/>
+              <a:t> </a:t>
+            </a:r>
+            <a:r>
+              <a:rPr lang="it-IT" sz="2200" dirty="0" err="1"/>
+              <a:t>smaller</a:t>
+            </a:r>
+            <a:r>
+              <a:rPr lang="it-IT" sz="2200" dirty="0"/>
+              <a:t> slices of the ring </a:t>
+            </a:r>
+            <a:r>
+              <a:rPr lang="it-IT" sz="2200" dirty="0" err="1"/>
+              <a:t>instead</a:t>
+            </a:r>
+            <a:r>
+              <a:rPr lang="it-IT" sz="2200" dirty="0"/>
+              <a:t> of one large slice</a:t>
+            </a:r>
+          </a:p>
+          <a:p>
+            <a:pPr>
+              <a:buFont typeface="Tw Cen MT" panose="020B0602020104020603" pitchFamily="34" charset="0"/>
+              <a:buChar char="-"/>
+            </a:pPr>
+            <a:r>
+              <a:rPr lang="it-IT" sz="2400" dirty="0"/>
+              <a:t> Using a </a:t>
+            </a:r>
+            <a:r>
+              <a:rPr lang="it-IT" sz="2400" dirty="0" err="1"/>
+              <a:t>consistent</a:t>
+            </a:r>
+            <a:r>
+              <a:rPr lang="it-IT" sz="2400" dirty="0"/>
+              <a:t> hash </a:t>
+            </a:r>
+            <a:r>
+              <a:rPr lang="it-IT" sz="2400" dirty="0" err="1"/>
+              <a:t>ensure</a:t>
+            </a:r>
+            <a:r>
+              <a:rPr lang="it-IT" sz="2400" dirty="0"/>
+              <a:t> </a:t>
+            </a:r>
+            <a:r>
+              <a:rPr lang="it-IT" sz="2400" dirty="0" err="1"/>
+              <a:t>that</a:t>
+            </a:r>
+            <a:r>
+              <a:rPr lang="it-IT" sz="2400" dirty="0"/>
+              <a:t> </a:t>
+            </a:r>
+            <a:r>
+              <a:rPr lang="it-IT" sz="2400" dirty="0" err="1"/>
+              <a:t>all</a:t>
+            </a:r>
+            <a:r>
+              <a:rPr lang="it-IT" sz="2400" dirty="0"/>
+              <a:t> the </a:t>
+            </a:r>
+            <a:r>
+              <a:rPr lang="it-IT" sz="2400" dirty="0" err="1"/>
+              <a:t>nodes</a:t>
+            </a:r>
+            <a:r>
+              <a:rPr lang="it-IT" sz="2400" dirty="0"/>
+              <a:t> </a:t>
+            </a:r>
+            <a:r>
+              <a:rPr lang="it-IT" sz="2400" dirty="0" err="1"/>
+              <a:t>will</a:t>
+            </a:r>
+            <a:r>
+              <a:rPr lang="it-IT" sz="2400" dirty="0"/>
+              <a:t> </a:t>
+            </a:r>
+            <a:r>
+              <a:rPr lang="it-IT" sz="2400" dirty="0" err="1"/>
+              <a:t>have</a:t>
+            </a:r>
+            <a:r>
+              <a:rPr lang="it-IT" sz="2400" dirty="0"/>
+              <a:t> the </a:t>
+            </a:r>
+            <a:r>
+              <a:rPr lang="it-IT" sz="2400" dirty="0" err="1"/>
+              <a:t>same</a:t>
+            </a:r>
+            <a:r>
+              <a:rPr lang="it-IT" sz="2400" dirty="0"/>
+              <a:t> </a:t>
+            </a:r>
+            <a:r>
+              <a:rPr lang="it-IT" sz="2400" dirty="0" err="1"/>
+              <a:t>amount</a:t>
+            </a:r>
+            <a:r>
+              <a:rPr lang="it-IT" sz="2400" dirty="0"/>
+              <a:t> of data</a:t>
+            </a:r>
+          </a:p>
+          <a:p>
+            <a:pPr>
+              <a:buFont typeface="Tw Cen MT" panose="020B0602020104020603" pitchFamily="34" charset="0"/>
+              <a:buChar char="-"/>
+            </a:pPr>
+            <a:r>
+              <a:rPr lang="it-IT" sz="2400" dirty="0"/>
+              <a:t> </a:t>
+            </a:r>
+            <a:r>
+              <a:rPr lang="it-IT" sz="2400" dirty="0" err="1"/>
+              <a:t>When</a:t>
+            </a:r>
+            <a:r>
+              <a:rPr lang="it-IT" sz="2400" dirty="0"/>
+              <a:t> a </a:t>
+            </a:r>
+            <a:r>
+              <a:rPr lang="it-IT" sz="2400" dirty="0" err="1"/>
+              <a:t>node</a:t>
+            </a:r>
+            <a:r>
+              <a:rPr lang="it-IT" sz="2400" dirty="0"/>
+              <a:t> </a:t>
+            </a:r>
+            <a:r>
+              <a:rPr lang="it-IT" sz="2400" dirty="0" err="1"/>
+              <a:t>is</a:t>
+            </a:r>
+            <a:r>
+              <a:rPr lang="it-IT" sz="2400" dirty="0"/>
+              <a:t> </a:t>
+            </a:r>
+            <a:r>
+              <a:rPr lang="it-IT" sz="2400" dirty="0" err="1"/>
+              <a:t>inserted</a:t>
+            </a:r>
+            <a:r>
+              <a:rPr lang="it-IT" sz="2400" dirty="0"/>
+              <a:t>: </a:t>
+            </a:r>
+            <a:r>
+              <a:rPr lang="it-IT" sz="2400" dirty="0" err="1"/>
+              <a:t>instead</a:t>
+            </a:r>
+            <a:r>
+              <a:rPr lang="it-IT" sz="2400" dirty="0"/>
+              <a:t> of </a:t>
+            </a:r>
+            <a:r>
+              <a:rPr lang="it-IT" sz="2400" dirty="0" err="1"/>
+              <a:t>taking</a:t>
+            </a:r>
+            <a:r>
+              <a:rPr lang="it-IT" sz="2400" dirty="0"/>
+              <a:t> over one </a:t>
+            </a:r>
+            <a:r>
+              <a:rPr lang="it-IT" sz="2400" dirty="0" err="1"/>
+              <a:t>node’s</a:t>
+            </a:r>
+            <a:r>
+              <a:rPr lang="it-IT" sz="2400" dirty="0"/>
+              <a:t> </a:t>
+            </a:r>
+            <a:r>
+              <a:rPr lang="it-IT" sz="2400" dirty="0" err="1"/>
+              <a:t>entire</a:t>
+            </a:r>
+            <a:r>
+              <a:rPr lang="it-IT" sz="2400" dirty="0"/>
+              <a:t> token range, </a:t>
+            </a:r>
+            <a:r>
+              <a:rPr lang="it-IT" sz="2400" dirty="0" err="1"/>
+              <a:t>it</a:t>
+            </a:r>
+            <a:r>
+              <a:rPr lang="it-IT" sz="2400" dirty="0"/>
+              <a:t> takes </a:t>
+            </a:r>
+            <a:r>
+              <a:rPr lang="it-IT" sz="2400" dirty="0" err="1"/>
+              <a:t>several</a:t>
+            </a:r>
+            <a:r>
+              <a:rPr lang="it-IT" sz="2400" dirty="0"/>
+              <a:t> </a:t>
+            </a:r>
+            <a:r>
+              <a:rPr lang="it-IT" sz="2400" dirty="0" err="1"/>
+              <a:t>smaller</a:t>
+            </a:r>
+            <a:r>
+              <a:rPr lang="it-IT" sz="2400" dirty="0"/>
+              <a:t> ranges from </a:t>
+            </a:r>
+            <a:r>
+              <a:rPr lang="it-IT" sz="2400" dirty="0" err="1"/>
+              <a:t>each</a:t>
+            </a:r>
+            <a:r>
+              <a:rPr lang="it-IT" sz="2400" dirty="0"/>
+              <a:t> </a:t>
+            </a:r>
+            <a:r>
+              <a:rPr lang="it-IT" sz="2400" dirty="0" err="1"/>
+              <a:t>other</a:t>
+            </a:r>
+            <a:r>
+              <a:rPr lang="it-IT" sz="2400" dirty="0"/>
+              <a:t> </a:t>
+            </a:r>
+            <a:r>
+              <a:rPr lang="it-IT" sz="2400" dirty="0" err="1"/>
+              <a:t>nodes</a:t>
+            </a:r>
+            <a:r>
+              <a:rPr lang="it-IT" sz="2400" dirty="0"/>
+              <a:t>, </a:t>
+            </a:r>
+            <a:r>
+              <a:rPr lang="it-IT" sz="2400" dirty="0" err="1"/>
+              <a:t>that</a:t>
+            </a:r>
+            <a:r>
+              <a:rPr lang="it-IT" sz="2400" dirty="0"/>
+              <a:t> </a:t>
+            </a:r>
+            <a:r>
+              <a:rPr lang="it-IT" sz="2400" dirty="0" err="1"/>
+              <a:t>will</a:t>
+            </a:r>
+            <a:r>
+              <a:rPr lang="it-IT" sz="2400" dirty="0"/>
+              <a:t> stream in </a:t>
+            </a:r>
+            <a:r>
+              <a:rPr lang="it-IT" sz="2400"/>
+              <a:t>parallel</a:t>
+            </a:r>
+            <a:endParaRPr lang="it-IT" sz="2400" dirty="0"/>
+          </a:p>
+          <a:p>
+            <a:pPr>
+              <a:buFont typeface="Tw Cen MT" panose="020B0602020104020603" pitchFamily="34" charset="0"/>
+              <a:buChar char="-"/>
+            </a:pPr>
+            <a:endParaRPr lang="it-IT" sz="2400" dirty="0"/>
+          </a:p>
+        </p:txBody>
+      </p:sp>
+      <p:grpSp>
+        <p:nvGrpSpPr>
+          <p:cNvPr id="21" name="Gruppo 20">
+            <a:extLst>
+              <a:ext uri="{FF2B5EF4-FFF2-40B4-BE49-F238E27FC236}">
+                <a16:creationId xmlns:a16="http://schemas.microsoft.com/office/drawing/2014/main" id="{DDB5921C-48A4-4BA5-8B1F-C9157EB1630F}"/>
+              </a:ext>
+            </a:extLst>
+          </p:cNvPr>
+          <p:cNvGrpSpPr/>
+          <p:nvPr/>
+        </p:nvGrpSpPr>
+        <p:grpSpPr>
+          <a:xfrm>
+            <a:off x="8912165" y="474154"/>
+            <a:ext cx="2745230" cy="2841834"/>
+            <a:chOff x="9046720" y="616455"/>
+            <a:chExt cx="2745230" cy="2841834"/>
+          </a:xfrm>
+        </p:grpSpPr>
+        <p:pic>
+          <p:nvPicPr>
+            <p:cNvPr id="5" name="Immagine 4">
+              <a:extLst>
+                <a:ext uri="{FF2B5EF4-FFF2-40B4-BE49-F238E27FC236}">
+                  <a16:creationId xmlns:a16="http://schemas.microsoft.com/office/drawing/2014/main" id="{EE11958C-CF14-4764-9302-6E9BEFF8D252}"/>
+                </a:ext>
+              </a:extLst>
+            </p:cNvPr>
+            <p:cNvPicPr>
+              <a:picLocks noChangeAspect="1"/>
+            </p:cNvPicPr>
+            <p:nvPr/>
+          </p:nvPicPr>
+          <p:blipFill>
+            <a:blip r:embed="rId2"/>
+            <a:stretch>
+              <a:fillRect/>
+            </a:stretch>
+          </p:blipFill>
+          <p:spPr>
+            <a:xfrm>
+              <a:off x="9242159" y="616455"/>
+              <a:ext cx="2354353" cy="2495712"/>
+            </a:xfrm>
+            <a:prstGeom prst="rect">
+              <a:avLst/>
+            </a:prstGeom>
+          </p:spPr>
+        </p:pic>
+        <p:sp>
+          <p:nvSpPr>
+            <p:cNvPr id="19" name="CasellaDiTesto 18">
+              <a:extLst>
+                <a:ext uri="{FF2B5EF4-FFF2-40B4-BE49-F238E27FC236}">
+                  <a16:creationId xmlns:a16="http://schemas.microsoft.com/office/drawing/2014/main" id="{BF4E9468-4E56-47A0-AB72-A47DB0FFA950}"/>
+                </a:ext>
+              </a:extLst>
+            </p:cNvPr>
+            <p:cNvSpPr txBox="1"/>
+            <p:nvPr/>
+          </p:nvSpPr>
+          <p:spPr>
+            <a:xfrm>
+              <a:off x="9046720" y="3088957"/>
+              <a:ext cx="2745230" cy="369332"/>
+            </a:xfrm>
+            <a:prstGeom prst="rect">
+              <a:avLst/>
+            </a:prstGeom>
+            <a:noFill/>
+          </p:spPr>
+          <p:txBody>
+            <a:bodyPr wrap="square" rtlCol="0">
+              <a:spAutoFit/>
+            </a:bodyPr>
+            <a:lstStyle/>
+            <a:p>
+              <a:pPr algn="ctr"/>
+              <a:r>
+                <a:rPr lang="it-IT" dirty="0" err="1"/>
+                <a:t>Without</a:t>
+              </a:r>
+              <a:r>
+                <a:rPr lang="it-IT" dirty="0"/>
+                <a:t> </a:t>
+              </a:r>
+              <a:r>
+                <a:rPr lang="it-IT" dirty="0" err="1"/>
+                <a:t>VNodes</a:t>
+              </a:r>
+              <a:endParaRPr lang="it-IT" dirty="0"/>
+            </a:p>
+          </p:txBody>
+        </p:sp>
+      </p:grpSp>
+      <p:grpSp>
+        <p:nvGrpSpPr>
+          <p:cNvPr id="22" name="Gruppo 21">
+            <a:extLst>
+              <a:ext uri="{FF2B5EF4-FFF2-40B4-BE49-F238E27FC236}">
+                <a16:creationId xmlns:a16="http://schemas.microsoft.com/office/drawing/2014/main" id="{71DCFAD2-74AF-4F26-82F4-A66B0092661C}"/>
+              </a:ext>
+            </a:extLst>
+          </p:cNvPr>
+          <p:cNvGrpSpPr/>
+          <p:nvPr/>
+        </p:nvGrpSpPr>
+        <p:grpSpPr>
+          <a:xfrm>
+            <a:off x="8819826" y="3514293"/>
+            <a:ext cx="2929908" cy="3135673"/>
+            <a:chOff x="9046720" y="3358353"/>
+            <a:chExt cx="2929908" cy="3135673"/>
+          </a:xfrm>
+        </p:grpSpPr>
+        <p:pic>
+          <p:nvPicPr>
+            <p:cNvPr id="18" name="Immagine 17">
+              <a:extLst>
+                <a:ext uri="{FF2B5EF4-FFF2-40B4-BE49-F238E27FC236}">
+                  <a16:creationId xmlns:a16="http://schemas.microsoft.com/office/drawing/2014/main" id="{1ADDCBF1-4D56-4FCD-AD38-A8BF58FDBDF7}"/>
+                </a:ext>
+              </a:extLst>
+            </p:cNvPr>
+            <p:cNvPicPr>
+              <a:picLocks noChangeAspect="1"/>
+            </p:cNvPicPr>
+            <p:nvPr/>
+          </p:nvPicPr>
+          <p:blipFill>
+            <a:blip r:embed="rId3"/>
+            <a:stretch>
+              <a:fillRect/>
+            </a:stretch>
+          </p:blipFill>
+          <p:spPr>
+            <a:xfrm>
+              <a:off x="9046720" y="3358353"/>
+              <a:ext cx="2929908" cy="2681611"/>
+            </a:xfrm>
+            <a:prstGeom prst="rect">
+              <a:avLst/>
+            </a:prstGeom>
+          </p:spPr>
+        </p:pic>
+        <p:sp>
+          <p:nvSpPr>
+            <p:cNvPr id="20" name="CasellaDiTesto 19">
+              <a:extLst>
+                <a:ext uri="{FF2B5EF4-FFF2-40B4-BE49-F238E27FC236}">
+                  <a16:creationId xmlns:a16="http://schemas.microsoft.com/office/drawing/2014/main" id="{81EBC538-9EDA-4FDE-81A1-10107F7428B5}"/>
+                </a:ext>
+              </a:extLst>
+            </p:cNvPr>
+            <p:cNvSpPr txBox="1"/>
+            <p:nvPr/>
+          </p:nvSpPr>
+          <p:spPr>
+            <a:xfrm>
+              <a:off x="9139059" y="6124694"/>
+              <a:ext cx="2745230" cy="369332"/>
+            </a:xfrm>
+            <a:prstGeom prst="rect">
+              <a:avLst/>
+            </a:prstGeom>
+            <a:noFill/>
+          </p:spPr>
+          <p:txBody>
+            <a:bodyPr wrap="square" rtlCol="0">
+              <a:spAutoFit/>
+            </a:bodyPr>
+            <a:lstStyle/>
+            <a:p>
+              <a:pPr algn="ctr"/>
+              <a:r>
+                <a:rPr lang="it-IT" dirty="0"/>
+                <a:t>With </a:t>
+              </a:r>
+              <a:r>
+                <a:rPr lang="it-IT" dirty="0" err="1"/>
+                <a:t>VNodes</a:t>
+              </a:r>
+              <a:endParaRPr lang="it-IT" dirty="0"/>
+            </a:p>
+          </p:txBody>
+        </p:sp>
+      </p:grpSp>
+      <p:cxnSp>
+        <p:nvCxnSpPr>
+          <p:cNvPr id="24" name="Connettore diritto 23">
+            <a:extLst>
+              <a:ext uri="{FF2B5EF4-FFF2-40B4-BE49-F238E27FC236}">
+                <a16:creationId xmlns:a16="http://schemas.microsoft.com/office/drawing/2014/main" id="{2D595F62-CD96-4FFF-8248-A72BC963B0EF}"/>
+              </a:ext>
+            </a:extLst>
+          </p:cNvPr>
+          <p:cNvCxnSpPr/>
+          <p:nvPr/>
+        </p:nvCxnSpPr>
+        <p:spPr>
+          <a:xfrm>
+            <a:off x="8504808" y="3429000"/>
+            <a:ext cx="3559945" cy="0"/>
+          </a:xfrm>
+          <a:prstGeom prst="line">
+            <a:avLst/>
+          </a:prstGeom>
+          <a:ln w="12700"/>
+        </p:spPr>
+        <p:style>
+          <a:lnRef idx="1">
+            <a:schemeClr val="accent1"/>
+          </a:lnRef>
+          <a:fillRef idx="0">
+            <a:schemeClr val="accent1"/>
+          </a:fillRef>
+          <a:effectRef idx="0">
+            <a:schemeClr val="accent1"/>
+          </a:effectRef>
+          <a:fontRef idx="minor">
+            <a:schemeClr val="tx1"/>
+          </a:fontRef>
+        </p:style>
+      </p:cxnSp>
+    </p:spTree>
+    <p:extLst>
+      <p:ext uri="{BB962C8B-B14F-4D97-AF65-F5344CB8AC3E}">
+        <p14:creationId xmlns:p14="http://schemas.microsoft.com/office/powerpoint/2010/main" val="4234187933"/>
+      </p:ext>
+    </p:extLst>
+  </p:cSld>
+  <p:clrMapOvr>
+    <a:masterClrMapping/>
+  </p:clrMapOvr>
+</p:sld>
+</file>
+
+<file path=ppt/slides/slide14.xml><?xml version="1.0" encoding="utf-8"?>
 <p:sld xmlns:a="http://schemas.openxmlformats.org/drawingml/2006/main" xmlns:r="http://schemas.openxmlformats.org/officeDocument/2006/relationships" xmlns:p="http://schemas.openxmlformats.org/presentationml/2006/main">
   <p:cSld>
     <p:spTree>
@@ -5334,7 +7927,7 @@
 </p:sld>
 </file>
 
-<file path=ppt/slides/slide13.xml><?xml version="1.0" encoding="utf-8"?>
+<file path=ppt/slides/slide15.xml><?xml version="1.0" encoding="utf-8"?>
 <p:sld xmlns:a="http://schemas.openxmlformats.org/drawingml/2006/main" xmlns:r="http://schemas.openxmlformats.org/officeDocument/2006/relationships" xmlns:p="http://schemas.openxmlformats.org/presentationml/2006/main">
   <p:cSld>
     <p:spTree>
@@ -5927,7 +8520,7 @@
 </p:sld>
 </file>
 
-<file path=ppt/slides/slide14.xml><?xml version="1.0" encoding="utf-8"?>
+<file path=ppt/slides/slide16.xml><?xml version="1.0" encoding="utf-8"?>
 <p:sld xmlns:a="http://schemas.openxmlformats.org/drawingml/2006/main" xmlns:r="http://schemas.openxmlformats.org/officeDocument/2006/relationships" xmlns:p="http://schemas.openxmlformats.org/presentationml/2006/main">
   <p:cSld>
     <p:spTree>
@@ -6714,7 +9307,7 @@
 </p:sld>
 </file>
 
-<file path=ppt/slides/slide15.xml><?xml version="1.0" encoding="utf-8"?>
+<file path=ppt/slides/slide17.xml><?xml version="1.0" encoding="utf-8"?>
 <p:sld xmlns:a="http://schemas.openxmlformats.org/drawingml/2006/main" xmlns:r="http://schemas.openxmlformats.org/officeDocument/2006/relationships" xmlns:p="http://schemas.openxmlformats.org/presentationml/2006/main">
   <p:cSld>
     <p:bg>
@@ -7571,7 +10164,7 @@
 </p:sld>
 </file>
 
-<file path=ppt/slides/slide16.xml><?xml version="1.0" encoding="utf-8"?>
+<file path=ppt/slides/slide18.xml><?xml version="1.0" encoding="utf-8"?>
 <p:sld xmlns:a="http://schemas.openxmlformats.org/drawingml/2006/main" xmlns:r="http://schemas.openxmlformats.org/officeDocument/2006/relationships" xmlns:p="http://schemas.openxmlformats.org/presentationml/2006/main">
   <p:cSld>
     <p:spTree>
@@ -8249,7 +10842,7 @@
 </p:sld>
 </file>
 
-<file path=ppt/slides/slide17.xml><?xml version="1.0" encoding="utf-8"?>
+<file path=ppt/slides/slide19.xml><?xml version="1.0" encoding="utf-8"?>
 <p:sld xmlns:a="http://schemas.openxmlformats.org/drawingml/2006/main" xmlns:r="http://schemas.openxmlformats.org/officeDocument/2006/relationships" xmlns:p="http://schemas.openxmlformats.org/presentationml/2006/main">
   <p:cSld>
     <p:spTree>
@@ -8802,776 +11395,6 @@
     <p:extLst>
       <p:ext uri="{BB962C8B-B14F-4D97-AF65-F5344CB8AC3E}">
         <p14:creationId xmlns:p14="http://schemas.microsoft.com/office/powerpoint/2010/main" val="840212661"/>
-      </p:ext>
-    </p:extLst>
-  </p:cSld>
-  <p:clrMapOvr>
-    <a:masterClrMapping/>
-  </p:clrMapOvr>
-</p:sld>
-</file>
-
-<file path=ppt/slides/slide18.xml><?xml version="1.0" encoding="utf-8"?>
-<p:sld xmlns:a="http://schemas.openxmlformats.org/drawingml/2006/main" xmlns:r="http://schemas.openxmlformats.org/officeDocument/2006/relationships" xmlns:p="http://schemas.openxmlformats.org/presentationml/2006/main">
-  <p:cSld>
-    <p:spTree>
-      <p:nvGrpSpPr>
-        <p:cNvPr id="1" name=""/>
-        <p:cNvGrpSpPr/>
-        <p:nvPr/>
-      </p:nvGrpSpPr>
-      <p:grpSpPr>
-        <a:xfrm>
-          <a:off x="0" y="0"/>
-          <a:ext cx="0" cy="0"/>
-          <a:chOff x="0" y="0"/>
-          <a:chExt cx="0" cy="0"/>
-        </a:xfrm>
-      </p:grpSpPr>
-      <p:sp>
-        <p:nvSpPr>
-          <p:cNvPr id="2" name="Titolo 1">
-            <a:extLst>
-              <a:ext uri="{FF2B5EF4-FFF2-40B4-BE49-F238E27FC236}">
-                <a16:creationId xmlns:a16="http://schemas.microsoft.com/office/drawing/2014/main" id="{A819C0DE-02ED-4B83-BE54-F0BAB6E230C3}"/>
-              </a:ext>
-            </a:extLst>
-          </p:cNvPr>
-          <p:cNvSpPr>
-            <a:spLocks noGrp="1"/>
-          </p:cNvSpPr>
-          <p:nvPr>
-            <p:ph type="title"/>
-          </p:nvPr>
-        </p:nvSpPr>
-        <p:spPr/>
-        <p:txBody>
-          <a:bodyPr/>
-          <a:lstStyle/>
-          <a:p>
-            <a:r>
-              <a:rPr lang="it-IT" dirty="0"/>
-              <a:t>Clustering </a:t>
-            </a:r>
-            <a:r>
-              <a:rPr lang="it-IT" dirty="0" err="1"/>
-              <a:t>columns</a:t>
-            </a:r>
-            <a:r>
-              <a:rPr lang="it-IT" dirty="0"/>
-              <a:t> </a:t>
-            </a:r>
-            <a:r>
-              <a:rPr lang="it-IT" dirty="0" err="1"/>
-              <a:t>order</a:t>
-            </a:r>
-            <a:endParaRPr lang="it-IT" dirty="0"/>
-          </a:p>
-        </p:txBody>
-      </p:sp>
-      <p:sp>
-        <p:nvSpPr>
-          <p:cNvPr id="3" name="Segnaposto contenuto 2">
-            <a:extLst>
-              <a:ext uri="{FF2B5EF4-FFF2-40B4-BE49-F238E27FC236}">
-                <a16:creationId xmlns:a16="http://schemas.microsoft.com/office/drawing/2014/main" id="{E02803CD-0DC7-4E54-88A4-EF7E147B09B4}"/>
-              </a:ext>
-            </a:extLst>
-          </p:cNvPr>
-          <p:cNvSpPr>
-            <a:spLocks noGrp="1"/>
-          </p:cNvSpPr>
-          <p:nvPr>
-            <p:ph idx="1"/>
-          </p:nvPr>
-        </p:nvSpPr>
-        <p:spPr/>
-        <p:txBody>
-          <a:bodyPr>
-            <a:normAutofit/>
-          </a:bodyPr>
-          <a:lstStyle/>
-          <a:p>
-            <a:r>
-              <a:rPr lang="it-IT" sz="2400" dirty="0"/>
-              <a:t>The default clustering </a:t>
-            </a:r>
-            <a:r>
-              <a:rPr lang="it-IT" sz="2400" dirty="0" err="1"/>
-              <a:t>column</a:t>
-            </a:r>
-            <a:r>
-              <a:rPr lang="it-IT" sz="2400" dirty="0"/>
-              <a:t> </a:t>
-            </a:r>
-            <a:r>
-              <a:rPr lang="it-IT" sz="2400" dirty="0" err="1"/>
-              <a:t>order</a:t>
-            </a:r>
-            <a:r>
-              <a:rPr lang="it-IT" sz="2400" dirty="0"/>
-              <a:t> </a:t>
-            </a:r>
-            <a:r>
-              <a:rPr lang="it-IT" sz="2400" dirty="0" err="1"/>
-              <a:t>is</a:t>
-            </a:r>
-            <a:r>
-              <a:rPr lang="it-IT" sz="2400" dirty="0"/>
-              <a:t> </a:t>
-            </a:r>
-            <a:r>
-              <a:rPr lang="it-IT" sz="2400" dirty="0" err="1"/>
-              <a:t>ascending</a:t>
-            </a:r>
-            <a:endParaRPr lang="it-IT" sz="2400" dirty="0"/>
-          </a:p>
-          <a:p>
-            <a:r>
-              <a:rPr lang="it-IT" sz="2400" dirty="0" err="1"/>
-              <a:t>It</a:t>
-            </a:r>
-            <a:r>
-              <a:rPr lang="it-IT" sz="2400" dirty="0"/>
-              <a:t> </a:t>
-            </a:r>
-            <a:r>
-              <a:rPr lang="it-IT" sz="2400" dirty="0" err="1"/>
-              <a:t>is</a:t>
-            </a:r>
-            <a:r>
-              <a:rPr lang="it-IT" sz="2400" dirty="0"/>
-              <a:t> </a:t>
-            </a:r>
-            <a:r>
-              <a:rPr lang="it-IT" sz="2400" dirty="0" err="1"/>
-              <a:t>possible</a:t>
-            </a:r>
-            <a:r>
-              <a:rPr lang="it-IT" sz="2400" dirty="0"/>
-              <a:t> to </a:t>
-            </a:r>
-            <a:r>
-              <a:rPr lang="it-IT" sz="2400" dirty="0" err="1"/>
-              <a:t>change</a:t>
-            </a:r>
-            <a:r>
-              <a:rPr lang="it-IT" sz="2400" dirty="0"/>
-              <a:t> the </a:t>
-            </a:r>
-            <a:r>
-              <a:rPr lang="it-IT" sz="2400" dirty="0" err="1"/>
-              <a:t>order</a:t>
-            </a:r>
-            <a:r>
-              <a:rPr lang="it-IT" sz="2400" dirty="0"/>
-              <a:t> </a:t>
-            </a:r>
-            <a:r>
-              <a:rPr lang="it-IT" sz="2400" dirty="0" err="1"/>
-              <a:t>using</a:t>
-            </a:r>
-            <a:r>
-              <a:rPr lang="it-IT" sz="2400" dirty="0"/>
-              <a:t> WITH CLUSTERING ORDER BY</a:t>
-            </a:r>
-          </a:p>
-        </p:txBody>
-      </p:sp>
-      <p:pic>
-        <p:nvPicPr>
-          <p:cNvPr id="5" name="Immagine 4">
-            <a:extLst>
-              <a:ext uri="{FF2B5EF4-FFF2-40B4-BE49-F238E27FC236}">
-                <a16:creationId xmlns:a16="http://schemas.microsoft.com/office/drawing/2014/main" id="{45882E98-52D0-4726-B895-F707EAB8666C}"/>
-              </a:ext>
-            </a:extLst>
-          </p:cNvPr>
-          <p:cNvPicPr>
-            <a:picLocks noChangeAspect="1"/>
-          </p:cNvPicPr>
-          <p:nvPr/>
-        </p:nvPicPr>
-        <p:blipFill>
-          <a:blip r:embed="rId2"/>
-          <a:stretch>
-            <a:fillRect/>
-          </a:stretch>
-        </p:blipFill>
-        <p:spPr>
-          <a:xfrm>
-            <a:off x="2359914" y="3796284"/>
-            <a:ext cx="7048500" cy="2476500"/>
-          </a:xfrm>
-          <a:prstGeom prst="rect">
-            <a:avLst/>
-          </a:prstGeom>
-        </p:spPr>
-      </p:pic>
-    </p:spTree>
-    <p:extLst>
-      <p:ext uri="{BB962C8B-B14F-4D97-AF65-F5344CB8AC3E}">
-        <p14:creationId xmlns:p14="http://schemas.microsoft.com/office/powerpoint/2010/main" val="3648349086"/>
-      </p:ext>
-    </p:extLst>
-  </p:cSld>
-  <p:clrMapOvr>
-    <a:masterClrMapping/>
-  </p:clrMapOvr>
-</p:sld>
-</file>
-
-<file path=ppt/slides/slide19.xml><?xml version="1.0" encoding="utf-8"?>
-<p:sld xmlns:a="http://schemas.openxmlformats.org/drawingml/2006/main" xmlns:r="http://schemas.openxmlformats.org/officeDocument/2006/relationships" xmlns:p="http://schemas.openxmlformats.org/presentationml/2006/main">
-  <p:cSld>
-    <p:spTree>
-      <p:nvGrpSpPr>
-        <p:cNvPr id="1" name=""/>
-        <p:cNvGrpSpPr/>
-        <p:nvPr/>
-      </p:nvGrpSpPr>
-      <p:grpSpPr>
-        <a:xfrm>
-          <a:off x="0" y="0"/>
-          <a:ext cx="0" cy="0"/>
-          <a:chOff x="0" y="0"/>
-          <a:chExt cx="0" cy="0"/>
-        </a:xfrm>
-      </p:grpSpPr>
-      <p:sp>
-        <p:nvSpPr>
-          <p:cNvPr id="2" name="Titolo 1">
-            <a:extLst>
-              <a:ext uri="{FF2B5EF4-FFF2-40B4-BE49-F238E27FC236}">
-                <a16:creationId xmlns:a16="http://schemas.microsoft.com/office/drawing/2014/main" id="{0CBE5A73-6F06-45DF-99E6-EE377CF99B2B}"/>
-              </a:ext>
-            </a:extLst>
-          </p:cNvPr>
-          <p:cNvSpPr>
-            <a:spLocks noGrp="1"/>
-          </p:cNvSpPr>
-          <p:nvPr>
-            <p:ph type="title"/>
-          </p:nvPr>
-        </p:nvSpPr>
-        <p:spPr/>
-        <p:txBody>
-          <a:bodyPr/>
-          <a:lstStyle/>
-          <a:p>
-            <a:r>
-              <a:rPr lang="it-IT"/>
-              <a:t>Querying</a:t>
-            </a:r>
-            <a:endParaRPr lang="it-IT" dirty="0"/>
-          </a:p>
-        </p:txBody>
-      </p:sp>
-      <p:sp>
-        <p:nvSpPr>
-          <p:cNvPr id="3" name="Segnaposto contenuto 2">
-            <a:extLst>
-              <a:ext uri="{FF2B5EF4-FFF2-40B4-BE49-F238E27FC236}">
-                <a16:creationId xmlns:a16="http://schemas.microsoft.com/office/drawing/2014/main" id="{91927D8C-D238-406D-8D7C-0A10FDE7E058}"/>
-              </a:ext>
-            </a:extLst>
-          </p:cNvPr>
-          <p:cNvSpPr>
-            <a:spLocks noGrp="1"/>
-          </p:cNvSpPr>
-          <p:nvPr>
-            <p:ph idx="1"/>
-          </p:nvPr>
-        </p:nvSpPr>
-        <p:spPr>
-          <a:xfrm>
-            <a:off x="1024128" y="2286000"/>
-            <a:ext cx="10436944" cy="4023360"/>
-          </a:xfrm>
-        </p:spPr>
-        <p:txBody>
-          <a:bodyPr/>
-          <a:lstStyle/>
-          <a:p>
-            <a:pPr>
-              <a:buFont typeface="Tw Cen MT" panose="020B0602020104020603" pitchFamily="34" charset="0"/>
-              <a:buChar char="-"/>
-            </a:pPr>
-            <a:r>
-              <a:rPr lang="it-IT" dirty="0"/>
-              <a:t> </a:t>
-            </a:r>
-            <a:r>
-              <a:rPr lang="it-IT" sz="2400" dirty="0" err="1"/>
-              <a:t>Every</a:t>
-            </a:r>
-            <a:r>
-              <a:rPr lang="it-IT" sz="2400" dirty="0"/>
-              <a:t> query </a:t>
-            </a:r>
-            <a:r>
-              <a:rPr lang="it-IT" sz="2400" dirty="0" err="1"/>
-              <a:t>should</a:t>
-            </a:r>
-            <a:r>
-              <a:rPr lang="it-IT" sz="2400" dirty="0"/>
-              <a:t> </a:t>
-            </a:r>
-            <a:r>
-              <a:rPr lang="it-IT" sz="2400" dirty="0" err="1"/>
-              <a:t>have</a:t>
-            </a:r>
-            <a:r>
-              <a:rPr lang="it-IT" sz="2400" dirty="0"/>
-              <a:t> a </a:t>
-            </a:r>
-            <a:r>
-              <a:rPr lang="it-IT" sz="2400" dirty="0" err="1"/>
-              <a:t>partition</a:t>
-            </a:r>
-            <a:r>
-              <a:rPr lang="it-IT" sz="2400" dirty="0"/>
-              <a:t> key: Cassandra </a:t>
-            </a:r>
-            <a:r>
-              <a:rPr lang="it-IT" sz="2400" dirty="0" err="1"/>
-              <a:t>needs</a:t>
-            </a:r>
-            <a:r>
-              <a:rPr lang="it-IT" sz="2400" dirty="0"/>
-              <a:t> to know </a:t>
-            </a:r>
-            <a:r>
-              <a:rPr lang="it-IT" sz="2400" dirty="0" err="1"/>
-              <a:t>where</a:t>
-            </a:r>
-            <a:r>
-              <a:rPr lang="it-IT" sz="2400" dirty="0"/>
-              <a:t> to look</a:t>
-            </a:r>
-          </a:p>
-          <a:p>
-            <a:pPr>
-              <a:buFont typeface="Tw Cen MT" panose="020B0602020104020603" pitchFamily="34" charset="0"/>
-              <a:buChar char="-"/>
-            </a:pPr>
-            <a:r>
-              <a:rPr lang="it-IT" sz="2400" dirty="0"/>
-              <a:t> Inside a </a:t>
-            </a:r>
-            <a:r>
-              <a:rPr lang="it-IT" sz="2400" dirty="0" err="1"/>
-              <a:t>partition</a:t>
-            </a:r>
-            <a:r>
-              <a:rPr lang="it-IT" sz="2400" dirty="0"/>
-              <a:t>, </a:t>
-            </a:r>
-            <a:r>
-              <a:rPr lang="it-IT" sz="2400" dirty="0" err="1"/>
-              <a:t>you</a:t>
-            </a:r>
-            <a:r>
-              <a:rPr lang="it-IT" sz="2400" dirty="0"/>
-              <a:t> can </a:t>
-            </a:r>
-            <a:r>
-              <a:rPr lang="it-IT" sz="2400" dirty="0" err="1"/>
-              <a:t>perform</a:t>
-            </a:r>
-            <a:r>
-              <a:rPr lang="it-IT" sz="2400" dirty="0"/>
-              <a:t> </a:t>
-            </a:r>
-            <a:r>
-              <a:rPr lang="it-IT" sz="2400" dirty="0" err="1"/>
-              <a:t>operations</a:t>
-            </a:r>
-            <a:r>
-              <a:rPr lang="it-IT" sz="2400" dirty="0"/>
-              <a:t> (&lt; &gt; =) on clustering </a:t>
-            </a:r>
-            <a:r>
-              <a:rPr lang="it-IT" sz="2400" dirty="0" err="1"/>
-              <a:t>columns</a:t>
-            </a:r>
-            <a:endParaRPr lang="it-IT" sz="2400" dirty="0"/>
-          </a:p>
-          <a:p>
-            <a:pPr lvl="1">
-              <a:buFont typeface="Tw Cen MT" panose="020B0602020104020603" pitchFamily="34" charset="0"/>
-              <a:buChar char="-"/>
-            </a:pPr>
-            <a:r>
-              <a:rPr lang="it-IT" sz="2200" dirty="0" err="1"/>
-              <a:t>When</a:t>
-            </a:r>
-            <a:r>
-              <a:rPr lang="it-IT" sz="2200" dirty="0"/>
-              <a:t> </a:t>
-            </a:r>
-            <a:r>
-              <a:rPr lang="it-IT" sz="2200" dirty="0" err="1"/>
-              <a:t>doing</a:t>
-            </a:r>
-            <a:r>
-              <a:rPr lang="it-IT" sz="2200" dirty="0"/>
-              <a:t> </a:t>
-            </a:r>
-            <a:r>
-              <a:rPr lang="it-IT" sz="2200" dirty="0" err="1"/>
-              <a:t>equals</a:t>
-            </a:r>
-            <a:r>
-              <a:rPr lang="it-IT" sz="2200" dirty="0"/>
-              <a:t>, </a:t>
-            </a:r>
-            <a:r>
-              <a:rPr lang="it-IT" sz="2200" dirty="0" err="1"/>
-              <a:t>it</a:t>
-            </a:r>
-            <a:r>
-              <a:rPr lang="it-IT" sz="2200" dirty="0"/>
-              <a:t> </a:t>
-            </a:r>
-            <a:r>
-              <a:rPr lang="it-IT" sz="2200" dirty="0" err="1"/>
-              <a:t>is</a:t>
-            </a:r>
-            <a:r>
-              <a:rPr lang="it-IT" sz="2200" dirty="0"/>
-              <a:t> </a:t>
-            </a:r>
-            <a:r>
-              <a:rPr lang="it-IT" sz="2200" dirty="0" err="1"/>
-              <a:t>important</a:t>
-            </a:r>
-            <a:r>
-              <a:rPr lang="it-IT" sz="2200" dirty="0"/>
-              <a:t> to do </a:t>
-            </a:r>
-            <a:r>
-              <a:rPr lang="it-IT" sz="2200" dirty="0" err="1"/>
-              <a:t>them</a:t>
-            </a:r>
-            <a:r>
-              <a:rPr lang="it-IT" sz="2200" dirty="0"/>
-              <a:t> in the </a:t>
-            </a:r>
-            <a:r>
-              <a:rPr lang="it-IT" sz="2200" dirty="0" err="1"/>
-              <a:t>same</a:t>
-            </a:r>
-            <a:r>
-              <a:rPr lang="it-IT" sz="2200" dirty="0"/>
-              <a:t> </a:t>
-            </a:r>
-            <a:r>
-              <a:rPr lang="it-IT" sz="2200" dirty="0" err="1"/>
-              <a:t>order</a:t>
-            </a:r>
-            <a:r>
-              <a:rPr lang="it-IT" sz="2200" dirty="0"/>
-              <a:t> </a:t>
-            </a:r>
-            <a:r>
-              <a:rPr lang="it-IT" sz="2200" dirty="0" err="1"/>
-              <a:t>that</a:t>
-            </a:r>
-            <a:r>
-              <a:rPr lang="it-IT" sz="2200" dirty="0"/>
-              <a:t> the clustering </a:t>
-            </a:r>
-            <a:r>
-              <a:rPr lang="it-IT" sz="2200" dirty="0" err="1"/>
-              <a:t>columns</a:t>
-            </a:r>
-            <a:r>
-              <a:rPr lang="it-IT" sz="2200" dirty="0"/>
-              <a:t> are </a:t>
-            </a:r>
-            <a:r>
-              <a:rPr lang="it-IT" sz="2200" dirty="0" err="1"/>
-              <a:t>presented</a:t>
-            </a:r>
-            <a:r>
-              <a:rPr lang="it-IT" sz="2200" dirty="0"/>
-              <a:t> in the </a:t>
-            </a:r>
-            <a:r>
-              <a:rPr lang="it-IT" sz="2200" dirty="0" err="1"/>
-              <a:t>Primary</a:t>
-            </a:r>
-            <a:r>
-              <a:rPr lang="it-IT" sz="2200" dirty="0"/>
-              <a:t> key </a:t>
-            </a:r>
-            <a:r>
-              <a:rPr lang="it-IT" sz="2200" dirty="0" err="1"/>
-              <a:t>definition</a:t>
-            </a:r>
-            <a:r>
-              <a:rPr lang="it-IT" sz="2200" dirty="0"/>
-              <a:t> </a:t>
-            </a:r>
-          </a:p>
-          <a:p>
-            <a:pPr lvl="1">
-              <a:buFont typeface="Tw Cen MT" panose="020B0602020104020603" pitchFamily="34" charset="0"/>
-              <a:buChar char="-"/>
-            </a:pPr>
-            <a:r>
-              <a:rPr lang="it-IT" sz="2200" dirty="0" err="1"/>
-              <a:t>That</a:t>
-            </a:r>
-            <a:r>
-              <a:rPr lang="it-IT" sz="2200" dirty="0"/>
-              <a:t> </a:t>
-            </a:r>
-            <a:r>
-              <a:rPr lang="it-IT" sz="2200" dirty="0" err="1"/>
-              <a:t>is</a:t>
-            </a:r>
-            <a:r>
-              <a:rPr lang="it-IT" sz="2200" dirty="0"/>
-              <a:t> </a:t>
-            </a:r>
-            <a:r>
-              <a:rPr lang="it-IT" sz="2200" dirty="0" err="1"/>
-              <a:t>because</a:t>
-            </a:r>
-            <a:r>
-              <a:rPr lang="it-IT" sz="2200" dirty="0"/>
-              <a:t> the data </a:t>
-            </a:r>
-            <a:r>
-              <a:rPr lang="it-IT" sz="2200" dirty="0" err="1"/>
-              <a:t>is</a:t>
-            </a:r>
-            <a:r>
-              <a:rPr lang="it-IT" sz="2200" dirty="0"/>
-              <a:t> </a:t>
-            </a:r>
-            <a:r>
-              <a:rPr lang="it-IT" sz="2200" dirty="0" err="1"/>
-              <a:t>ordered</a:t>
-            </a:r>
-            <a:r>
-              <a:rPr lang="it-IT" sz="2200" dirty="0"/>
-              <a:t> on disk: Cassandra </a:t>
-            </a:r>
-            <a:r>
-              <a:rPr lang="it-IT" sz="2200" dirty="0" err="1"/>
-              <a:t>performs</a:t>
-            </a:r>
-            <a:r>
-              <a:rPr lang="it-IT" sz="2200" dirty="0"/>
-              <a:t> a </a:t>
-            </a:r>
-            <a:r>
-              <a:rPr lang="it-IT" sz="2200" dirty="0" err="1"/>
-              <a:t>binary</a:t>
-            </a:r>
-            <a:r>
-              <a:rPr lang="it-IT" sz="2200" dirty="0"/>
-              <a:t> </a:t>
-            </a:r>
-            <a:r>
-              <a:rPr lang="it-IT" sz="2200" dirty="0" err="1"/>
-              <a:t>search</a:t>
-            </a:r>
-            <a:endParaRPr lang="it-IT" sz="2200" dirty="0"/>
-          </a:p>
-          <a:p>
-            <a:pPr lvl="1">
-              <a:buFont typeface="Tw Cen MT" panose="020B0602020104020603" pitchFamily="34" charset="0"/>
-              <a:buChar char="-"/>
-            </a:pPr>
-            <a:endParaRPr lang="it-IT" sz="2000" dirty="0"/>
-          </a:p>
-          <a:p>
-            <a:pPr>
-              <a:buFont typeface="Tw Cen MT" panose="020B0602020104020603" pitchFamily="34" charset="0"/>
-              <a:buChar char="-"/>
-            </a:pPr>
-            <a:r>
-              <a:rPr lang="it-IT" sz="2400" dirty="0"/>
-              <a:t> </a:t>
-            </a:r>
-            <a:r>
-              <a:rPr lang="it-IT" sz="2400" dirty="0" err="1"/>
-              <a:t>If</a:t>
-            </a:r>
-            <a:r>
-              <a:rPr lang="it-IT" sz="2400" dirty="0"/>
-              <a:t> </a:t>
-            </a:r>
-            <a:r>
-              <a:rPr lang="it-IT" sz="2400" dirty="0" err="1"/>
-              <a:t>you</a:t>
-            </a:r>
-            <a:r>
-              <a:rPr lang="it-IT" sz="2400" dirty="0"/>
-              <a:t> </a:t>
-            </a:r>
-            <a:r>
-              <a:rPr lang="it-IT" sz="2400" dirty="0" err="1"/>
-              <a:t>try</a:t>
-            </a:r>
-            <a:r>
-              <a:rPr lang="it-IT" sz="2400" dirty="0"/>
-              <a:t> to query data and filter </a:t>
-            </a:r>
-            <a:r>
-              <a:rPr lang="it-IT" sz="2400" dirty="0" err="1"/>
-              <a:t>it</a:t>
-            </a:r>
-            <a:r>
-              <a:rPr lang="it-IT" sz="2400" dirty="0"/>
-              <a:t> </a:t>
-            </a:r>
-            <a:r>
-              <a:rPr lang="it-IT" sz="2400" dirty="0" err="1"/>
-              <a:t>using</a:t>
-            </a:r>
-            <a:r>
-              <a:rPr lang="it-IT" sz="2400" dirty="0"/>
-              <a:t> a WHERE </a:t>
-            </a:r>
-            <a:r>
-              <a:rPr lang="it-IT" sz="2400" dirty="0" err="1"/>
-              <a:t>statement</a:t>
-            </a:r>
-            <a:r>
-              <a:rPr lang="it-IT" sz="2400" dirty="0"/>
-              <a:t> by NOT </a:t>
-            </a:r>
-            <a:r>
-              <a:rPr lang="it-IT" sz="2400" dirty="0" err="1"/>
-              <a:t>specifying</a:t>
-            </a:r>
-            <a:r>
-              <a:rPr lang="it-IT" sz="2400" dirty="0"/>
-              <a:t> a </a:t>
-            </a:r>
-            <a:r>
-              <a:rPr lang="it-IT" sz="2400" dirty="0" err="1"/>
-              <a:t>Partition</a:t>
-            </a:r>
-            <a:r>
-              <a:rPr lang="it-IT" sz="2400" dirty="0"/>
-              <a:t> key, Cassandra </a:t>
-            </a:r>
-            <a:r>
-              <a:rPr lang="it-IT" sz="2400" dirty="0" err="1"/>
-              <a:t>will</a:t>
-            </a:r>
-            <a:r>
-              <a:rPr lang="it-IT" sz="2400" dirty="0"/>
-              <a:t> </a:t>
-            </a:r>
-            <a:r>
-              <a:rPr lang="it-IT" sz="2400" dirty="0" err="1"/>
-              <a:t>refuse</a:t>
-            </a:r>
-            <a:r>
-              <a:rPr lang="it-IT" sz="2400" dirty="0"/>
-              <a:t> the query</a:t>
-            </a:r>
-          </a:p>
-          <a:p>
-            <a:pPr>
-              <a:buFont typeface="Tw Cen MT" panose="020B0602020104020603" pitchFamily="34" charset="0"/>
-              <a:buChar char="-"/>
-            </a:pPr>
-            <a:r>
-              <a:rPr lang="it-IT" sz="2400" dirty="0"/>
-              <a:t> </a:t>
-            </a:r>
-            <a:r>
-              <a:rPr lang="it-IT" sz="2400" dirty="0" err="1"/>
-              <a:t>If</a:t>
-            </a:r>
-            <a:r>
-              <a:rPr lang="it-IT" sz="2400" dirty="0"/>
-              <a:t> the </a:t>
-            </a:r>
-            <a:r>
-              <a:rPr lang="it-IT" sz="2400" dirty="0" err="1"/>
-              <a:t>Partition</a:t>
-            </a:r>
-            <a:r>
-              <a:rPr lang="it-IT" sz="2400" dirty="0"/>
-              <a:t> key </a:t>
-            </a:r>
-            <a:r>
-              <a:rPr lang="it-IT" sz="2400" dirty="0" err="1"/>
-              <a:t>is</a:t>
-            </a:r>
-            <a:r>
-              <a:rPr lang="it-IT" sz="2400" dirty="0"/>
-              <a:t> </a:t>
-            </a:r>
-            <a:r>
-              <a:rPr lang="it-IT" sz="2400" dirty="0" err="1"/>
-              <a:t>composed</a:t>
-            </a:r>
-            <a:r>
-              <a:rPr lang="it-IT" sz="2400" dirty="0"/>
-              <a:t>, </a:t>
-            </a:r>
-            <a:r>
-              <a:rPr lang="it-IT" sz="2400" dirty="0" err="1"/>
-              <a:t>it</a:t>
-            </a:r>
-            <a:r>
-              <a:rPr lang="it-IT" sz="2400" dirty="0"/>
-              <a:t> </a:t>
-            </a:r>
-            <a:r>
-              <a:rPr lang="it-IT" sz="2400" dirty="0" err="1"/>
-              <a:t>is</a:t>
-            </a:r>
-            <a:r>
-              <a:rPr lang="it-IT" sz="2400" dirty="0"/>
-              <a:t> </a:t>
-            </a:r>
-            <a:r>
-              <a:rPr lang="it-IT" sz="2400" dirty="0" err="1"/>
-              <a:t>necessary</a:t>
-            </a:r>
-            <a:r>
-              <a:rPr lang="it-IT" sz="2400" dirty="0"/>
-              <a:t> to </a:t>
-            </a:r>
-            <a:r>
-              <a:rPr lang="it-IT" sz="2400" dirty="0" err="1"/>
-              <a:t>provide</a:t>
-            </a:r>
-            <a:r>
-              <a:rPr lang="it-IT" sz="2400" dirty="0"/>
-              <a:t> </a:t>
-            </a:r>
-            <a:r>
-              <a:rPr lang="it-IT" sz="2400" dirty="0" err="1"/>
-              <a:t>both</a:t>
-            </a:r>
-            <a:r>
-              <a:rPr lang="it-IT" sz="2400" dirty="0"/>
-              <a:t> of </a:t>
-            </a:r>
-            <a:r>
-              <a:rPr lang="it-IT" sz="2400" dirty="0" err="1"/>
-              <a:t>them</a:t>
-            </a:r>
-            <a:endParaRPr lang="it-IT" sz="2400" dirty="0"/>
-          </a:p>
-        </p:txBody>
-      </p:sp>
-    </p:spTree>
-    <p:extLst>
-      <p:ext uri="{BB962C8B-B14F-4D97-AF65-F5344CB8AC3E}">
-        <p14:creationId xmlns:p14="http://schemas.microsoft.com/office/powerpoint/2010/main" val="2317996259"/>
       </p:ext>
     </p:extLst>
   </p:cSld>
@@ -12445,6 +14268,776 @@
           <p:cNvPr id="2" name="Titolo 1">
             <a:extLst>
               <a:ext uri="{FF2B5EF4-FFF2-40B4-BE49-F238E27FC236}">
+                <a16:creationId xmlns:a16="http://schemas.microsoft.com/office/drawing/2014/main" id="{A819C0DE-02ED-4B83-BE54-F0BAB6E230C3}"/>
+              </a:ext>
+            </a:extLst>
+          </p:cNvPr>
+          <p:cNvSpPr>
+            <a:spLocks noGrp="1"/>
+          </p:cNvSpPr>
+          <p:nvPr>
+            <p:ph type="title"/>
+          </p:nvPr>
+        </p:nvSpPr>
+        <p:spPr/>
+        <p:txBody>
+          <a:bodyPr/>
+          <a:lstStyle/>
+          <a:p>
+            <a:r>
+              <a:rPr lang="it-IT" dirty="0"/>
+              <a:t>Clustering </a:t>
+            </a:r>
+            <a:r>
+              <a:rPr lang="it-IT" dirty="0" err="1"/>
+              <a:t>columns</a:t>
+            </a:r>
+            <a:r>
+              <a:rPr lang="it-IT" dirty="0"/>
+              <a:t> </a:t>
+            </a:r>
+            <a:r>
+              <a:rPr lang="it-IT" dirty="0" err="1"/>
+              <a:t>order</a:t>
+            </a:r>
+            <a:endParaRPr lang="it-IT" dirty="0"/>
+          </a:p>
+        </p:txBody>
+      </p:sp>
+      <p:sp>
+        <p:nvSpPr>
+          <p:cNvPr id="3" name="Segnaposto contenuto 2">
+            <a:extLst>
+              <a:ext uri="{FF2B5EF4-FFF2-40B4-BE49-F238E27FC236}">
+                <a16:creationId xmlns:a16="http://schemas.microsoft.com/office/drawing/2014/main" id="{E02803CD-0DC7-4E54-88A4-EF7E147B09B4}"/>
+              </a:ext>
+            </a:extLst>
+          </p:cNvPr>
+          <p:cNvSpPr>
+            <a:spLocks noGrp="1"/>
+          </p:cNvSpPr>
+          <p:nvPr>
+            <p:ph idx="1"/>
+          </p:nvPr>
+        </p:nvSpPr>
+        <p:spPr/>
+        <p:txBody>
+          <a:bodyPr>
+            <a:normAutofit/>
+          </a:bodyPr>
+          <a:lstStyle/>
+          <a:p>
+            <a:r>
+              <a:rPr lang="it-IT" sz="2400" dirty="0"/>
+              <a:t>The default clustering </a:t>
+            </a:r>
+            <a:r>
+              <a:rPr lang="it-IT" sz="2400" dirty="0" err="1"/>
+              <a:t>column</a:t>
+            </a:r>
+            <a:r>
+              <a:rPr lang="it-IT" sz="2400" dirty="0"/>
+              <a:t> </a:t>
+            </a:r>
+            <a:r>
+              <a:rPr lang="it-IT" sz="2400" dirty="0" err="1"/>
+              <a:t>order</a:t>
+            </a:r>
+            <a:r>
+              <a:rPr lang="it-IT" sz="2400" dirty="0"/>
+              <a:t> </a:t>
+            </a:r>
+            <a:r>
+              <a:rPr lang="it-IT" sz="2400" dirty="0" err="1"/>
+              <a:t>is</a:t>
+            </a:r>
+            <a:r>
+              <a:rPr lang="it-IT" sz="2400" dirty="0"/>
+              <a:t> </a:t>
+            </a:r>
+            <a:r>
+              <a:rPr lang="it-IT" sz="2400" dirty="0" err="1"/>
+              <a:t>ascending</a:t>
+            </a:r>
+            <a:endParaRPr lang="it-IT" sz="2400" dirty="0"/>
+          </a:p>
+          <a:p>
+            <a:r>
+              <a:rPr lang="it-IT" sz="2400" dirty="0" err="1"/>
+              <a:t>It</a:t>
+            </a:r>
+            <a:r>
+              <a:rPr lang="it-IT" sz="2400" dirty="0"/>
+              <a:t> </a:t>
+            </a:r>
+            <a:r>
+              <a:rPr lang="it-IT" sz="2400" dirty="0" err="1"/>
+              <a:t>is</a:t>
+            </a:r>
+            <a:r>
+              <a:rPr lang="it-IT" sz="2400" dirty="0"/>
+              <a:t> </a:t>
+            </a:r>
+            <a:r>
+              <a:rPr lang="it-IT" sz="2400" dirty="0" err="1"/>
+              <a:t>possible</a:t>
+            </a:r>
+            <a:r>
+              <a:rPr lang="it-IT" sz="2400" dirty="0"/>
+              <a:t> to </a:t>
+            </a:r>
+            <a:r>
+              <a:rPr lang="it-IT" sz="2400" dirty="0" err="1"/>
+              <a:t>change</a:t>
+            </a:r>
+            <a:r>
+              <a:rPr lang="it-IT" sz="2400" dirty="0"/>
+              <a:t> the </a:t>
+            </a:r>
+            <a:r>
+              <a:rPr lang="it-IT" sz="2400" dirty="0" err="1"/>
+              <a:t>order</a:t>
+            </a:r>
+            <a:r>
+              <a:rPr lang="it-IT" sz="2400" dirty="0"/>
+              <a:t> </a:t>
+            </a:r>
+            <a:r>
+              <a:rPr lang="it-IT" sz="2400" dirty="0" err="1"/>
+              <a:t>using</a:t>
+            </a:r>
+            <a:r>
+              <a:rPr lang="it-IT" sz="2400" dirty="0"/>
+              <a:t> WITH CLUSTERING ORDER BY</a:t>
+            </a:r>
+          </a:p>
+        </p:txBody>
+      </p:sp>
+      <p:pic>
+        <p:nvPicPr>
+          <p:cNvPr id="5" name="Immagine 4">
+            <a:extLst>
+              <a:ext uri="{FF2B5EF4-FFF2-40B4-BE49-F238E27FC236}">
+                <a16:creationId xmlns:a16="http://schemas.microsoft.com/office/drawing/2014/main" id="{45882E98-52D0-4726-B895-F707EAB8666C}"/>
+              </a:ext>
+            </a:extLst>
+          </p:cNvPr>
+          <p:cNvPicPr>
+            <a:picLocks noChangeAspect="1"/>
+          </p:cNvPicPr>
+          <p:nvPr/>
+        </p:nvPicPr>
+        <p:blipFill>
+          <a:blip r:embed="rId2"/>
+          <a:stretch>
+            <a:fillRect/>
+          </a:stretch>
+        </p:blipFill>
+        <p:spPr>
+          <a:xfrm>
+            <a:off x="2359914" y="3796284"/>
+            <a:ext cx="7048500" cy="2476500"/>
+          </a:xfrm>
+          <a:prstGeom prst="rect">
+            <a:avLst/>
+          </a:prstGeom>
+        </p:spPr>
+      </p:pic>
+    </p:spTree>
+    <p:extLst>
+      <p:ext uri="{BB962C8B-B14F-4D97-AF65-F5344CB8AC3E}">
+        <p14:creationId xmlns:p14="http://schemas.microsoft.com/office/powerpoint/2010/main" val="3648349086"/>
+      </p:ext>
+    </p:extLst>
+  </p:cSld>
+  <p:clrMapOvr>
+    <a:masterClrMapping/>
+  </p:clrMapOvr>
+</p:sld>
+</file>
+
+<file path=ppt/slides/slide21.xml><?xml version="1.0" encoding="utf-8"?>
+<p:sld xmlns:a="http://schemas.openxmlformats.org/drawingml/2006/main" xmlns:r="http://schemas.openxmlformats.org/officeDocument/2006/relationships" xmlns:p="http://schemas.openxmlformats.org/presentationml/2006/main">
+  <p:cSld>
+    <p:spTree>
+      <p:nvGrpSpPr>
+        <p:cNvPr id="1" name=""/>
+        <p:cNvGrpSpPr/>
+        <p:nvPr/>
+      </p:nvGrpSpPr>
+      <p:grpSpPr>
+        <a:xfrm>
+          <a:off x="0" y="0"/>
+          <a:ext cx="0" cy="0"/>
+          <a:chOff x="0" y="0"/>
+          <a:chExt cx="0" cy="0"/>
+        </a:xfrm>
+      </p:grpSpPr>
+      <p:sp>
+        <p:nvSpPr>
+          <p:cNvPr id="2" name="Titolo 1">
+            <a:extLst>
+              <a:ext uri="{FF2B5EF4-FFF2-40B4-BE49-F238E27FC236}">
+                <a16:creationId xmlns:a16="http://schemas.microsoft.com/office/drawing/2014/main" id="{0CBE5A73-6F06-45DF-99E6-EE377CF99B2B}"/>
+              </a:ext>
+            </a:extLst>
+          </p:cNvPr>
+          <p:cNvSpPr>
+            <a:spLocks noGrp="1"/>
+          </p:cNvSpPr>
+          <p:nvPr>
+            <p:ph type="title"/>
+          </p:nvPr>
+        </p:nvSpPr>
+        <p:spPr/>
+        <p:txBody>
+          <a:bodyPr/>
+          <a:lstStyle/>
+          <a:p>
+            <a:r>
+              <a:rPr lang="it-IT"/>
+              <a:t>Querying</a:t>
+            </a:r>
+            <a:endParaRPr lang="it-IT" dirty="0"/>
+          </a:p>
+        </p:txBody>
+      </p:sp>
+      <p:sp>
+        <p:nvSpPr>
+          <p:cNvPr id="3" name="Segnaposto contenuto 2">
+            <a:extLst>
+              <a:ext uri="{FF2B5EF4-FFF2-40B4-BE49-F238E27FC236}">
+                <a16:creationId xmlns:a16="http://schemas.microsoft.com/office/drawing/2014/main" id="{91927D8C-D238-406D-8D7C-0A10FDE7E058}"/>
+              </a:ext>
+            </a:extLst>
+          </p:cNvPr>
+          <p:cNvSpPr>
+            <a:spLocks noGrp="1"/>
+          </p:cNvSpPr>
+          <p:nvPr>
+            <p:ph idx="1"/>
+          </p:nvPr>
+        </p:nvSpPr>
+        <p:spPr>
+          <a:xfrm>
+            <a:off x="1024128" y="2286000"/>
+            <a:ext cx="10436944" cy="4023360"/>
+          </a:xfrm>
+        </p:spPr>
+        <p:txBody>
+          <a:bodyPr/>
+          <a:lstStyle/>
+          <a:p>
+            <a:pPr>
+              <a:buFont typeface="Tw Cen MT" panose="020B0602020104020603" pitchFamily="34" charset="0"/>
+              <a:buChar char="-"/>
+            </a:pPr>
+            <a:r>
+              <a:rPr lang="it-IT" dirty="0"/>
+              <a:t> </a:t>
+            </a:r>
+            <a:r>
+              <a:rPr lang="it-IT" sz="2400" dirty="0" err="1"/>
+              <a:t>Every</a:t>
+            </a:r>
+            <a:r>
+              <a:rPr lang="it-IT" sz="2400" dirty="0"/>
+              <a:t> query </a:t>
+            </a:r>
+            <a:r>
+              <a:rPr lang="it-IT" sz="2400" dirty="0" err="1"/>
+              <a:t>should</a:t>
+            </a:r>
+            <a:r>
+              <a:rPr lang="it-IT" sz="2400" dirty="0"/>
+              <a:t> </a:t>
+            </a:r>
+            <a:r>
+              <a:rPr lang="it-IT" sz="2400" dirty="0" err="1"/>
+              <a:t>have</a:t>
+            </a:r>
+            <a:r>
+              <a:rPr lang="it-IT" sz="2400" dirty="0"/>
+              <a:t> a </a:t>
+            </a:r>
+            <a:r>
+              <a:rPr lang="it-IT" sz="2400" dirty="0" err="1"/>
+              <a:t>partition</a:t>
+            </a:r>
+            <a:r>
+              <a:rPr lang="it-IT" sz="2400" dirty="0"/>
+              <a:t> key: Cassandra </a:t>
+            </a:r>
+            <a:r>
+              <a:rPr lang="it-IT" sz="2400" dirty="0" err="1"/>
+              <a:t>needs</a:t>
+            </a:r>
+            <a:r>
+              <a:rPr lang="it-IT" sz="2400" dirty="0"/>
+              <a:t> to know </a:t>
+            </a:r>
+            <a:r>
+              <a:rPr lang="it-IT" sz="2400" dirty="0" err="1"/>
+              <a:t>where</a:t>
+            </a:r>
+            <a:r>
+              <a:rPr lang="it-IT" sz="2400" dirty="0"/>
+              <a:t> to look</a:t>
+            </a:r>
+          </a:p>
+          <a:p>
+            <a:pPr>
+              <a:buFont typeface="Tw Cen MT" panose="020B0602020104020603" pitchFamily="34" charset="0"/>
+              <a:buChar char="-"/>
+            </a:pPr>
+            <a:r>
+              <a:rPr lang="it-IT" sz="2400" dirty="0"/>
+              <a:t> Inside a </a:t>
+            </a:r>
+            <a:r>
+              <a:rPr lang="it-IT" sz="2400" dirty="0" err="1"/>
+              <a:t>partition</a:t>
+            </a:r>
+            <a:r>
+              <a:rPr lang="it-IT" sz="2400" dirty="0"/>
+              <a:t>, </a:t>
+            </a:r>
+            <a:r>
+              <a:rPr lang="it-IT" sz="2400" dirty="0" err="1"/>
+              <a:t>you</a:t>
+            </a:r>
+            <a:r>
+              <a:rPr lang="it-IT" sz="2400" dirty="0"/>
+              <a:t> can </a:t>
+            </a:r>
+            <a:r>
+              <a:rPr lang="it-IT" sz="2400" dirty="0" err="1"/>
+              <a:t>perform</a:t>
+            </a:r>
+            <a:r>
+              <a:rPr lang="it-IT" sz="2400" dirty="0"/>
+              <a:t> </a:t>
+            </a:r>
+            <a:r>
+              <a:rPr lang="it-IT" sz="2400" dirty="0" err="1"/>
+              <a:t>operations</a:t>
+            </a:r>
+            <a:r>
+              <a:rPr lang="it-IT" sz="2400" dirty="0"/>
+              <a:t> (&lt; &gt; =) on clustering </a:t>
+            </a:r>
+            <a:r>
+              <a:rPr lang="it-IT" sz="2400" dirty="0" err="1"/>
+              <a:t>columns</a:t>
+            </a:r>
+            <a:endParaRPr lang="it-IT" sz="2400" dirty="0"/>
+          </a:p>
+          <a:p>
+            <a:pPr lvl="1">
+              <a:buFont typeface="Tw Cen MT" panose="020B0602020104020603" pitchFamily="34" charset="0"/>
+              <a:buChar char="-"/>
+            </a:pPr>
+            <a:r>
+              <a:rPr lang="it-IT" sz="2200" dirty="0" err="1"/>
+              <a:t>When</a:t>
+            </a:r>
+            <a:r>
+              <a:rPr lang="it-IT" sz="2200" dirty="0"/>
+              <a:t> </a:t>
+            </a:r>
+            <a:r>
+              <a:rPr lang="it-IT" sz="2200" dirty="0" err="1"/>
+              <a:t>doing</a:t>
+            </a:r>
+            <a:r>
+              <a:rPr lang="it-IT" sz="2200" dirty="0"/>
+              <a:t> </a:t>
+            </a:r>
+            <a:r>
+              <a:rPr lang="it-IT" sz="2200" dirty="0" err="1"/>
+              <a:t>equals</a:t>
+            </a:r>
+            <a:r>
+              <a:rPr lang="it-IT" sz="2200" dirty="0"/>
+              <a:t>, </a:t>
+            </a:r>
+            <a:r>
+              <a:rPr lang="it-IT" sz="2200" dirty="0" err="1"/>
+              <a:t>it</a:t>
+            </a:r>
+            <a:r>
+              <a:rPr lang="it-IT" sz="2200" dirty="0"/>
+              <a:t> </a:t>
+            </a:r>
+            <a:r>
+              <a:rPr lang="it-IT" sz="2200" dirty="0" err="1"/>
+              <a:t>is</a:t>
+            </a:r>
+            <a:r>
+              <a:rPr lang="it-IT" sz="2200" dirty="0"/>
+              <a:t> </a:t>
+            </a:r>
+            <a:r>
+              <a:rPr lang="it-IT" sz="2200" dirty="0" err="1"/>
+              <a:t>important</a:t>
+            </a:r>
+            <a:r>
+              <a:rPr lang="it-IT" sz="2200" dirty="0"/>
+              <a:t> to do </a:t>
+            </a:r>
+            <a:r>
+              <a:rPr lang="it-IT" sz="2200" dirty="0" err="1"/>
+              <a:t>them</a:t>
+            </a:r>
+            <a:r>
+              <a:rPr lang="it-IT" sz="2200" dirty="0"/>
+              <a:t> in the </a:t>
+            </a:r>
+            <a:r>
+              <a:rPr lang="it-IT" sz="2200" dirty="0" err="1"/>
+              <a:t>same</a:t>
+            </a:r>
+            <a:r>
+              <a:rPr lang="it-IT" sz="2200" dirty="0"/>
+              <a:t> </a:t>
+            </a:r>
+            <a:r>
+              <a:rPr lang="it-IT" sz="2200" dirty="0" err="1"/>
+              <a:t>order</a:t>
+            </a:r>
+            <a:r>
+              <a:rPr lang="it-IT" sz="2200" dirty="0"/>
+              <a:t> </a:t>
+            </a:r>
+            <a:r>
+              <a:rPr lang="it-IT" sz="2200" dirty="0" err="1"/>
+              <a:t>that</a:t>
+            </a:r>
+            <a:r>
+              <a:rPr lang="it-IT" sz="2200" dirty="0"/>
+              <a:t> the clustering </a:t>
+            </a:r>
+            <a:r>
+              <a:rPr lang="it-IT" sz="2200" dirty="0" err="1"/>
+              <a:t>columns</a:t>
+            </a:r>
+            <a:r>
+              <a:rPr lang="it-IT" sz="2200" dirty="0"/>
+              <a:t> are </a:t>
+            </a:r>
+            <a:r>
+              <a:rPr lang="it-IT" sz="2200" dirty="0" err="1"/>
+              <a:t>presented</a:t>
+            </a:r>
+            <a:r>
+              <a:rPr lang="it-IT" sz="2200" dirty="0"/>
+              <a:t> in the </a:t>
+            </a:r>
+            <a:r>
+              <a:rPr lang="it-IT" sz="2200" dirty="0" err="1"/>
+              <a:t>Primary</a:t>
+            </a:r>
+            <a:r>
+              <a:rPr lang="it-IT" sz="2200" dirty="0"/>
+              <a:t> key </a:t>
+            </a:r>
+            <a:r>
+              <a:rPr lang="it-IT" sz="2200" dirty="0" err="1"/>
+              <a:t>definition</a:t>
+            </a:r>
+            <a:r>
+              <a:rPr lang="it-IT" sz="2200" dirty="0"/>
+              <a:t> </a:t>
+            </a:r>
+          </a:p>
+          <a:p>
+            <a:pPr lvl="1">
+              <a:buFont typeface="Tw Cen MT" panose="020B0602020104020603" pitchFamily="34" charset="0"/>
+              <a:buChar char="-"/>
+            </a:pPr>
+            <a:r>
+              <a:rPr lang="it-IT" sz="2200" dirty="0" err="1"/>
+              <a:t>That</a:t>
+            </a:r>
+            <a:r>
+              <a:rPr lang="it-IT" sz="2200" dirty="0"/>
+              <a:t> </a:t>
+            </a:r>
+            <a:r>
+              <a:rPr lang="it-IT" sz="2200" dirty="0" err="1"/>
+              <a:t>is</a:t>
+            </a:r>
+            <a:r>
+              <a:rPr lang="it-IT" sz="2200" dirty="0"/>
+              <a:t> </a:t>
+            </a:r>
+            <a:r>
+              <a:rPr lang="it-IT" sz="2200" dirty="0" err="1"/>
+              <a:t>because</a:t>
+            </a:r>
+            <a:r>
+              <a:rPr lang="it-IT" sz="2200" dirty="0"/>
+              <a:t> the data </a:t>
+            </a:r>
+            <a:r>
+              <a:rPr lang="it-IT" sz="2200" dirty="0" err="1"/>
+              <a:t>is</a:t>
+            </a:r>
+            <a:r>
+              <a:rPr lang="it-IT" sz="2200" dirty="0"/>
+              <a:t> </a:t>
+            </a:r>
+            <a:r>
+              <a:rPr lang="it-IT" sz="2200" dirty="0" err="1"/>
+              <a:t>ordered</a:t>
+            </a:r>
+            <a:r>
+              <a:rPr lang="it-IT" sz="2200" dirty="0"/>
+              <a:t> on disk: Cassandra </a:t>
+            </a:r>
+            <a:r>
+              <a:rPr lang="it-IT" sz="2200" dirty="0" err="1"/>
+              <a:t>performs</a:t>
+            </a:r>
+            <a:r>
+              <a:rPr lang="it-IT" sz="2200" dirty="0"/>
+              <a:t> a </a:t>
+            </a:r>
+            <a:r>
+              <a:rPr lang="it-IT" sz="2200" dirty="0" err="1"/>
+              <a:t>binary</a:t>
+            </a:r>
+            <a:r>
+              <a:rPr lang="it-IT" sz="2200" dirty="0"/>
+              <a:t> </a:t>
+            </a:r>
+            <a:r>
+              <a:rPr lang="it-IT" sz="2200" dirty="0" err="1"/>
+              <a:t>search</a:t>
+            </a:r>
+            <a:endParaRPr lang="it-IT" sz="2200" dirty="0"/>
+          </a:p>
+          <a:p>
+            <a:pPr lvl="1">
+              <a:buFont typeface="Tw Cen MT" panose="020B0602020104020603" pitchFamily="34" charset="0"/>
+              <a:buChar char="-"/>
+            </a:pPr>
+            <a:endParaRPr lang="it-IT" sz="2000" dirty="0"/>
+          </a:p>
+          <a:p>
+            <a:pPr>
+              <a:buFont typeface="Tw Cen MT" panose="020B0602020104020603" pitchFamily="34" charset="0"/>
+              <a:buChar char="-"/>
+            </a:pPr>
+            <a:r>
+              <a:rPr lang="it-IT" sz="2400" dirty="0"/>
+              <a:t> </a:t>
+            </a:r>
+            <a:r>
+              <a:rPr lang="it-IT" sz="2400" dirty="0" err="1"/>
+              <a:t>If</a:t>
+            </a:r>
+            <a:r>
+              <a:rPr lang="it-IT" sz="2400" dirty="0"/>
+              <a:t> </a:t>
+            </a:r>
+            <a:r>
+              <a:rPr lang="it-IT" sz="2400" dirty="0" err="1"/>
+              <a:t>you</a:t>
+            </a:r>
+            <a:r>
+              <a:rPr lang="it-IT" sz="2400" dirty="0"/>
+              <a:t> </a:t>
+            </a:r>
+            <a:r>
+              <a:rPr lang="it-IT" sz="2400" dirty="0" err="1"/>
+              <a:t>try</a:t>
+            </a:r>
+            <a:r>
+              <a:rPr lang="it-IT" sz="2400" dirty="0"/>
+              <a:t> to query data and filter </a:t>
+            </a:r>
+            <a:r>
+              <a:rPr lang="it-IT" sz="2400" dirty="0" err="1"/>
+              <a:t>it</a:t>
+            </a:r>
+            <a:r>
+              <a:rPr lang="it-IT" sz="2400" dirty="0"/>
+              <a:t> </a:t>
+            </a:r>
+            <a:r>
+              <a:rPr lang="it-IT" sz="2400" dirty="0" err="1"/>
+              <a:t>using</a:t>
+            </a:r>
+            <a:r>
+              <a:rPr lang="it-IT" sz="2400" dirty="0"/>
+              <a:t> a WHERE </a:t>
+            </a:r>
+            <a:r>
+              <a:rPr lang="it-IT" sz="2400" dirty="0" err="1"/>
+              <a:t>statement</a:t>
+            </a:r>
+            <a:r>
+              <a:rPr lang="it-IT" sz="2400" dirty="0"/>
+              <a:t> by NOT </a:t>
+            </a:r>
+            <a:r>
+              <a:rPr lang="it-IT" sz="2400" dirty="0" err="1"/>
+              <a:t>specifying</a:t>
+            </a:r>
+            <a:r>
+              <a:rPr lang="it-IT" sz="2400" dirty="0"/>
+              <a:t> a </a:t>
+            </a:r>
+            <a:r>
+              <a:rPr lang="it-IT" sz="2400" dirty="0" err="1"/>
+              <a:t>Partition</a:t>
+            </a:r>
+            <a:r>
+              <a:rPr lang="it-IT" sz="2400" dirty="0"/>
+              <a:t> key, Cassandra </a:t>
+            </a:r>
+            <a:r>
+              <a:rPr lang="it-IT" sz="2400" dirty="0" err="1"/>
+              <a:t>will</a:t>
+            </a:r>
+            <a:r>
+              <a:rPr lang="it-IT" sz="2400" dirty="0"/>
+              <a:t> </a:t>
+            </a:r>
+            <a:r>
+              <a:rPr lang="it-IT" sz="2400" dirty="0" err="1"/>
+              <a:t>refuse</a:t>
+            </a:r>
+            <a:r>
+              <a:rPr lang="it-IT" sz="2400" dirty="0"/>
+              <a:t> the query</a:t>
+            </a:r>
+          </a:p>
+          <a:p>
+            <a:pPr>
+              <a:buFont typeface="Tw Cen MT" panose="020B0602020104020603" pitchFamily="34" charset="0"/>
+              <a:buChar char="-"/>
+            </a:pPr>
+            <a:r>
+              <a:rPr lang="it-IT" sz="2400" dirty="0"/>
+              <a:t> </a:t>
+            </a:r>
+            <a:r>
+              <a:rPr lang="it-IT" sz="2400" dirty="0" err="1"/>
+              <a:t>If</a:t>
+            </a:r>
+            <a:r>
+              <a:rPr lang="it-IT" sz="2400" dirty="0"/>
+              <a:t> the </a:t>
+            </a:r>
+            <a:r>
+              <a:rPr lang="it-IT" sz="2400" dirty="0" err="1"/>
+              <a:t>Partition</a:t>
+            </a:r>
+            <a:r>
+              <a:rPr lang="it-IT" sz="2400" dirty="0"/>
+              <a:t> key </a:t>
+            </a:r>
+            <a:r>
+              <a:rPr lang="it-IT" sz="2400" dirty="0" err="1"/>
+              <a:t>is</a:t>
+            </a:r>
+            <a:r>
+              <a:rPr lang="it-IT" sz="2400" dirty="0"/>
+              <a:t> </a:t>
+            </a:r>
+            <a:r>
+              <a:rPr lang="it-IT" sz="2400" dirty="0" err="1"/>
+              <a:t>composed</a:t>
+            </a:r>
+            <a:r>
+              <a:rPr lang="it-IT" sz="2400" dirty="0"/>
+              <a:t>, </a:t>
+            </a:r>
+            <a:r>
+              <a:rPr lang="it-IT" sz="2400" dirty="0" err="1"/>
+              <a:t>it</a:t>
+            </a:r>
+            <a:r>
+              <a:rPr lang="it-IT" sz="2400" dirty="0"/>
+              <a:t> </a:t>
+            </a:r>
+            <a:r>
+              <a:rPr lang="it-IT" sz="2400" dirty="0" err="1"/>
+              <a:t>is</a:t>
+            </a:r>
+            <a:r>
+              <a:rPr lang="it-IT" sz="2400" dirty="0"/>
+              <a:t> </a:t>
+            </a:r>
+            <a:r>
+              <a:rPr lang="it-IT" sz="2400" dirty="0" err="1"/>
+              <a:t>necessary</a:t>
+            </a:r>
+            <a:r>
+              <a:rPr lang="it-IT" sz="2400" dirty="0"/>
+              <a:t> to </a:t>
+            </a:r>
+            <a:r>
+              <a:rPr lang="it-IT" sz="2400" dirty="0" err="1"/>
+              <a:t>provide</a:t>
+            </a:r>
+            <a:r>
+              <a:rPr lang="it-IT" sz="2400" dirty="0"/>
+              <a:t> </a:t>
+            </a:r>
+            <a:r>
+              <a:rPr lang="it-IT" sz="2400" dirty="0" err="1"/>
+              <a:t>both</a:t>
+            </a:r>
+            <a:r>
+              <a:rPr lang="it-IT" sz="2400" dirty="0"/>
+              <a:t> of </a:t>
+            </a:r>
+            <a:r>
+              <a:rPr lang="it-IT" sz="2400" dirty="0" err="1"/>
+              <a:t>them</a:t>
+            </a:r>
+            <a:endParaRPr lang="it-IT" sz="2400" dirty="0"/>
+          </a:p>
+        </p:txBody>
+      </p:sp>
+    </p:spTree>
+    <p:extLst>
+      <p:ext uri="{BB962C8B-B14F-4D97-AF65-F5344CB8AC3E}">
+        <p14:creationId xmlns:p14="http://schemas.microsoft.com/office/powerpoint/2010/main" val="2317996259"/>
+      </p:ext>
+    </p:extLst>
+  </p:cSld>
+  <p:clrMapOvr>
+    <a:masterClrMapping/>
+  </p:clrMapOvr>
+</p:sld>
+</file>
+
+<file path=ppt/slides/slide22.xml><?xml version="1.0" encoding="utf-8"?>
+<p:sld xmlns:a="http://schemas.openxmlformats.org/drawingml/2006/main" xmlns:r="http://schemas.openxmlformats.org/officeDocument/2006/relationships" xmlns:p="http://schemas.openxmlformats.org/presentationml/2006/main">
+  <p:cSld>
+    <p:spTree>
+      <p:nvGrpSpPr>
+        <p:cNvPr id="1" name=""/>
+        <p:cNvGrpSpPr/>
+        <p:nvPr/>
+      </p:nvGrpSpPr>
+      <p:grpSpPr>
+        <a:xfrm>
+          <a:off x="0" y="0"/>
+          <a:ext cx="0" cy="0"/>
+          <a:chOff x="0" y="0"/>
+          <a:chExt cx="0" cy="0"/>
+        </a:xfrm>
+      </p:grpSpPr>
+      <p:sp>
+        <p:nvSpPr>
+          <p:cNvPr id="2" name="Titolo 1">
+            <a:extLst>
+              <a:ext uri="{FF2B5EF4-FFF2-40B4-BE49-F238E27FC236}">
                 <a16:creationId xmlns:a16="http://schemas.microsoft.com/office/drawing/2014/main" id="{2A8B19B7-58BC-457B-A5C2-89F2BE3A7EF1}"/>
               </a:ext>
             </a:extLst>
@@ -12511,7 +15104,7 @@
 </p:sld>
 </file>
 
-<file path=ppt/slides/slide21.xml><?xml version="1.0" encoding="utf-8"?>
+<file path=ppt/slides/slide23.xml><?xml version="1.0" encoding="utf-8"?>
 <p:sld xmlns:a="http://schemas.openxmlformats.org/drawingml/2006/main" xmlns:r="http://schemas.openxmlformats.org/officeDocument/2006/relationships" xmlns:p="http://schemas.openxmlformats.org/presentationml/2006/main">
   <p:cSld>
     <p:spTree>
@@ -15413,7 +18006,7 @@
         </p:nvSpPr>
         <p:spPr>
           <a:xfrm>
-            <a:off x="1024128" y="606479"/>
+            <a:off x="998502" y="874288"/>
             <a:ext cx="9720072" cy="1052203"/>
           </a:xfrm>
         </p:spPr>
@@ -15463,7 +18056,7 @@
         </p:nvSpPr>
         <p:spPr>
           <a:xfrm>
-            <a:off x="659218" y="1839433"/>
+            <a:off x="659220" y="1990354"/>
             <a:ext cx="10873562" cy="4710224"/>
           </a:xfrm>
         </p:spPr>

</xml_diff>